<commit_message>
completed part 3 answers
</commit_message>
<xml_diff>
--- a/ppt/DASK.pptx
+++ b/ppt/DASK.pptx
@@ -8,6 +8,14 @@
     <p:sldId id="256" r:id="rId2"/>
     <p:sldId id="257" r:id="rId3"/>
     <p:sldId id="258" r:id="rId4"/>
+    <p:sldId id="259" r:id="rId5"/>
+    <p:sldId id="263" r:id="rId6"/>
+    <p:sldId id="265" r:id="rId7"/>
+    <p:sldId id="261" r:id="rId8"/>
+    <p:sldId id="266" r:id="rId9"/>
+    <p:sldId id="267" r:id="rId10"/>
+    <p:sldId id="262" r:id="rId11"/>
+    <p:sldId id="268" r:id="rId12"/>
   </p:sldIdLst>
   <p:sldSz cx="12192000" cy="6858000"/>
   <p:notesSz cx="6858000" cy="9144000"/>
@@ -626,7 +634,7 @@
           <a:p>
             <a:fld id="{83284890-85D2-4D7B-8EF5-15A9C1DB8F42}" type="datetimeFigureOut">
               <a:rPr lang="en-US" smtClean="0"/>
-              <a:t>12/11/18</a:t>
+              <a:t>12/12/18</a:t>
             </a:fld>
             <a:endParaRPr lang="en-US"/>
           </a:p>
@@ -804,7 +812,7 @@
           <a:p>
             <a:fld id="{87157CC2-0FC8-4686-B024-99790E0F5162}" type="datetimeFigureOut">
               <a:rPr lang="en-US" smtClean="0"/>
-              <a:t>12/11/18</a:t>
+              <a:t>12/12/18</a:t>
             </a:fld>
             <a:endParaRPr lang="en-US"/>
           </a:p>
@@ -984,7 +992,7 @@
           <a:p>
             <a:fld id="{F6764DA5-CD3D-4590-A511-FCD3BC7A793E}" type="datetimeFigureOut">
               <a:rPr lang="en-US" smtClean="0"/>
-              <a:t>12/11/18</a:t>
+              <a:t>12/12/18</a:t>
             </a:fld>
             <a:endParaRPr lang="en-US"/>
           </a:p>
@@ -1154,7 +1162,7 @@
           <a:p>
             <a:fld id="{82F5661D-6934-4B32-B92C-470368BF1EC6}" type="datetimeFigureOut">
               <a:rPr lang="en-US" smtClean="0"/>
-              <a:t>12/11/18</a:t>
+              <a:t>12/12/18</a:t>
             </a:fld>
             <a:endParaRPr lang="en-US"/>
           </a:p>
@@ -1475,7 +1483,7 @@
           <a:p>
             <a:fld id="{C6F822A4-8DA6-4447-9B1F-C5DB58435268}" type="datetimeFigureOut">
               <a:rPr lang="en-US" smtClean="0"/>
-              <a:t>12/11/18</a:t>
+              <a:t>12/12/18</a:t>
             </a:fld>
             <a:endParaRPr lang="en-US" dirty="0"/>
           </a:p>
@@ -1936,7 +1944,7 @@
           <a:p>
             <a:fld id="{E548D31E-DCDA-41A7-9C67-C4B11B94D21D}" type="datetimeFigureOut">
               <a:rPr lang="en-US" smtClean="0"/>
-              <a:t>12/11/18</a:t>
+              <a:t>12/12/18</a:t>
             </a:fld>
             <a:endParaRPr lang="en-US"/>
           </a:p>
@@ -2347,7 +2355,7 @@
           <a:p>
             <a:fld id="{9B3762C0-B258-48F1-ADE6-176B4174CCDD}" type="datetimeFigureOut">
               <a:rPr lang="en-US" smtClean="0"/>
-              <a:t>12/11/18</a:t>
+              <a:t>12/12/18</a:t>
             </a:fld>
             <a:endParaRPr lang="en-US"/>
           </a:p>
@@ -2465,7 +2473,7 @@
           <a:p>
             <a:fld id="{677919A6-33EB-49BD-A62F-1FA56B9F9712}" type="datetimeFigureOut">
               <a:rPr lang="en-US" smtClean="0"/>
-              <a:t>12/11/18</a:t>
+              <a:t>12/12/18</a:t>
             </a:fld>
             <a:endParaRPr lang="en-US"/>
           </a:p>
@@ -2582,7 +2590,7 @@
           <a:p>
             <a:fld id="{CA4E7D1B-D673-4CF6-8672-009D42ABD2A0}" type="datetimeFigureOut">
               <a:rPr lang="en-US" smtClean="0"/>
-              <a:t>12/11/18</a:t>
+              <a:t>12/12/18</a:t>
             </a:fld>
             <a:endParaRPr lang="en-US"/>
           </a:p>
@@ -2940,7 +2948,7 @@
           <a:p>
             <a:fld id="{DA16AA21-1863-4931-97CB-99D0A168701B}" type="datetimeFigureOut">
               <a:rPr lang="en-US" smtClean="0"/>
-              <a:t>12/11/18</a:t>
+              <a:t>12/12/18</a:t>
             </a:fld>
             <a:endParaRPr lang="en-US"/>
           </a:p>
@@ -3447,7 +3455,7 @@
           <a:p>
             <a:fld id="{3772C379-9A7C-4C87-A116-CBE9F58B04C5}" type="datetimeFigureOut">
               <a:rPr lang="en-US" smtClean="0"/>
-              <a:t>12/11/18</a:t>
+              <a:t>12/12/18</a:t>
             </a:fld>
             <a:endParaRPr lang="en-US"/>
           </a:p>
@@ -3802,7 +3810,7 @@
           <a:p>
             <a:fld id="{8664C608-40B1-4030-A28D-5B74BC98ADCE}" type="datetimeFigureOut">
               <a:rPr lang="en-US" smtClean="0"/>
-              <a:t>12/11/18</a:t>
+              <a:t>12/12/18</a:t>
             </a:fld>
             <a:endParaRPr lang="en-US" dirty="0"/>
           </a:p>
@@ -4651,6 +4659,326 @@
 </p:sld>
 </file>
 
+<file path=ppt/slides/slide10.xml><?xml version="1.0" encoding="utf-8"?>
+<p:sld xmlns:a="http://schemas.openxmlformats.org/drawingml/2006/main" xmlns:r="http://schemas.openxmlformats.org/officeDocument/2006/relationships" xmlns:p="http://schemas.openxmlformats.org/presentationml/2006/main">
+  <p:cSld>
+    <p:spTree>
+      <p:nvGrpSpPr>
+        <p:cNvPr id="1" name=""/>
+        <p:cNvGrpSpPr/>
+        <p:nvPr/>
+      </p:nvGrpSpPr>
+      <p:grpSpPr>
+        <a:xfrm>
+          <a:off x="0" y="0"/>
+          <a:ext cx="0" cy="0"/>
+          <a:chOff x="0" y="0"/>
+          <a:chExt cx="0" cy="0"/>
+        </a:xfrm>
+      </p:grpSpPr>
+      <p:sp>
+        <p:nvSpPr>
+          <p:cNvPr id="2" name="Title 1">
+            <a:extLst>
+              <a:ext uri="{FF2B5EF4-FFF2-40B4-BE49-F238E27FC236}">
+                <a16:creationId xmlns:a16="http://schemas.microsoft.com/office/drawing/2014/main" id="{5E4840F9-A2CA-B94E-89E0-41348C5F0EF5}"/>
+              </a:ext>
+            </a:extLst>
+          </p:cNvPr>
+          <p:cNvSpPr>
+            <a:spLocks noGrp="1"/>
+          </p:cNvSpPr>
+          <p:nvPr>
+            <p:ph type="title"/>
+          </p:nvPr>
+        </p:nvSpPr>
+        <p:spPr/>
+        <p:txBody>
+          <a:bodyPr/>
+          <a:lstStyle/>
+          <a:p>
+            <a:r>
+              <a:rPr lang="en-US" dirty="0"/>
+              <a:t>Problem set design</a:t>
+            </a:r>
+          </a:p>
+        </p:txBody>
+      </p:sp>
+      <p:sp>
+        <p:nvSpPr>
+          <p:cNvPr id="3" name="Content Placeholder 2">
+            <a:extLst>
+              <a:ext uri="{FF2B5EF4-FFF2-40B4-BE49-F238E27FC236}">
+                <a16:creationId xmlns:a16="http://schemas.microsoft.com/office/drawing/2014/main" id="{25A20195-AD7A-BF41-B9A7-2AEA2EA1601B}"/>
+              </a:ext>
+            </a:extLst>
+          </p:cNvPr>
+          <p:cNvSpPr>
+            <a:spLocks noGrp="1"/>
+          </p:cNvSpPr>
+          <p:nvPr>
+            <p:ph idx="1"/>
+          </p:nvPr>
+        </p:nvSpPr>
+        <p:spPr/>
+        <p:txBody>
+          <a:bodyPr>
+            <a:normAutofit/>
+          </a:bodyPr>
+          <a:lstStyle/>
+          <a:p>
+            <a:r>
+              <a:rPr lang="en-US" b="1" dirty="0"/>
+              <a:t>Objective</a:t>
+            </a:r>
+            <a:r>
+              <a:rPr lang="en-US" dirty="0"/>
+              <a:t>: Demonstrate the value-add of </a:t>
+            </a:r>
+            <a:r>
+              <a:rPr lang="en-US" dirty="0" err="1"/>
+              <a:t>Dask</a:t>
+            </a:r>
+            <a:r>
+              <a:rPr lang="en-US" dirty="0"/>
+              <a:t> by translating Pandas code.</a:t>
+            </a:r>
+          </a:p>
+          <a:p>
+            <a:r>
+              <a:rPr lang="en-US" b="1" dirty="0"/>
+              <a:t>Part III</a:t>
+            </a:r>
+            <a:r>
+              <a:rPr lang="en-US" dirty="0"/>
+              <a:t>:</a:t>
+            </a:r>
+          </a:p>
+          <a:p>
+            <a:pPr lvl="1"/>
+            <a:r>
+              <a:rPr lang="en-US" dirty="0"/>
+              <a:t>Find Distance</a:t>
+            </a:r>
+          </a:p>
+          <a:p>
+            <a:pPr lvl="2"/>
+            <a:r>
+              <a:rPr lang="en-US" dirty="0"/>
+              <a:t>Using </a:t>
+            </a:r>
+            <a:r>
+              <a:rPr lang="en-US" dirty="0" err="1"/>
+              <a:t>Dask</a:t>
+            </a:r>
+            <a:r>
+              <a:rPr lang="en-US" dirty="0"/>
+              <a:t> </a:t>
+            </a:r>
+            <a:r>
+              <a:rPr lang="en-US" dirty="0" err="1"/>
+              <a:t>Dataframe</a:t>
+            </a:r>
+            <a:r>
+              <a:rPr lang="en-US" dirty="0"/>
+              <a:t> and </a:t>
+            </a:r>
+            <a:r>
+              <a:rPr lang="en-US" dirty="0" err="1"/>
+              <a:t>Dask</a:t>
+            </a:r>
+            <a:r>
+              <a:rPr lang="en-US" dirty="0"/>
+              <a:t> Delayed, for each Yelp Review text, find the “most similar” review and extract its star value</a:t>
+            </a:r>
+          </a:p>
+          <a:p>
+            <a:pPr lvl="2"/>
+            <a:r>
+              <a:rPr lang="en-US" dirty="0"/>
+              <a:t>Calculate the MSE of star value vs. ”similar review” star value, using </a:t>
+            </a:r>
+            <a:r>
+              <a:rPr lang="en-US" dirty="0" err="1"/>
+              <a:t>Dask</a:t>
+            </a:r>
+            <a:r>
+              <a:rPr lang="en-US" dirty="0"/>
+              <a:t> Delayed</a:t>
+            </a:r>
+          </a:p>
+        </p:txBody>
+      </p:sp>
+    </p:spTree>
+    <p:extLst>
+      <p:ext uri="{BB962C8B-B14F-4D97-AF65-F5344CB8AC3E}">
+        <p14:creationId xmlns:p14="http://schemas.microsoft.com/office/powerpoint/2010/main" val="2627604873"/>
+      </p:ext>
+    </p:extLst>
+  </p:cSld>
+  <p:clrMapOvr>
+    <a:masterClrMapping/>
+  </p:clrMapOvr>
+</p:sld>
+</file>
+
+<file path=ppt/slides/slide11.xml><?xml version="1.0" encoding="utf-8"?>
+<p:sld xmlns:a="http://schemas.openxmlformats.org/drawingml/2006/main" xmlns:r="http://schemas.openxmlformats.org/officeDocument/2006/relationships" xmlns:p="http://schemas.openxmlformats.org/presentationml/2006/main">
+  <p:cSld>
+    <p:spTree>
+      <p:nvGrpSpPr>
+        <p:cNvPr id="1" name=""/>
+        <p:cNvGrpSpPr/>
+        <p:nvPr/>
+      </p:nvGrpSpPr>
+      <p:grpSpPr>
+        <a:xfrm>
+          <a:off x="0" y="0"/>
+          <a:ext cx="0" cy="0"/>
+          <a:chOff x="0" y="0"/>
+          <a:chExt cx="0" cy="0"/>
+        </a:xfrm>
+      </p:grpSpPr>
+      <p:sp>
+        <p:nvSpPr>
+          <p:cNvPr id="2" name="Title 1">
+            <a:extLst>
+              <a:ext uri="{FF2B5EF4-FFF2-40B4-BE49-F238E27FC236}">
+                <a16:creationId xmlns:a16="http://schemas.microsoft.com/office/drawing/2014/main" id="{5E4840F9-A2CA-B94E-89E0-41348C5F0EF5}"/>
+              </a:ext>
+            </a:extLst>
+          </p:cNvPr>
+          <p:cNvSpPr>
+            <a:spLocks noGrp="1"/>
+          </p:cNvSpPr>
+          <p:nvPr>
+            <p:ph type="title"/>
+          </p:nvPr>
+        </p:nvSpPr>
+        <p:spPr/>
+        <p:txBody>
+          <a:bodyPr/>
+          <a:lstStyle/>
+          <a:p>
+            <a:r>
+              <a:rPr lang="en-US" dirty="0"/>
+              <a:t>Lessons learned</a:t>
+            </a:r>
+          </a:p>
+        </p:txBody>
+      </p:sp>
+      <p:sp>
+        <p:nvSpPr>
+          <p:cNvPr id="3" name="Content Placeholder 2">
+            <a:extLst>
+              <a:ext uri="{FF2B5EF4-FFF2-40B4-BE49-F238E27FC236}">
+                <a16:creationId xmlns:a16="http://schemas.microsoft.com/office/drawing/2014/main" id="{25A20195-AD7A-BF41-B9A7-2AEA2EA1601B}"/>
+              </a:ext>
+            </a:extLst>
+          </p:cNvPr>
+          <p:cNvSpPr>
+            <a:spLocks noGrp="1"/>
+          </p:cNvSpPr>
+          <p:nvPr>
+            <p:ph idx="1"/>
+          </p:nvPr>
+        </p:nvSpPr>
+        <p:spPr/>
+        <p:txBody>
+          <a:bodyPr>
+            <a:normAutofit/>
+          </a:bodyPr>
+          <a:lstStyle/>
+          <a:p>
+            <a:r>
+              <a:rPr lang="en-US" dirty="0" err="1"/>
+              <a:t>Dask</a:t>
+            </a:r>
+            <a:r>
+              <a:rPr lang="en-US" dirty="0"/>
+              <a:t> is really fast and efficient!</a:t>
+            </a:r>
+          </a:p>
+          <a:p>
+            <a:r>
+              <a:rPr lang="en-US" dirty="0"/>
+              <a:t>Syntax is very similar to Pandas with some exceptions </a:t>
+            </a:r>
+          </a:p>
+          <a:p>
+            <a:pPr lvl="1"/>
+            <a:r>
+              <a:rPr lang="en-US" dirty="0"/>
+              <a:t>Struggled with custom functions in a .</a:t>
+            </a:r>
+            <a:r>
+              <a:rPr lang="en-US" dirty="0" err="1"/>
+              <a:t>groupby</a:t>
+            </a:r>
+            <a:r>
+              <a:rPr lang="en-US" dirty="0"/>
+              <a:t>().</a:t>
+            </a:r>
+            <a:r>
+              <a:rPr lang="en-US" dirty="0" err="1"/>
+              <a:t>agg</a:t>
+            </a:r>
+            <a:r>
+              <a:rPr lang="en-US" dirty="0"/>
+              <a:t>()</a:t>
+            </a:r>
+          </a:p>
+          <a:p>
+            <a:pPr lvl="1"/>
+            <a:r>
+              <a:rPr lang="en-US" dirty="0"/>
+              <a:t>Struggled with filtering </a:t>
+            </a:r>
+            <a:r>
+              <a:rPr lang="en-US" dirty="0" err="1"/>
+              <a:t>dataframe</a:t>
+            </a:r>
+            <a:r>
+              <a:rPr lang="en-US" dirty="0"/>
+              <a:t> by index</a:t>
+            </a:r>
+          </a:p>
+          <a:p>
+            <a:r>
+              <a:rPr lang="en-US" dirty="0"/>
+              <a:t>There may be things that </a:t>
+            </a:r>
+            <a:r>
+              <a:rPr lang="en-US" dirty="0" err="1"/>
+              <a:t>Dask</a:t>
+            </a:r>
+            <a:r>
+              <a:rPr lang="en-US" dirty="0"/>
+              <a:t> is worse at – or that I just did not discover successfully</a:t>
+            </a:r>
+          </a:p>
+          <a:p>
+            <a:pPr lvl="1"/>
+            <a:r>
+              <a:rPr lang="en-US" dirty="0"/>
+              <a:t>Random resampling </a:t>
+            </a:r>
+          </a:p>
+        </p:txBody>
+      </p:sp>
+    </p:spTree>
+    <p:extLst>
+      <p:ext uri="{BB962C8B-B14F-4D97-AF65-F5344CB8AC3E}">
+        <p14:creationId xmlns:p14="http://schemas.microsoft.com/office/powerpoint/2010/main" val="3754097124"/>
+      </p:ext>
+    </p:extLst>
+  </p:cSld>
+  <p:clrMapOvr>
+    <a:masterClrMapping/>
+  </p:clrMapOvr>
+</p:sld>
+</file>
+
 <file path=ppt/slides/slide2.xml><?xml version="1.0" encoding="utf-8"?>
 <p:sld xmlns:a="http://schemas.openxmlformats.org/drawingml/2006/main" xmlns:r="http://schemas.openxmlformats.org/officeDocument/2006/relationships" xmlns:p="http://schemas.openxmlformats.org/presentationml/2006/main">
   <p:cSld>
@@ -4864,7 +5192,7 @@
             </a:pPr>
             <a:r>
               <a:rPr lang="en-US" dirty="0"/>
-              <a:t>100,000 Rows</a:t>
+              <a:t>1,000,000 Rows</a:t>
             </a:r>
           </a:p>
           <a:p>
@@ -4906,6 +5234,1678 @@
     <p:extLst>
       <p:ext uri="{BB962C8B-B14F-4D97-AF65-F5344CB8AC3E}">
         <p14:creationId xmlns:p14="http://schemas.microsoft.com/office/powerpoint/2010/main" val="3567882788"/>
+      </p:ext>
+    </p:extLst>
+  </p:cSld>
+  <p:clrMapOvr>
+    <a:masterClrMapping/>
+  </p:clrMapOvr>
+</p:sld>
+</file>
+
+<file path=ppt/slides/slide4.xml><?xml version="1.0" encoding="utf-8"?>
+<p:sld xmlns:a="http://schemas.openxmlformats.org/drawingml/2006/main" xmlns:r="http://schemas.openxmlformats.org/officeDocument/2006/relationships" xmlns:p="http://schemas.openxmlformats.org/presentationml/2006/main">
+  <p:cSld>
+    <p:spTree>
+      <p:nvGrpSpPr>
+        <p:cNvPr id="1" name=""/>
+        <p:cNvGrpSpPr/>
+        <p:nvPr/>
+      </p:nvGrpSpPr>
+      <p:grpSpPr>
+        <a:xfrm>
+          <a:off x="0" y="0"/>
+          <a:ext cx="0" cy="0"/>
+          <a:chOff x="0" y="0"/>
+          <a:chExt cx="0" cy="0"/>
+        </a:xfrm>
+      </p:grpSpPr>
+      <p:sp>
+        <p:nvSpPr>
+          <p:cNvPr id="2" name="Title 1">
+            <a:extLst>
+              <a:ext uri="{FF2B5EF4-FFF2-40B4-BE49-F238E27FC236}">
+                <a16:creationId xmlns:a16="http://schemas.microsoft.com/office/drawing/2014/main" id="{5E4840F9-A2CA-B94E-89E0-41348C5F0EF5}"/>
+              </a:ext>
+            </a:extLst>
+          </p:cNvPr>
+          <p:cNvSpPr>
+            <a:spLocks noGrp="1"/>
+          </p:cNvSpPr>
+          <p:nvPr>
+            <p:ph type="title"/>
+          </p:nvPr>
+        </p:nvSpPr>
+        <p:spPr/>
+        <p:txBody>
+          <a:bodyPr/>
+          <a:lstStyle/>
+          <a:p>
+            <a:r>
+              <a:rPr lang="en-US" dirty="0"/>
+              <a:t>Problem set design</a:t>
+            </a:r>
+          </a:p>
+        </p:txBody>
+      </p:sp>
+      <p:sp>
+        <p:nvSpPr>
+          <p:cNvPr id="3" name="Content Placeholder 2">
+            <a:extLst>
+              <a:ext uri="{FF2B5EF4-FFF2-40B4-BE49-F238E27FC236}">
+                <a16:creationId xmlns:a16="http://schemas.microsoft.com/office/drawing/2014/main" id="{25A20195-AD7A-BF41-B9A7-2AEA2EA1601B}"/>
+              </a:ext>
+            </a:extLst>
+          </p:cNvPr>
+          <p:cNvSpPr>
+            <a:spLocks noGrp="1"/>
+          </p:cNvSpPr>
+          <p:nvPr>
+            <p:ph idx="1"/>
+          </p:nvPr>
+        </p:nvSpPr>
+        <p:spPr/>
+        <p:txBody>
+          <a:bodyPr>
+            <a:normAutofit/>
+          </a:bodyPr>
+          <a:lstStyle/>
+          <a:p>
+            <a:r>
+              <a:rPr lang="en-US" b="1" dirty="0"/>
+              <a:t>Objective</a:t>
+            </a:r>
+            <a:r>
+              <a:rPr lang="en-US" dirty="0"/>
+              <a:t>: Demonstrate the value-add of </a:t>
+            </a:r>
+            <a:r>
+              <a:rPr lang="en-US" dirty="0" err="1"/>
+              <a:t>Dask</a:t>
+            </a:r>
+            <a:r>
+              <a:rPr lang="en-US" dirty="0"/>
+              <a:t> by translating Pandas code.</a:t>
+            </a:r>
+          </a:p>
+          <a:p>
+            <a:r>
+              <a:rPr lang="en-US" b="1" dirty="0"/>
+              <a:t>Part I</a:t>
+            </a:r>
+            <a:r>
+              <a:rPr lang="en-US" dirty="0"/>
+              <a:t>:</a:t>
+            </a:r>
+          </a:p>
+          <a:p>
+            <a:pPr lvl="1"/>
+            <a:r>
+              <a:rPr lang="en-US" dirty="0"/>
+              <a:t>Clone </a:t>
+            </a:r>
+            <a:r>
+              <a:rPr lang="en-US" dirty="0" err="1"/>
+              <a:t>Pset</a:t>
+            </a:r>
+            <a:r>
+              <a:rPr lang="en-US" dirty="0"/>
+              <a:t> 2:  word embeddings &amp; neighbors using demographic survey data</a:t>
+            </a:r>
+          </a:p>
+          <a:p>
+            <a:pPr lvl="2"/>
+            <a:r>
+              <a:rPr lang="en-US" dirty="0"/>
+              <a:t>Yelp Review dataset instead of Demographic Survey</a:t>
+            </a:r>
+          </a:p>
+          <a:p>
+            <a:pPr lvl="2"/>
+            <a:r>
+              <a:rPr lang="en-US" dirty="0"/>
+              <a:t>Repurpose code to use </a:t>
+            </a:r>
+            <a:r>
+              <a:rPr lang="en-US" dirty="0" err="1"/>
+              <a:t>Dask</a:t>
+            </a:r>
+            <a:r>
+              <a:rPr lang="en-US" dirty="0"/>
+              <a:t> </a:t>
+            </a:r>
+            <a:r>
+              <a:rPr lang="en-US" dirty="0" err="1"/>
+              <a:t>Dataframes</a:t>
+            </a:r>
+            <a:r>
+              <a:rPr lang="en-US" dirty="0"/>
+              <a:t> &amp; compare time spent</a:t>
+            </a:r>
+          </a:p>
+          <a:p>
+            <a:pPr lvl="2"/>
+            <a:r>
+              <a:rPr lang="en-US" dirty="0"/>
+              <a:t>Run </a:t>
+            </a:r>
+            <a:r>
+              <a:rPr lang="en-US" dirty="0" err="1"/>
+              <a:t>WordEmbedding</a:t>
+            </a:r>
+            <a:r>
+              <a:rPr lang="en-US" dirty="0"/>
+              <a:t> using </a:t>
+            </a:r>
+            <a:r>
+              <a:rPr lang="en-US" dirty="0" err="1"/>
+              <a:t>Dask</a:t>
+            </a:r>
+            <a:r>
+              <a:rPr lang="en-US" dirty="0"/>
+              <a:t> Delayed &amp; compare time spent</a:t>
+            </a:r>
+          </a:p>
+          <a:p>
+            <a:pPr lvl="2"/>
+            <a:r>
+              <a:rPr lang="en-US" dirty="0"/>
+              <a:t>Visualize the </a:t>
+            </a:r>
+            <a:r>
+              <a:rPr lang="en-US" dirty="0" err="1"/>
+              <a:t>Dask</a:t>
+            </a:r>
+            <a:r>
+              <a:rPr lang="en-US" dirty="0"/>
+              <a:t> computation graph</a:t>
+            </a:r>
+          </a:p>
+        </p:txBody>
+      </p:sp>
+    </p:spTree>
+    <p:extLst>
+      <p:ext uri="{BB962C8B-B14F-4D97-AF65-F5344CB8AC3E}">
+        <p14:creationId xmlns:p14="http://schemas.microsoft.com/office/powerpoint/2010/main" val="179330974"/>
+      </p:ext>
+    </p:extLst>
+  </p:cSld>
+  <p:clrMapOvr>
+    <a:masterClrMapping/>
+  </p:clrMapOvr>
+</p:sld>
+</file>
+
+<file path=ppt/slides/slide5.xml><?xml version="1.0" encoding="utf-8"?>
+<p:sld xmlns:a="http://schemas.openxmlformats.org/drawingml/2006/main" xmlns:r="http://schemas.openxmlformats.org/officeDocument/2006/relationships" xmlns:p="http://schemas.openxmlformats.org/presentationml/2006/main">
+  <p:cSld>
+    <p:spTree>
+      <p:nvGrpSpPr>
+        <p:cNvPr id="1" name=""/>
+        <p:cNvGrpSpPr/>
+        <p:nvPr/>
+      </p:nvGrpSpPr>
+      <p:grpSpPr>
+        <a:xfrm>
+          <a:off x="0" y="0"/>
+          <a:ext cx="0" cy="0"/>
+          <a:chOff x="0" y="0"/>
+          <a:chExt cx="0" cy="0"/>
+        </a:xfrm>
+      </p:grpSpPr>
+      <p:pic>
+        <p:nvPicPr>
+          <p:cNvPr id="9" name="Picture 8">
+            <a:extLst>
+              <a:ext uri="{FF2B5EF4-FFF2-40B4-BE49-F238E27FC236}">
+                <a16:creationId xmlns:a16="http://schemas.microsoft.com/office/drawing/2014/main" id="{3FA09E8B-1D51-104D-8179-143F7D2C9157}"/>
+              </a:ext>
+            </a:extLst>
+          </p:cNvPr>
+          <p:cNvPicPr>
+            <a:picLocks noChangeAspect="1"/>
+          </p:cNvPicPr>
+          <p:nvPr/>
+        </p:nvPicPr>
+        <p:blipFill>
+          <a:blip r:embed="rId2">
+            <a:extLst>
+              <a:ext uri="{28A0092B-C50C-407E-A947-70E740481C1C}">
+                <a14:useLocalDpi xmlns:a14="http://schemas.microsoft.com/office/drawing/2010/main" val="0"/>
+              </a:ext>
+            </a:extLst>
+          </a:blip>
+          <a:stretch>
+            <a:fillRect/>
+          </a:stretch>
+        </p:blipFill>
+        <p:spPr>
+          <a:xfrm>
+            <a:off x="437598" y="1498049"/>
+            <a:ext cx="5194300" cy="3644900"/>
+          </a:xfrm>
+          <a:prstGeom prst="rect">
+            <a:avLst/>
+          </a:prstGeom>
+        </p:spPr>
+      </p:pic>
+      <p:pic>
+        <p:nvPicPr>
+          <p:cNvPr id="11" name="Picture 10">
+            <a:extLst>
+              <a:ext uri="{FF2B5EF4-FFF2-40B4-BE49-F238E27FC236}">
+                <a16:creationId xmlns:a16="http://schemas.microsoft.com/office/drawing/2014/main" id="{D9BA2D9B-711F-674F-AF72-E5D6A3045D1C}"/>
+              </a:ext>
+            </a:extLst>
+          </p:cNvPr>
+          <p:cNvPicPr>
+            <a:picLocks noChangeAspect="1"/>
+          </p:cNvPicPr>
+          <p:nvPr/>
+        </p:nvPicPr>
+        <p:blipFill>
+          <a:blip r:embed="rId3">
+            <a:extLst>
+              <a:ext uri="{28A0092B-C50C-407E-A947-70E740481C1C}">
+                <a14:useLocalDpi xmlns:a14="http://schemas.microsoft.com/office/drawing/2010/main" val="0"/>
+              </a:ext>
+            </a:extLst>
+          </a:blip>
+          <a:stretch>
+            <a:fillRect/>
+          </a:stretch>
+        </p:blipFill>
+        <p:spPr>
+          <a:xfrm>
+            <a:off x="6099048" y="1450009"/>
+            <a:ext cx="5232400" cy="4064000"/>
+          </a:xfrm>
+          <a:prstGeom prst="rect">
+            <a:avLst/>
+          </a:prstGeom>
+        </p:spPr>
+      </p:pic>
+      <p:sp>
+        <p:nvSpPr>
+          <p:cNvPr id="12" name="TextBox 11">
+            <a:extLst>
+              <a:ext uri="{FF2B5EF4-FFF2-40B4-BE49-F238E27FC236}">
+                <a16:creationId xmlns:a16="http://schemas.microsoft.com/office/drawing/2014/main" id="{6F6D9EF3-57E0-0349-8E8E-76551273C6B0}"/>
+              </a:ext>
+            </a:extLst>
+          </p:cNvPr>
+          <p:cNvSpPr txBox="1"/>
+          <p:nvPr/>
+        </p:nvSpPr>
+        <p:spPr>
+          <a:xfrm>
+            <a:off x="437598" y="1048994"/>
+            <a:ext cx="1009956" cy="369332"/>
+          </a:xfrm>
+          <a:prstGeom prst="rect">
+            <a:avLst/>
+          </a:prstGeom>
+          <a:noFill/>
+        </p:spPr>
+        <p:txBody>
+          <a:bodyPr wrap="none" rtlCol="0">
+            <a:spAutoFit/>
+          </a:bodyPr>
+          <a:lstStyle/>
+          <a:p>
+            <a:r>
+              <a:rPr lang="en-US" b="1" dirty="0"/>
+              <a:t>Pandas</a:t>
+            </a:r>
+          </a:p>
+        </p:txBody>
+      </p:sp>
+      <p:sp>
+        <p:nvSpPr>
+          <p:cNvPr id="13" name="TextBox 12">
+            <a:extLst>
+              <a:ext uri="{FF2B5EF4-FFF2-40B4-BE49-F238E27FC236}">
+                <a16:creationId xmlns:a16="http://schemas.microsoft.com/office/drawing/2014/main" id="{5EE22F68-6FA1-3046-9C97-D0099CD4DD6C}"/>
+              </a:ext>
+            </a:extLst>
+          </p:cNvPr>
+          <p:cNvSpPr txBox="1"/>
+          <p:nvPr/>
+        </p:nvSpPr>
+        <p:spPr>
+          <a:xfrm>
+            <a:off x="6099048" y="1010966"/>
+            <a:ext cx="769763" cy="369332"/>
+          </a:xfrm>
+          <a:prstGeom prst="rect">
+            <a:avLst/>
+          </a:prstGeom>
+          <a:noFill/>
+        </p:spPr>
+        <p:txBody>
+          <a:bodyPr wrap="none" rtlCol="0">
+            <a:spAutoFit/>
+          </a:bodyPr>
+          <a:lstStyle/>
+          <a:p>
+            <a:r>
+              <a:rPr lang="en-US" b="1" dirty="0" err="1"/>
+              <a:t>Dask</a:t>
+            </a:r>
+            <a:endParaRPr lang="en-US" b="1" dirty="0"/>
+          </a:p>
+        </p:txBody>
+      </p:sp>
+    </p:spTree>
+    <p:extLst>
+      <p:ext uri="{BB962C8B-B14F-4D97-AF65-F5344CB8AC3E}">
+        <p14:creationId xmlns:p14="http://schemas.microsoft.com/office/powerpoint/2010/main" val="2755147023"/>
+      </p:ext>
+    </p:extLst>
+  </p:cSld>
+  <p:clrMapOvr>
+    <a:masterClrMapping/>
+  </p:clrMapOvr>
+</p:sld>
+</file>
+
+<file path=ppt/slides/slide6.xml><?xml version="1.0" encoding="utf-8"?>
+<p:sld xmlns:a="http://schemas.openxmlformats.org/drawingml/2006/main" xmlns:r="http://schemas.openxmlformats.org/officeDocument/2006/relationships" xmlns:p="http://schemas.openxmlformats.org/presentationml/2006/main">
+  <p:cSld>
+    <p:spTree>
+      <p:nvGrpSpPr>
+        <p:cNvPr id="1" name=""/>
+        <p:cNvGrpSpPr/>
+        <p:nvPr/>
+      </p:nvGrpSpPr>
+      <p:grpSpPr>
+        <a:xfrm>
+          <a:off x="0" y="0"/>
+          <a:ext cx="0" cy="0"/>
+          <a:chOff x="0" y="0"/>
+          <a:chExt cx="0" cy="0"/>
+        </a:xfrm>
+      </p:grpSpPr>
+      <p:sp>
+        <p:nvSpPr>
+          <p:cNvPr id="2" name="Title 1">
+            <a:extLst>
+              <a:ext uri="{FF2B5EF4-FFF2-40B4-BE49-F238E27FC236}">
+                <a16:creationId xmlns:a16="http://schemas.microsoft.com/office/drawing/2014/main" id="{CF2450B0-B0BE-7D40-AAD1-85278E85080B}"/>
+              </a:ext>
+            </a:extLst>
+          </p:cNvPr>
+          <p:cNvSpPr>
+            <a:spLocks noGrp="1"/>
+          </p:cNvSpPr>
+          <p:nvPr>
+            <p:ph type="title"/>
+          </p:nvPr>
+        </p:nvSpPr>
+        <p:spPr/>
+        <p:txBody>
+          <a:bodyPr/>
+          <a:lstStyle/>
+          <a:p>
+            <a:r>
+              <a:rPr lang="en-US" dirty="0"/>
+              <a:t>Results</a:t>
+            </a:r>
+          </a:p>
+        </p:txBody>
+      </p:sp>
+      <p:grpSp>
+        <p:nvGrpSpPr>
+          <p:cNvPr id="3" name="Group 2">
+            <a:extLst>
+              <a:ext uri="{FF2B5EF4-FFF2-40B4-BE49-F238E27FC236}">
+                <a16:creationId xmlns:a16="http://schemas.microsoft.com/office/drawing/2014/main" id="{665E9489-B827-6B46-B720-F9483EB23E24}"/>
+              </a:ext>
+            </a:extLst>
+          </p:cNvPr>
+          <p:cNvGrpSpPr/>
+          <p:nvPr/>
+        </p:nvGrpSpPr>
+        <p:grpSpPr>
+          <a:xfrm>
+            <a:off x="1970433" y="2655405"/>
+            <a:ext cx="8039100" cy="1918253"/>
+            <a:chOff x="2076450" y="1409700"/>
+            <a:chExt cx="8039100" cy="1918253"/>
+          </a:xfrm>
+        </p:grpSpPr>
+        <p:pic>
+          <p:nvPicPr>
+            <p:cNvPr id="4" name="Picture 3">
+              <a:extLst>
+                <a:ext uri="{FF2B5EF4-FFF2-40B4-BE49-F238E27FC236}">
+                  <a16:creationId xmlns:a16="http://schemas.microsoft.com/office/drawing/2014/main" id="{D61A4037-98B3-A046-9645-E6F1D7B0CF05}"/>
+                </a:ext>
+              </a:extLst>
+            </p:cNvPr>
+            <p:cNvPicPr>
+              <a:picLocks noChangeAspect="1"/>
+            </p:cNvPicPr>
+            <p:nvPr/>
+          </p:nvPicPr>
+          <p:blipFill rotWithShape="1">
+            <a:blip r:embed="rId2">
+              <a:extLst>
+                <a:ext uri="{28A0092B-C50C-407E-A947-70E740481C1C}">
+                  <a14:useLocalDpi xmlns:a14="http://schemas.microsoft.com/office/drawing/2010/main" val="0"/>
+                </a:ext>
+              </a:extLst>
+            </a:blip>
+            <a:srcRect b="72559"/>
+            <a:stretch/>
+          </p:blipFill>
+          <p:spPr>
+            <a:xfrm>
+              <a:off x="2076450" y="1409700"/>
+              <a:ext cx="8039100" cy="1108213"/>
+            </a:xfrm>
+            <a:prstGeom prst="rect">
+              <a:avLst/>
+            </a:prstGeom>
+          </p:spPr>
+        </p:pic>
+        <p:pic>
+          <p:nvPicPr>
+            <p:cNvPr id="5" name="Picture 4">
+              <a:extLst>
+                <a:ext uri="{FF2B5EF4-FFF2-40B4-BE49-F238E27FC236}">
+                  <a16:creationId xmlns:a16="http://schemas.microsoft.com/office/drawing/2014/main" id="{21472C34-B4EC-F343-BC57-73B8D4DC543C}"/>
+                </a:ext>
+              </a:extLst>
+            </p:cNvPr>
+            <p:cNvPicPr>
+              <a:picLocks noChangeAspect="1"/>
+            </p:cNvPicPr>
+            <p:nvPr/>
+          </p:nvPicPr>
+          <p:blipFill rotWithShape="1">
+            <a:blip r:embed="rId2">
+              <a:extLst>
+                <a:ext uri="{28A0092B-C50C-407E-A947-70E740481C1C}">
+                  <a14:useLocalDpi xmlns:a14="http://schemas.microsoft.com/office/drawing/2010/main" val="0"/>
+                </a:ext>
+              </a:extLst>
+            </a:blip>
+            <a:srcRect t="79286"/>
+            <a:stretch/>
+          </p:blipFill>
+          <p:spPr>
+            <a:xfrm>
+              <a:off x="2076450" y="2491410"/>
+              <a:ext cx="8039100" cy="836543"/>
+            </a:xfrm>
+            <a:prstGeom prst="rect">
+              <a:avLst/>
+            </a:prstGeom>
+          </p:spPr>
+        </p:pic>
+      </p:grpSp>
+      <p:sp>
+        <p:nvSpPr>
+          <p:cNvPr id="6" name="Text Placeholder 1">
+            <a:extLst>
+              <a:ext uri="{FF2B5EF4-FFF2-40B4-BE49-F238E27FC236}">
+                <a16:creationId xmlns:a16="http://schemas.microsoft.com/office/drawing/2014/main" id="{FF0D8849-C427-5448-8F48-7D3361184E7B}"/>
+              </a:ext>
+            </a:extLst>
+          </p:cNvPr>
+          <p:cNvSpPr txBox="1">
+            <a:spLocks/>
+          </p:cNvSpPr>
+          <p:nvPr/>
+        </p:nvSpPr>
+        <p:spPr>
+          <a:xfrm>
+            <a:off x="1069848" y="1734611"/>
+            <a:ext cx="4754880" cy="640080"/>
+          </a:xfrm>
+          <a:prstGeom prst="rect">
+            <a:avLst/>
+          </a:prstGeom>
+        </p:spPr>
+        <p:txBody>
+          <a:bodyPr/>
+          <a:lstStyle>
+            <a:lvl1pPr marL="182880" indent="-182880" algn="l" defTabSz="914400" rtl="0" eaLnBrk="1" latinLnBrk="0" hangingPunct="1">
+              <a:lnSpc>
+                <a:spcPct val="90000"/>
+              </a:lnSpc>
+              <a:spcBef>
+                <a:spcPts val="1200"/>
+              </a:spcBef>
+              <a:buClr>
+                <a:schemeClr val="accent1">
+                  <a:lumMod val="75000"/>
+                </a:schemeClr>
+              </a:buClr>
+              <a:buSzPct val="85000"/>
+              <a:buFont typeface="Wingdings" pitchFamily="2" charset="2"/>
+              <a:buChar char="§"/>
+              <a:defRPr sz="2000" kern="1200">
+                <a:solidFill>
+                  <a:schemeClr val="tx1"/>
+                </a:solidFill>
+                <a:latin typeface="+mn-lt"/>
+                <a:ea typeface="+mn-ea"/>
+                <a:cs typeface="+mn-cs"/>
+              </a:defRPr>
+            </a:lvl1pPr>
+            <a:lvl2pPr marL="457200" indent="-182880" algn="l" defTabSz="914400" rtl="0" eaLnBrk="1" latinLnBrk="0" hangingPunct="1">
+              <a:lnSpc>
+                <a:spcPct val="90000"/>
+              </a:lnSpc>
+              <a:spcBef>
+                <a:spcPts val="400"/>
+              </a:spcBef>
+              <a:spcAft>
+                <a:spcPts val="200"/>
+              </a:spcAft>
+              <a:buClr>
+                <a:schemeClr val="accent1">
+                  <a:lumMod val="75000"/>
+                </a:schemeClr>
+              </a:buClr>
+              <a:buSzPct val="85000"/>
+              <a:buFont typeface="Wingdings" pitchFamily="2" charset="2"/>
+              <a:buChar char="§"/>
+              <a:defRPr sz="1800" kern="1200">
+                <a:solidFill>
+                  <a:schemeClr val="tx1"/>
+                </a:solidFill>
+                <a:latin typeface="+mn-lt"/>
+                <a:ea typeface="+mn-ea"/>
+                <a:cs typeface="+mn-cs"/>
+              </a:defRPr>
+            </a:lvl2pPr>
+            <a:lvl3pPr marL="731520" indent="-182880" algn="l" defTabSz="914400" rtl="0" eaLnBrk="1" latinLnBrk="0" hangingPunct="1">
+              <a:lnSpc>
+                <a:spcPct val="90000"/>
+              </a:lnSpc>
+              <a:spcBef>
+                <a:spcPts val="400"/>
+              </a:spcBef>
+              <a:spcAft>
+                <a:spcPts val="200"/>
+              </a:spcAft>
+              <a:buClr>
+                <a:schemeClr val="accent1">
+                  <a:lumMod val="75000"/>
+                </a:schemeClr>
+              </a:buClr>
+              <a:buSzPct val="85000"/>
+              <a:buFont typeface="Wingdings" pitchFamily="2" charset="2"/>
+              <a:buChar char="§"/>
+              <a:defRPr sz="1600" kern="1200">
+                <a:solidFill>
+                  <a:schemeClr val="tx1"/>
+                </a:solidFill>
+                <a:latin typeface="+mn-lt"/>
+                <a:ea typeface="+mn-ea"/>
+                <a:cs typeface="+mn-cs"/>
+              </a:defRPr>
+            </a:lvl3pPr>
+            <a:lvl4pPr marL="1005840" indent="-182880" algn="l" defTabSz="914400" rtl="0" eaLnBrk="1" latinLnBrk="0" hangingPunct="1">
+              <a:lnSpc>
+                <a:spcPct val="90000"/>
+              </a:lnSpc>
+              <a:spcBef>
+                <a:spcPts val="400"/>
+              </a:spcBef>
+              <a:spcAft>
+                <a:spcPts val="200"/>
+              </a:spcAft>
+              <a:buClr>
+                <a:schemeClr val="accent1">
+                  <a:lumMod val="75000"/>
+                </a:schemeClr>
+              </a:buClr>
+              <a:buSzPct val="85000"/>
+              <a:buFont typeface="Wingdings" pitchFamily="2" charset="2"/>
+              <a:buChar char="§"/>
+              <a:defRPr sz="1600" kern="1200">
+                <a:solidFill>
+                  <a:schemeClr val="tx1"/>
+                </a:solidFill>
+                <a:latin typeface="+mn-lt"/>
+                <a:ea typeface="+mn-ea"/>
+                <a:cs typeface="+mn-cs"/>
+              </a:defRPr>
+            </a:lvl4pPr>
+            <a:lvl5pPr marL="1280160" indent="-182880" algn="l" defTabSz="914400" rtl="0" eaLnBrk="1" latinLnBrk="0" hangingPunct="1">
+              <a:lnSpc>
+                <a:spcPct val="90000"/>
+              </a:lnSpc>
+              <a:spcBef>
+                <a:spcPts val="400"/>
+              </a:spcBef>
+              <a:spcAft>
+                <a:spcPts val="200"/>
+              </a:spcAft>
+              <a:buClr>
+                <a:schemeClr val="accent1">
+                  <a:lumMod val="75000"/>
+                </a:schemeClr>
+              </a:buClr>
+              <a:buSzPct val="85000"/>
+              <a:buFont typeface="Wingdings" pitchFamily="2" charset="2"/>
+              <a:buChar char="§"/>
+              <a:defRPr sz="1600" kern="1200">
+                <a:solidFill>
+                  <a:schemeClr val="tx1"/>
+                </a:solidFill>
+                <a:latin typeface="+mn-lt"/>
+                <a:ea typeface="+mn-ea"/>
+                <a:cs typeface="+mn-cs"/>
+              </a:defRPr>
+            </a:lvl5pPr>
+            <a:lvl6pPr marL="1600000" indent="-228600" algn="l" defTabSz="914400" rtl="0" eaLnBrk="1" latinLnBrk="0" hangingPunct="1">
+              <a:lnSpc>
+                <a:spcPct val="90000"/>
+              </a:lnSpc>
+              <a:spcBef>
+                <a:spcPts val="400"/>
+              </a:spcBef>
+              <a:spcAft>
+                <a:spcPts val="200"/>
+              </a:spcAft>
+              <a:buClr>
+                <a:schemeClr val="accent1">
+                  <a:lumMod val="75000"/>
+                </a:schemeClr>
+              </a:buClr>
+              <a:buSzPct val="85000"/>
+              <a:buFont typeface="Wingdings" pitchFamily="2" charset="2"/>
+              <a:buChar char="§"/>
+              <a:defRPr sz="1600" kern="1200">
+                <a:solidFill>
+                  <a:schemeClr val="tx1"/>
+                </a:solidFill>
+                <a:latin typeface="+mn-lt"/>
+                <a:ea typeface="+mn-ea"/>
+                <a:cs typeface="+mn-cs"/>
+              </a:defRPr>
+            </a:lvl6pPr>
+            <a:lvl7pPr marL="1900000" indent="-228600" algn="l" defTabSz="914400" rtl="0" eaLnBrk="1" latinLnBrk="0" hangingPunct="1">
+              <a:lnSpc>
+                <a:spcPct val="90000"/>
+              </a:lnSpc>
+              <a:spcBef>
+                <a:spcPts val="400"/>
+              </a:spcBef>
+              <a:spcAft>
+                <a:spcPts val="200"/>
+              </a:spcAft>
+              <a:buClr>
+                <a:schemeClr val="accent1">
+                  <a:lumMod val="75000"/>
+                </a:schemeClr>
+              </a:buClr>
+              <a:buSzPct val="85000"/>
+              <a:buFont typeface="Wingdings" pitchFamily="2" charset="2"/>
+              <a:buChar char="§"/>
+              <a:defRPr sz="1600" kern="1200">
+                <a:solidFill>
+                  <a:schemeClr val="tx1"/>
+                </a:solidFill>
+                <a:latin typeface="+mn-lt"/>
+                <a:ea typeface="+mn-ea"/>
+                <a:cs typeface="+mn-cs"/>
+              </a:defRPr>
+            </a:lvl7pPr>
+            <a:lvl8pPr marL="2200000" indent="-228600" algn="l" defTabSz="914400" rtl="0" eaLnBrk="1" latinLnBrk="0" hangingPunct="1">
+              <a:lnSpc>
+                <a:spcPct val="90000"/>
+              </a:lnSpc>
+              <a:spcBef>
+                <a:spcPts val="400"/>
+              </a:spcBef>
+              <a:spcAft>
+                <a:spcPts val="200"/>
+              </a:spcAft>
+              <a:buClr>
+                <a:schemeClr val="accent1">
+                  <a:lumMod val="75000"/>
+                </a:schemeClr>
+              </a:buClr>
+              <a:buSzPct val="85000"/>
+              <a:buFont typeface="Wingdings" pitchFamily="2" charset="2"/>
+              <a:buChar char="§"/>
+              <a:defRPr sz="1600" kern="1200">
+                <a:solidFill>
+                  <a:schemeClr val="tx1"/>
+                </a:solidFill>
+                <a:latin typeface="+mn-lt"/>
+                <a:ea typeface="+mn-ea"/>
+                <a:cs typeface="+mn-cs"/>
+              </a:defRPr>
+            </a:lvl8pPr>
+            <a:lvl9pPr marL="2500000" indent="-228600" algn="l" defTabSz="914400" rtl="0" eaLnBrk="1" latinLnBrk="0" hangingPunct="1">
+              <a:lnSpc>
+                <a:spcPct val="90000"/>
+              </a:lnSpc>
+              <a:spcBef>
+                <a:spcPts val="400"/>
+              </a:spcBef>
+              <a:spcAft>
+                <a:spcPts val="200"/>
+              </a:spcAft>
+              <a:buClr>
+                <a:schemeClr val="accent1">
+                  <a:lumMod val="75000"/>
+                </a:schemeClr>
+              </a:buClr>
+              <a:buSzPct val="85000"/>
+              <a:buFont typeface="Wingdings" pitchFamily="2" charset="2"/>
+              <a:buChar char="§"/>
+              <a:defRPr sz="1600" kern="1200">
+                <a:solidFill>
+                  <a:schemeClr val="tx1"/>
+                </a:solidFill>
+                <a:latin typeface="+mn-lt"/>
+                <a:ea typeface="+mn-ea"/>
+                <a:cs typeface="+mn-cs"/>
+              </a:defRPr>
+            </a:lvl9pPr>
+          </a:lstStyle>
+          <a:p>
+            <a:pPr marL="0" indent="0">
+              <a:buNone/>
+            </a:pPr>
+            <a:r>
+              <a:rPr lang="en-US" dirty="0" err="1">
+                <a:solidFill>
+                  <a:schemeClr val="tx1">
+                    <a:lumMod val="65000"/>
+                    <a:lumOff val="35000"/>
+                  </a:schemeClr>
+                </a:solidFill>
+              </a:rPr>
+              <a:t>main_answers.py</a:t>
+            </a:r>
+            <a:r>
+              <a:rPr lang="en-US" dirty="0">
+                <a:solidFill>
+                  <a:schemeClr val="tx1">
+                    <a:lumMod val="65000"/>
+                    <a:lumOff val="35000"/>
+                  </a:schemeClr>
+                </a:solidFill>
+              </a:rPr>
+              <a:t> output</a:t>
+            </a:r>
+          </a:p>
+        </p:txBody>
+      </p:sp>
+    </p:spTree>
+    <p:extLst>
+      <p:ext uri="{BB962C8B-B14F-4D97-AF65-F5344CB8AC3E}">
+        <p14:creationId xmlns:p14="http://schemas.microsoft.com/office/powerpoint/2010/main" val="2408060063"/>
+      </p:ext>
+    </p:extLst>
+  </p:cSld>
+  <p:clrMapOvr>
+    <a:masterClrMapping/>
+  </p:clrMapOvr>
+</p:sld>
+</file>
+
+<file path=ppt/slides/slide7.xml><?xml version="1.0" encoding="utf-8"?>
+<p:sld xmlns:a="http://schemas.openxmlformats.org/drawingml/2006/main" xmlns:r="http://schemas.openxmlformats.org/officeDocument/2006/relationships" xmlns:p="http://schemas.openxmlformats.org/presentationml/2006/main">
+  <p:cSld>
+    <p:spTree>
+      <p:nvGrpSpPr>
+        <p:cNvPr id="1" name=""/>
+        <p:cNvGrpSpPr/>
+        <p:nvPr/>
+      </p:nvGrpSpPr>
+      <p:grpSpPr>
+        <a:xfrm>
+          <a:off x="0" y="0"/>
+          <a:ext cx="0" cy="0"/>
+          <a:chOff x="0" y="0"/>
+          <a:chExt cx="0" cy="0"/>
+        </a:xfrm>
+      </p:grpSpPr>
+      <p:sp>
+        <p:nvSpPr>
+          <p:cNvPr id="2" name="Title 1">
+            <a:extLst>
+              <a:ext uri="{FF2B5EF4-FFF2-40B4-BE49-F238E27FC236}">
+                <a16:creationId xmlns:a16="http://schemas.microsoft.com/office/drawing/2014/main" id="{5E4840F9-A2CA-B94E-89E0-41348C5F0EF5}"/>
+              </a:ext>
+            </a:extLst>
+          </p:cNvPr>
+          <p:cNvSpPr>
+            <a:spLocks noGrp="1"/>
+          </p:cNvSpPr>
+          <p:nvPr>
+            <p:ph type="title"/>
+          </p:nvPr>
+        </p:nvSpPr>
+        <p:spPr/>
+        <p:txBody>
+          <a:bodyPr/>
+          <a:lstStyle/>
+          <a:p>
+            <a:r>
+              <a:rPr lang="en-US" dirty="0"/>
+              <a:t>Problem set design</a:t>
+            </a:r>
+          </a:p>
+        </p:txBody>
+      </p:sp>
+      <p:sp>
+        <p:nvSpPr>
+          <p:cNvPr id="3" name="Content Placeholder 2">
+            <a:extLst>
+              <a:ext uri="{FF2B5EF4-FFF2-40B4-BE49-F238E27FC236}">
+                <a16:creationId xmlns:a16="http://schemas.microsoft.com/office/drawing/2014/main" id="{25A20195-AD7A-BF41-B9A7-2AEA2EA1601B}"/>
+              </a:ext>
+            </a:extLst>
+          </p:cNvPr>
+          <p:cNvSpPr>
+            <a:spLocks noGrp="1"/>
+          </p:cNvSpPr>
+          <p:nvPr>
+            <p:ph idx="1"/>
+          </p:nvPr>
+        </p:nvSpPr>
+        <p:spPr/>
+        <p:txBody>
+          <a:bodyPr>
+            <a:normAutofit/>
+          </a:bodyPr>
+          <a:lstStyle/>
+          <a:p>
+            <a:r>
+              <a:rPr lang="en-US" b="1" dirty="0"/>
+              <a:t>Objective</a:t>
+            </a:r>
+            <a:r>
+              <a:rPr lang="en-US" dirty="0"/>
+              <a:t>: Demonstrate the value-add of </a:t>
+            </a:r>
+            <a:r>
+              <a:rPr lang="en-US" dirty="0" err="1"/>
+              <a:t>Dask</a:t>
+            </a:r>
+            <a:r>
+              <a:rPr lang="en-US" dirty="0"/>
+              <a:t> by translating Pandas code.</a:t>
+            </a:r>
+          </a:p>
+          <a:p>
+            <a:r>
+              <a:rPr lang="en-US" b="1" dirty="0"/>
+              <a:t>Part II</a:t>
+            </a:r>
+            <a:r>
+              <a:rPr lang="en-US" dirty="0"/>
+              <a:t>:</a:t>
+            </a:r>
+          </a:p>
+          <a:p>
+            <a:pPr lvl="1"/>
+            <a:r>
+              <a:rPr lang="en-US" dirty="0"/>
+              <a:t>Aggregate Metrics</a:t>
+            </a:r>
+          </a:p>
+          <a:p>
+            <a:pPr lvl="2"/>
+            <a:r>
+              <a:rPr lang="en-US" dirty="0"/>
+              <a:t>Compare traditional Pandas method to using </a:t>
+            </a:r>
+            <a:r>
+              <a:rPr lang="en-US" dirty="0" err="1"/>
+              <a:t>Dask</a:t>
+            </a:r>
+            <a:r>
+              <a:rPr lang="en-US" dirty="0"/>
+              <a:t> </a:t>
+            </a:r>
+            <a:r>
+              <a:rPr lang="en-US" dirty="0" err="1"/>
+              <a:t>Dataframes</a:t>
+            </a:r>
+            <a:endParaRPr lang="en-US" dirty="0"/>
+          </a:p>
+          <a:p>
+            <a:pPr lvl="2"/>
+            <a:r>
+              <a:rPr lang="en-US" dirty="0" err="1"/>
+              <a:t>Reindex</a:t>
+            </a:r>
+            <a:r>
+              <a:rPr lang="en-US" dirty="0"/>
+              <a:t> to optimize for the aggregations being performed</a:t>
+            </a:r>
+          </a:p>
+        </p:txBody>
+      </p:sp>
+    </p:spTree>
+    <p:extLst>
+      <p:ext uri="{BB962C8B-B14F-4D97-AF65-F5344CB8AC3E}">
+        <p14:creationId xmlns:p14="http://schemas.microsoft.com/office/powerpoint/2010/main" val="1071205135"/>
+      </p:ext>
+    </p:extLst>
+  </p:cSld>
+  <p:clrMapOvr>
+    <a:masterClrMapping/>
+  </p:clrMapOvr>
+</p:sld>
+</file>
+
+<file path=ppt/slides/slide8.xml><?xml version="1.0" encoding="utf-8"?>
+<p:sld xmlns:a="http://schemas.openxmlformats.org/drawingml/2006/main" xmlns:r="http://schemas.openxmlformats.org/officeDocument/2006/relationships" xmlns:p="http://schemas.openxmlformats.org/presentationml/2006/main">
+  <p:cSld>
+    <p:spTree>
+      <p:nvGrpSpPr>
+        <p:cNvPr id="1" name=""/>
+        <p:cNvGrpSpPr/>
+        <p:nvPr/>
+      </p:nvGrpSpPr>
+      <p:grpSpPr>
+        <a:xfrm>
+          <a:off x="0" y="0"/>
+          <a:ext cx="0" cy="0"/>
+          <a:chOff x="0" y="0"/>
+          <a:chExt cx="0" cy="0"/>
+        </a:xfrm>
+      </p:grpSpPr>
+      <p:sp>
+        <p:nvSpPr>
+          <p:cNvPr id="12" name="TextBox 11">
+            <a:extLst>
+              <a:ext uri="{FF2B5EF4-FFF2-40B4-BE49-F238E27FC236}">
+                <a16:creationId xmlns:a16="http://schemas.microsoft.com/office/drawing/2014/main" id="{6F6D9EF3-57E0-0349-8E8E-76551273C6B0}"/>
+              </a:ext>
+            </a:extLst>
+          </p:cNvPr>
+          <p:cNvSpPr txBox="1"/>
+          <p:nvPr/>
+        </p:nvSpPr>
+        <p:spPr>
+          <a:xfrm>
+            <a:off x="437598" y="1048994"/>
+            <a:ext cx="1009956" cy="369332"/>
+          </a:xfrm>
+          <a:prstGeom prst="rect">
+            <a:avLst/>
+          </a:prstGeom>
+          <a:noFill/>
+        </p:spPr>
+        <p:txBody>
+          <a:bodyPr wrap="none" rtlCol="0">
+            <a:spAutoFit/>
+          </a:bodyPr>
+          <a:lstStyle/>
+          <a:p>
+            <a:r>
+              <a:rPr lang="en-US" b="1" dirty="0"/>
+              <a:t>Pandas</a:t>
+            </a:r>
+          </a:p>
+        </p:txBody>
+      </p:sp>
+      <p:sp>
+        <p:nvSpPr>
+          <p:cNvPr id="13" name="TextBox 12">
+            <a:extLst>
+              <a:ext uri="{FF2B5EF4-FFF2-40B4-BE49-F238E27FC236}">
+                <a16:creationId xmlns:a16="http://schemas.microsoft.com/office/drawing/2014/main" id="{5EE22F68-6FA1-3046-9C97-D0099CD4DD6C}"/>
+              </a:ext>
+            </a:extLst>
+          </p:cNvPr>
+          <p:cNvSpPr txBox="1"/>
+          <p:nvPr/>
+        </p:nvSpPr>
+        <p:spPr>
+          <a:xfrm>
+            <a:off x="6099048" y="1010966"/>
+            <a:ext cx="769763" cy="369332"/>
+          </a:xfrm>
+          <a:prstGeom prst="rect">
+            <a:avLst/>
+          </a:prstGeom>
+          <a:noFill/>
+        </p:spPr>
+        <p:txBody>
+          <a:bodyPr wrap="none" rtlCol="0">
+            <a:spAutoFit/>
+          </a:bodyPr>
+          <a:lstStyle/>
+          <a:p>
+            <a:r>
+              <a:rPr lang="en-US" b="1" dirty="0" err="1"/>
+              <a:t>Dask</a:t>
+            </a:r>
+            <a:endParaRPr lang="en-US" b="1" dirty="0"/>
+          </a:p>
+        </p:txBody>
+      </p:sp>
+      <p:pic>
+        <p:nvPicPr>
+          <p:cNvPr id="6" name="Picture 5">
+            <a:extLst>
+              <a:ext uri="{FF2B5EF4-FFF2-40B4-BE49-F238E27FC236}">
+                <a16:creationId xmlns:a16="http://schemas.microsoft.com/office/drawing/2014/main" id="{E4B20898-95FA-A54E-A19C-02B72305DAFE}"/>
+              </a:ext>
+            </a:extLst>
+          </p:cNvPr>
+          <p:cNvPicPr>
+            <a:picLocks noChangeAspect="1"/>
+          </p:cNvPicPr>
+          <p:nvPr/>
+        </p:nvPicPr>
+        <p:blipFill>
+          <a:blip r:embed="rId2">
+            <a:extLst>
+              <a:ext uri="{28A0092B-C50C-407E-A947-70E740481C1C}">
+                <a14:useLocalDpi xmlns:a14="http://schemas.microsoft.com/office/drawing/2010/main" val="0"/>
+              </a:ext>
+            </a:extLst>
+          </a:blip>
+          <a:stretch>
+            <a:fillRect/>
+          </a:stretch>
+        </p:blipFill>
+        <p:spPr>
+          <a:xfrm>
+            <a:off x="6099048" y="1564585"/>
+            <a:ext cx="5181600" cy="4152900"/>
+          </a:xfrm>
+          <a:prstGeom prst="rect">
+            <a:avLst/>
+          </a:prstGeom>
+        </p:spPr>
+      </p:pic>
+      <p:pic>
+        <p:nvPicPr>
+          <p:cNvPr id="8" name="Picture 7">
+            <a:extLst>
+              <a:ext uri="{FF2B5EF4-FFF2-40B4-BE49-F238E27FC236}">
+                <a16:creationId xmlns:a16="http://schemas.microsoft.com/office/drawing/2014/main" id="{BE29E9B9-203B-D446-814E-4E92D2FDB747}"/>
+              </a:ext>
+            </a:extLst>
+          </p:cNvPr>
+          <p:cNvPicPr>
+            <a:picLocks noChangeAspect="1"/>
+          </p:cNvPicPr>
+          <p:nvPr/>
+        </p:nvPicPr>
+        <p:blipFill>
+          <a:blip r:embed="rId3">
+            <a:extLst>
+              <a:ext uri="{28A0092B-C50C-407E-A947-70E740481C1C}">
+                <a14:useLocalDpi xmlns:a14="http://schemas.microsoft.com/office/drawing/2010/main" val="0"/>
+              </a:ext>
+            </a:extLst>
+          </a:blip>
+          <a:stretch>
+            <a:fillRect/>
+          </a:stretch>
+        </p:blipFill>
+        <p:spPr>
+          <a:xfrm>
+            <a:off x="437598" y="1564585"/>
+            <a:ext cx="4699000" cy="977900"/>
+          </a:xfrm>
+          <a:prstGeom prst="rect">
+            <a:avLst/>
+          </a:prstGeom>
+        </p:spPr>
+      </p:pic>
+    </p:spTree>
+    <p:extLst>
+      <p:ext uri="{BB962C8B-B14F-4D97-AF65-F5344CB8AC3E}">
+        <p14:creationId xmlns:p14="http://schemas.microsoft.com/office/powerpoint/2010/main" val="1745488930"/>
+      </p:ext>
+    </p:extLst>
+  </p:cSld>
+  <p:clrMapOvr>
+    <a:masterClrMapping/>
+  </p:clrMapOvr>
+</p:sld>
+</file>
+
+<file path=ppt/slides/slide9.xml><?xml version="1.0" encoding="utf-8"?>
+<p:sld xmlns:a="http://schemas.openxmlformats.org/drawingml/2006/main" xmlns:r="http://schemas.openxmlformats.org/officeDocument/2006/relationships" xmlns:p="http://schemas.openxmlformats.org/presentationml/2006/main">
+  <p:cSld>
+    <p:spTree>
+      <p:nvGrpSpPr>
+        <p:cNvPr id="1" name=""/>
+        <p:cNvGrpSpPr/>
+        <p:nvPr/>
+      </p:nvGrpSpPr>
+      <p:grpSpPr>
+        <a:xfrm>
+          <a:off x="0" y="0"/>
+          <a:ext cx="0" cy="0"/>
+          <a:chOff x="0" y="0"/>
+          <a:chExt cx="0" cy="0"/>
+        </a:xfrm>
+      </p:grpSpPr>
+      <p:sp>
+        <p:nvSpPr>
+          <p:cNvPr id="2" name="Title 1">
+            <a:extLst>
+              <a:ext uri="{FF2B5EF4-FFF2-40B4-BE49-F238E27FC236}">
+                <a16:creationId xmlns:a16="http://schemas.microsoft.com/office/drawing/2014/main" id="{CF2450B0-B0BE-7D40-AAD1-85278E85080B}"/>
+              </a:ext>
+            </a:extLst>
+          </p:cNvPr>
+          <p:cNvSpPr>
+            <a:spLocks noGrp="1"/>
+          </p:cNvSpPr>
+          <p:nvPr>
+            <p:ph type="title"/>
+          </p:nvPr>
+        </p:nvSpPr>
+        <p:spPr/>
+        <p:txBody>
+          <a:bodyPr/>
+          <a:lstStyle/>
+          <a:p>
+            <a:r>
+              <a:rPr lang="en-US" dirty="0"/>
+              <a:t>Results</a:t>
+            </a:r>
+          </a:p>
+        </p:txBody>
+      </p:sp>
+      <p:sp>
+        <p:nvSpPr>
+          <p:cNvPr id="6" name="Text Placeholder 1">
+            <a:extLst>
+              <a:ext uri="{FF2B5EF4-FFF2-40B4-BE49-F238E27FC236}">
+                <a16:creationId xmlns:a16="http://schemas.microsoft.com/office/drawing/2014/main" id="{426C5DC4-ED46-A442-A654-3FAB477A84D4}"/>
+              </a:ext>
+            </a:extLst>
+          </p:cNvPr>
+          <p:cNvSpPr txBox="1">
+            <a:spLocks/>
+          </p:cNvSpPr>
+          <p:nvPr/>
+        </p:nvSpPr>
+        <p:spPr>
+          <a:xfrm>
+            <a:off x="1069848" y="1734611"/>
+            <a:ext cx="4754880" cy="640080"/>
+          </a:xfrm>
+          <a:prstGeom prst="rect">
+            <a:avLst/>
+          </a:prstGeom>
+        </p:spPr>
+        <p:txBody>
+          <a:bodyPr/>
+          <a:lstStyle>
+            <a:lvl1pPr marL="182880" indent="-182880" algn="l" defTabSz="914400" rtl="0" eaLnBrk="1" latinLnBrk="0" hangingPunct="1">
+              <a:lnSpc>
+                <a:spcPct val="90000"/>
+              </a:lnSpc>
+              <a:spcBef>
+                <a:spcPts val="1200"/>
+              </a:spcBef>
+              <a:buClr>
+                <a:schemeClr val="accent1">
+                  <a:lumMod val="75000"/>
+                </a:schemeClr>
+              </a:buClr>
+              <a:buSzPct val="85000"/>
+              <a:buFont typeface="Wingdings" pitchFamily="2" charset="2"/>
+              <a:buChar char="§"/>
+              <a:defRPr sz="2000" kern="1200">
+                <a:solidFill>
+                  <a:schemeClr val="tx1"/>
+                </a:solidFill>
+                <a:latin typeface="+mn-lt"/>
+                <a:ea typeface="+mn-ea"/>
+                <a:cs typeface="+mn-cs"/>
+              </a:defRPr>
+            </a:lvl1pPr>
+            <a:lvl2pPr marL="457200" indent="-182880" algn="l" defTabSz="914400" rtl="0" eaLnBrk="1" latinLnBrk="0" hangingPunct="1">
+              <a:lnSpc>
+                <a:spcPct val="90000"/>
+              </a:lnSpc>
+              <a:spcBef>
+                <a:spcPts val="400"/>
+              </a:spcBef>
+              <a:spcAft>
+                <a:spcPts val="200"/>
+              </a:spcAft>
+              <a:buClr>
+                <a:schemeClr val="accent1">
+                  <a:lumMod val="75000"/>
+                </a:schemeClr>
+              </a:buClr>
+              <a:buSzPct val="85000"/>
+              <a:buFont typeface="Wingdings" pitchFamily="2" charset="2"/>
+              <a:buChar char="§"/>
+              <a:defRPr sz="1800" kern="1200">
+                <a:solidFill>
+                  <a:schemeClr val="tx1"/>
+                </a:solidFill>
+                <a:latin typeface="+mn-lt"/>
+                <a:ea typeface="+mn-ea"/>
+                <a:cs typeface="+mn-cs"/>
+              </a:defRPr>
+            </a:lvl2pPr>
+            <a:lvl3pPr marL="731520" indent="-182880" algn="l" defTabSz="914400" rtl="0" eaLnBrk="1" latinLnBrk="0" hangingPunct="1">
+              <a:lnSpc>
+                <a:spcPct val="90000"/>
+              </a:lnSpc>
+              <a:spcBef>
+                <a:spcPts val="400"/>
+              </a:spcBef>
+              <a:spcAft>
+                <a:spcPts val="200"/>
+              </a:spcAft>
+              <a:buClr>
+                <a:schemeClr val="accent1">
+                  <a:lumMod val="75000"/>
+                </a:schemeClr>
+              </a:buClr>
+              <a:buSzPct val="85000"/>
+              <a:buFont typeface="Wingdings" pitchFamily="2" charset="2"/>
+              <a:buChar char="§"/>
+              <a:defRPr sz="1600" kern="1200">
+                <a:solidFill>
+                  <a:schemeClr val="tx1"/>
+                </a:solidFill>
+                <a:latin typeface="+mn-lt"/>
+                <a:ea typeface="+mn-ea"/>
+                <a:cs typeface="+mn-cs"/>
+              </a:defRPr>
+            </a:lvl3pPr>
+            <a:lvl4pPr marL="1005840" indent="-182880" algn="l" defTabSz="914400" rtl="0" eaLnBrk="1" latinLnBrk="0" hangingPunct="1">
+              <a:lnSpc>
+                <a:spcPct val="90000"/>
+              </a:lnSpc>
+              <a:spcBef>
+                <a:spcPts val="400"/>
+              </a:spcBef>
+              <a:spcAft>
+                <a:spcPts val="200"/>
+              </a:spcAft>
+              <a:buClr>
+                <a:schemeClr val="accent1">
+                  <a:lumMod val="75000"/>
+                </a:schemeClr>
+              </a:buClr>
+              <a:buSzPct val="85000"/>
+              <a:buFont typeface="Wingdings" pitchFamily="2" charset="2"/>
+              <a:buChar char="§"/>
+              <a:defRPr sz="1600" kern="1200">
+                <a:solidFill>
+                  <a:schemeClr val="tx1"/>
+                </a:solidFill>
+                <a:latin typeface="+mn-lt"/>
+                <a:ea typeface="+mn-ea"/>
+                <a:cs typeface="+mn-cs"/>
+              </a:defRPr>
+            </a:lvl4pPr>
+            <a:lvl5pPr marL="1280160" indent="-182880" algn="l" defTabSz="914400" rtl="0" eaLnBrk="1" latinLnBrk="0" hangingPunct="1">
+              <a:lnSpc>
+                <a:spcPct val="90000"/>
+              </a:lnSpc>
+              <a:spcBef>
+                <a:spcPts val="400"/>
+              </a:spcBef>
+              <a:spcAft>
+                <a:spcPts val="200"/>
+              </a:spcAft>
+              <a:buClr>
+                <a:schemeClr val="accent1">
+                  <a:lumMod val="75000"/>
+                </a:schemeClr>
+              </a:buClr>
+              <a:buSzPct val="85000"/>
+              <a:buFont typeface="Wingdings" pitchFamily="2" charset="2"/>
+              <a:buChar char="§"/>
+              <a:defRPr sz="1600" kern="1200">
+                <a:solidFill>
+                  <a:schemeClr val="tx1"/>
+                </a:solidFill>
+                <a:latin typeface="+mn-lt"/>
+                <a:ea typeface="+mn-ea"/>
+                <a:cs typeface="+mn-cs"/>
+              </a:defRPr>
+            </a:lvl5pPr>
+            <a:lvl6pPr marL="1600000" indent="-228600" algn="l" defTabSz="914400" rtl="0" eaLnBrk="1" latinLnBrk="0" hangingPunct="1">
+              <a:lnSpc>
+                <a:spcPct val="90000"/>
+              </a:lnSpc>
+              <a:spcBef>
+                <a:spcPts val="400"/>
+              </a:spcBef>
+              <a:spcAft>
+                <a:spcPts val="200"/>
+              </a:spcAft>
+              <a:buClr>
+                <a:schemeClr val="accent1">
+                  <a:lumMod val="75000"/>
+                </a:schemeClr>
+              </a:buClr>
+              <a:buSzPct val="85000"/>
+              <a:buFont typeface="Wingdings" pitchFamily="2" charset="2"/>
+              <a:buChar char="§"/>
+              <a:defRPr sz="1600" kern="1200">
+                <a:solidFill>
+                  <a:schemeClr val="tx1"/>
+                </a:solidFill>
+                <a:latin typeface="+mn-lt"/>
+                <a:ea typeface="+mn-ea"/>
+                <a:cs typeface="+mn-cs"/>
+              </a:defRPr>
+            </a:lvl6pPr>
+            <a:lvl7pPr marL="1900000" indent="-228600" algn="l" defTabSz="914400" rtl="0" eaLnBrk="1" latinLnBrk="0" hangingPunct="1">
+              <a:lnSpc>
+                <a:spcPct val="90000"/>
+              </a:lnSpc>
+              <a:spcBef>
+                <a:spcPts val="400"/>
+              </a:spcBef>
+              <a:spcAft>
+                <a:spcPts val="200"/>
+              </a:spcAft>
+              <a:buClr>
+                <a:schemeClr val="accent1">
+                  <a:lumMod val="75000"/>
+                </a:schemeClr>
+              </a:buClr>
+              <a:buSzPct val="85000"/>
+              <a:buFont typeface="Wingdings" pitchFamily="2" charset="2"/>
+              <a:buChar char="§"/>
+              <a:defRPr sz="1600" kern="1200">
+                <a:solidFill>
+                  <a:schemeClr val="tx1"/>
+                </a:solidFill>
+                <a:latin typeface="+mn-lt"/>
+                <a:ea typeface="+mn-ea"/>
+                <a:cs typeface="+mn-cs"/>
+              </a:defRPr>
+            </a:lvl7pPr>
+            <a:lvl8pPr marL="2200000" indent="-228600" algn="l" defTabSz="914400" rtl="0" eaLnBrk="1" latinLnBrk="0" hangingPunct="1">
+              <a:lnSpc>
+                <a:spcPct val="90000"/>
+              </a:lnSpc>
+              <a:spcBef>
+                <a:spcPts val="400"/>
+              </a:spcBef>
+              <a:spcAft>
+                <a:spcPts val="200"/>
+              </a:spcAft>
+              <a:buClr>
+                <a:schemeClr val="accent1">
+                  <a:lumMod val="75000"/>
+                </a:schemeClr>
+              </a:buClr>
+              <a:buSzPct val="85000"/>
+              <a:buFont typeface="Wingdings" pitchFamily="2" charset="2"/>
+              <a:buChar char="§"/>
+              <a:defRPr sz="1600" kern="1200">
+                <a:solidFill>
+                  <a:schemeClr val="tx1"/>
+                </a:solidFill>
+                <a:latin typeface="+mn-lt"/>
+                <a:ea typeface="+mn-ea"/>
+                <a:cs typeface="+mn-cs"/>
+              </a:defRPr>
+            </a:lvl8pPr>
+            <a:lvl9pPr marL="2500000" indent="-228600" algn="l" defTabSz="914400" rtl="0" eaLnBrk="1" latinLnBrk="0" hangingPunct="1">
+              <a:lnSpc>
+                <a:spcPct val="90000"/>
+              </a:lnSpc>
+              <a:spcBef>
+                <a:spcPts val="400"/>
+              </a:spcBef>
+              <a:spcAft>
+                <a:spcPts val="200"/>
+              </a:spcAft>
+              <a:buClr>
+                <a:schemeClr val="accent1">
+                  <a:lumMod val="75000"/>
+                </a:schemeClr>
+              </a:buClr>
+              <a:buSzPct val="85000"/>
+              <a:buFont typeface="Wingdings" pitchFamily="2" charset="2"/>
+              <a:buChar char="§"/>
+              <a:defRPr sz="1600" kern="1200">
+                <a:solidFill>
+                  <a:schemeClr val="tx1"/>
+                </a:solidFill>
+                <a:latin typeface="+mn-lt"/>
+                <a:ea typeface="+mn-ea"/>
+                <a:cs typeface="+mn-cs"/>
+              </a:defRPr>
+            </a:lvl9pPr>
+          </a:lstStyle>
+          <a:p>
+            <a:pPr marL="0" indent="0">
+              <a:buNone/>
+            </a:pPr>
+            <a:r>
+              <a:rPr lang="en-US" dirty="0" err="1">
+                <a:solidFill>
+                  <a:schemeClr val="tx1">
+                    <a:lumMod val="65000"/>
+                    <a:lumOff val="35000"/>
+                  </a:schemeClr>
+                </a:solidFill>
+              </a:rPr>
+              <a:t>main_answers.py</a:t>
+            </a:r>
+            <a:r>
+              <a:rPr lang="en-US" dirty="0">
+                <a:solidFill>
+                  <a:schemeClr val="tx1">
+                    <a:lumMod val="65000"/>
+                    <a:lumOff val="35000"/>
+                  </a:schemeClr>
+                </a:solidFill>
+              </a:rPr>
+              <a:t> output</a:t>
+            </a:r>
+          </a:p>
+        </p:txBody>
+      </p:sp>
+      <p:pic>
+        <p:nvPicPr>
+          <p:cNvPr id="8" name="Picture 7">
+            <a:extLst>
+              <a:ext uri="{FF2B5EF4-FFF2-40B4-BE49-F238E27FC236}">
+                <a16:creationId xmlns:a16="http://schemas.microsoft.com/office/drawing/2014/main" id="{B3DD80CF-16F5-9349-A17C-925B4B353FA9}"/>
+              </a:ext>
+            </a:extLst>
+          </p:cNvPr>
+          <p:cNvPicPr>
+            <a:picLocks noChangeAspect="1"/>
+          </p:cNvPicPr>
+          <p:nvPr/>
+        </p:nvPicPr>
+        <p:blipFill>
+          <a:blip r:embed="rId2">
+            <a:extLst>
+              <a:ext uri="{28A0092B-C50C-407E-A947-70E740481C1C}">
+                <a14:useLocalDpi xmlns:a14="http://schemas.microsoft.com/office/drawing/2010/main" val="0"/>
+              </a:ext>
+            </a:extLst>
+          </a:blip>
+          <a:stretch>
+            <a:fillRect/>
+          </a:stretch>
+        </p:blipFill>
+        <p:spPr>
+          <a:xfrm>
+            <a:off x="4331282" y="335063"/>
+            <a:ext cx="6889731" cy="6019353"/>
+          </a:xfrm>
+          <a:prstGeom prst="rect">
+            <a:avLst/>
+          </a:prstGeom>
+        </p:spPr>
+      </p:pic>
+      <p:sp>
+        <p:nvSpPr>
+          <p:cNvPr id="9" name="Frame 8">
+            <a:extLst>
+              <a:ext uri="{FF2B5EF4-FFF2-40B4-BE49-F238E27FC236}">
+                <a16:creationId xmlns:a16="http://schemas.microsoft.com/office/drawing/2014/main" id="{850AD4E0-D37C-764E-B8CD-67389F0F89BC}"/>
+              </a:ext>
+            </a:extLst>
+          </p:cNvPr>
+          <p:cNvSpPr/>
+          <p:nvPr/>
+        </p:nvSpPr>
+        <p:spPr>
+          <a:xfrm>
+            <a:off x="7646505" y="484631"/>
+            <a:ext cx="1325217" cy="323751"/>
+          </a:xfrm>
+          <a:prstGeom prst="frame">
+            <a:avLst/>
+          </a:prstGeom>
+        </p:spPr>
+        <p:style>
+          <a:lnRef idx="2">
+            <a:schemeClr val="accent1">
+              <a:shade val="50000"/>
+            </a:schemeClr>
+          </a:lnRef>
+          <a:fillRef idx="1">
+            <a:schemeClr val="accent1"/>
+          </a:fillRef>
+          <a:effectRef idx="0">
+            <a:schemeClr val="accent1"/>
+          </a:effectRef>
+          <a:fontRef idx="minor">
+            <a:schemeClr val="lt1"/>
+          </a:fontRef>
+        </p:style>
+        <p:txBody>
+          <a:bodyPr rtlCol="0" anchor="ctr"/>
+          <a:lstStyle/>
+          <a:p>
+            <a:pPr algn="ctr"/>
+            <a:endParaRPr lang="en-US">
+              <a:solidFill>
+                <a:schemeClr val="tx1"/>
+              </a:solidFill>
+            </a:endParaRPr>
+          </a:p>
+        </p:txBody>
+      </p:sp>
+      <p:sp>
+        <p:nvSpPr>
+          <p:cNvPr id="10" name="Frame 9">
+            <a:extLst>
+              <a:ext uri="{FF2B5EF4-FFF2-40B4-BE49-F238E27FC236}">
+                <a16:creationId xmlns:a16="http://schemas.microsoft.com/office/drawing/2014/main" id="{D88E0AB3-92DE-FC49-AFE4-CE7A039A77F6}"/>
+              </a:ext>
+            </a:extLst>
+          </p:cNvPr>
+          <p:cNvSpPr/>
+          <p:nvPr/>
+        </p:nvSpPr>
+        <p:spPr>
+          <a:xfrm>
+            <a:off x="7308574" y="2558596"/>
+            <a:ext cx="1325217" cy="323751"/>
+          </a:xfrm>
+          <a:prstGeom prst="frame">
+            <a:avLst/>
+          </a:prstGeom>
+        </p:spPr>
+        <p:style>
+          <a:lnRef idx="2">
+            <a:schemeClr val="accent1">
+              <a:shade val="50000"/>
+            </a:schemeClr>
+          </a:lnRef>
+          <a:fillRef idx="1">
+            <a:schemeClr val="accent1"/>
+          </a:fillRef>
+          <a:effectRef idx="0">
+            <a:schemeClr val="accent1"/>
+          </a:effectRef>
+          <a:fontRef idx="minor">
+            <a:schemeClr val="lt1"/>
+          </a:fontRef>
+        </p:style>
+        <p:txBody>
+          <a:bodyPr rtlCol="0" anchor="ctr"/>
+          <a:lstStyle/>
+          <a:p>
+            <a:pPr algn="ctr"/>
+            <a:endParaRPr lang="en-US">
+              <a:solidFill>
+                <a:schemeClr val="tx1"/>
+              </a:solidFill>
+            </a:endParaRPr>
+          </a:p>
+        </p:txBody>
+      </p:sp>
+      <p:sp>
+        <p:nvSpPr>
+          <p:cNvPr id="12" name="Frame 11">
+            <a:extLst>
+              <a:ext uri="{FF2B5EF4-FFF2-40B4-BE49-F238E27FC236}">
+                <a16:creationId xmlns:a16="http://schemas.microsoft.com/office/drawing/2014/main" id="{D77FDB7F-F200-9249-B933-60079BABCA38}"/>
+              </a:ext>
+            </a:extLst>
+          </p:cNvPr>
+          <p:cNvSpPr/>
+          <p:nvPr/>
+        </p:nvSpPr>
+        <p:spPr>
+          <a:xfrm>
+            <a:off x="8209721" y="4645813"/>
+            <a:ext cx="1305340" cy="390013"/>
+          </a:xfrm>
+          <a:prstGeom prst="frame">
+            <a:avLst/>
+          </a:prstGeom>
+        </p:spPr>
+        <p:style>
+          <a:lnRef idx="2">
+            <a:schemeClr val="accent1">
+              <a:shade val="50000"/>
+            </a:schemeClr>
+          </a:lnRef>
+          <a:fillRef idx="1">
+            <a:schemeClr val="accent1"/>
+          </a:fillRef>
+          <a:effectRef idx="0">
+            <a:schemeClr val="accent1"/>
+          </a:effectRef>
+          <a:fontRef idx="minor">
+            <a:schemeClr val="lt1"/>
+          </a:fontRef>
+        </p:style>
+        <p:txBody>
+          <a:bodyPr rtlCol="0" anchor="ctr"/>
+          <a:lstStyle/>
+          <a:p>
+            <a:pPr algn="ctr"/>
+            <a:endParaRPr lang="en-US">
+              <a:solidFill>
+                <a:schemeClr val="tx1"/>
+              </a:solidFill>
+            </a:endParaRPr>
+          </a:p>
+        </p:txBody>
+      </p:sp>
+    </p:spTree>
+    <p:extLst>
+      <p:ext uri="{BB962C8B-B14F-4D97-AF65-F5344CB8AC3E}">
+        <p14:creationId xmlns:p14="http://schemas.microsoft.com/office/powerpoint/2010/main" val="1533725318"/>
       </p:ext>
     </p:extLst>
   </p:cSld>

</xml_diff>

<commit_message>
computing dask vector at the end
</commit_message>
<xml_diff>
--- a/ppt/DASK.pptx
+++ b/ppt/DASK.pptx
@@ -8,14 +8,17 @@
     <p:sldId id="256" r:id="rId2"/>
     <p:sldId id="257" r:id="rId3"/>
     <p:sldId id="258" r:id="rId4"/>
-    <p:sldId id="259" r:id="rId5"/>
-    <p:sldId id="263" r:id="rId6"/>
-    <p:sldId id="265" r:id="rId7"/>
-    <p:sldId id="261" r:id="rId8"/>
-    <p:sldId id="266" r:id="rId9"/>
-    <p:sldId id="267" r:id="rId10"/>
-    <p:sldId id="262" r:id="rId11"/>
-    <p:sldId id="268" r:id="rId12"/>
+    <p:sldId id="271" r:id="rId5"/>
+    <p:sldId id="259" r:id="rId6"/>
+    <p:sldId id="263" r:id="rId7"/>
+    <p:sldId id="265" r:id="rId8"/>
+    <p:sldId id="261" r:id="rId9"/>
+    <p:sldId id="266" r:id="rId10"/>
+    <p:sldId id="267" r:id="rId11"/>
+    <p:sldId id="262" r:id="rId12"/>
+    <p:sldId id="269" r:id="rId13"/>
+    <p:sldId id="270" r:id="rId14"/>
+    <p:sldId id="268" r:id="rId15"/>
   </p:sldIdLst>
   <p:sldSz cx="12192000" cy="6858000"/>
   <p:notesSz cx="6858000" cy="9144000"/>
@@ -4681,956 +4684,6 @@
           <p:cNvPr id="2" name="Title 1">
             <a:extLst>
               <a:ext uri="{FF2B5EF4-FFF2-40B4-BE49-F238E27FC236}">
-                <a16:creationId xmlns:a16="http://schemas.microsoft.com/office/drawing/2014/main" id="{5E4840F9-A2CA-B94E-89E0-41348C5F0EF5}"/>
-              </a:ext>
-            </a:extLst>
-          </p:cNvPr>
-          <p:cNvSpPr>
-            <a:spLocks noGrp="1"/>
-          </p:cNvSpPr>
-          <p:nvPr>
-            <p:ph type="title"/>
-          </p:nvPr>
-        </p:nvSpPr>
-        <p:spPr/>
-        <p:txBody>
-          <a:bodyPr/>
-          <a:lstStyle/>
-          <a:p>
-            <a:r>
-              <a:rPr lang="en-US" dirty="0"/>
-              <a:t>Problem set design</a:t>
-            </a:r>
-          </a:p>
-        </p:txBody>
-      </p:sp>
-      <p:sp>
-        <p:nvSpPr>
-          <p:cNvPr id="3" name="Content Placeholder 2">
-            <a:extLst>
-              <a:ext uri="{FF2B5EF4-FFF2-40B4-BE49-F238E27FC236}">
-                <a16:creationId xmlns:a16="http://schemas.microsoft.com/office/drawing/2014/main" id="{25A20195-AD7A-BF41-B9A7-2AEA2EA1601B}"/>
-              </a:ext>
-            </a:extLst>
-          </p:cNvPr>
-          <p:cNvSpPr>
-            <a:spLocks noGrp="1"/>
-          </p:cNvSpPr>
-          <p:nvPr>
-            <p:ph idx="1"/>
-          </p:nvPr>
-        </p:nvSpPr>
-        <p:spPr/>
-        <p:txBody>
-          <a:bodyPr>
-            <a:normAutofit/>
-          </a:bodyPr>
-          <a:lstStyle/>
-          <a:p>
-            <a:r>
-              <a:rPr lang="en-US" b="1" dirty="0"/>
-              <a:t>Objective</a:t>
-            </a:r>
-            <a:r>
-              <a:rPr lang="en-US" dirty="0"/>
-              <a:t>: Demonstrate the value-add of </a:t>
-            </a:r>
-            <a:r>
-              <a:rPr lang="en-US" dirty="0" err="1"/>
-              <a:t>Dask</a:t>
-            </a:r>
-            <a:r>
-              <a:rPr lang="en-US" dirty="0"/>
-              <a:t> by translating Pandas code.</a:t>
-            </a:r>
-          </a:p>
-          <a:p>
-            <a:r>
-              <a:rPr lang="en-US" b="1" dirty="0"/>
-              <a:t>Part III</a:t>
-            </a:r>
-            <a:r>
-              <a:rPr lang="en-US" dirty="0"/>
-              <a:t>:</a:t>
-            </a:r>
-          </a:p>
-          <a:p>
-            <a:pPr lvl="1"/>
-            <a:r>
-              <a:rPr lang="en-US" dirty="0"/>
-              <a:t>Find Distance</a:t>
-            </a:r>
-          </a:p>
-          <a:p>
-            <a:pPr lvl="2"/>
-            <a:r>
-              <a:rPr lang="en-US" dirty="0"/>
-              <a:t>Using </a:t>
-            </a:r>
-            <a:r>
-              <a:rPr lang="en-US" dirty="0" err="1"/>
-              <a:t>Dask</a:t>
-            </a:r>
-            <a:r>
-              <a:rPr lang="en-US" dirty="0"/>
-              <a:t> </a:t>
-            </a:r>
-            <a:r>
-              <a:rPr lang="en-US" dirty="0" err="1"/>
-              <a:t>Dataframe</a:t>
-            </a:r>
-            <a:r>
-              <a:rPr lang="en-US" dirty="0"/>
-              <a:t> and </a:t>
-            </a:r>
-            <a:r>
-              <a:rPr lang="en-US" dirty="0" err="1"/>
-              <a:t>Dask</a:t>
-            </a:r>
-            <a:r>
-              <a:rPr lang="en-US" dirty="0"/>
-              <a:t> Delayed, for each Yelp Review text, find the “most similar” review and extract its star value</a:t>
-            </a:r>
-          </a:p>
-          <a:p>
-            <a:pPr lvl="2"/>
-            <a:r>
-              <a:rPr lang="en-US" dirty="0"/>
-              <a:t>Calculate the MSE of star value vs. ”similar review” star value, using </a:t>
-            </a:r>
-            <a:r>
-              <a:rPr lang="en-US" dirty="0" err="1"/>
-              <a:t>Dask</a:t>
-            </a:r>
-            <a:r>
-              <a:rPr lang="en-US" dirty="0"/>
-              <a:t> Delayed</a:t>
-            </a:r>
-          </a:p>
-        </p:txBody>
-      </p:sp>
-    </p:spTree>
-    <p:extLst>
-      <p:ext uri="{BB962C8B-B14F-4D97-AF65-F5344CB8AC3E}">
-        <p14:creationId xmlns:p14="http://schemas.microsoft.com/office/powerpoint/2010/main" val="2627604873"/>
-      </p:ext>
-    </p:extLst>
-  </p:cSld>
-  <p:clrMapOvr>
-    <a:masterClrMapping/>
-  </p:clrMapOvr>
-</p:sld>
-</file>
-
-<file path=ppt/slides/slide11.xml><?xml version="1.0" encoding="utf-8"?>
-<p:sld xmlns:a="http://schemas.openxmlformats.org/drawingml/2006/main" xmlns:r="http://schemas.openxmlformats.org/officeDocument/2006/relationships" xmlns:p="http://schemas.openxmlformats.org/presentationml/2006/main">
-  <p:cSld>
-    <p:spTree>
-      <p:nvGrpSpPr>
-        <p:cNvPr id="1" name=""/>
-        <p:cNvGrpSpPr/>
-        <p:nvPr/>
-      </p:nvGrpSpPr>
-      <p:grpSpPr>
-        <a:xfrm>
-          <a:off x="0" y="0"/>
-          <a:ext cx="0" cy="0"/>
-          <a:chOff x="0" y="0"/>
-          <a:chExt cx="0" cy="0"/>
-        </a:xfrm>
-      </p:grpSpPr>
-      <p:sp>
-        <p:nvSpPr>
-          <p:cNvPr id="2" name="Title 1">
-            <a:extLst>
-              <a:ext uri="{FF2B5EF4-FFF2-40B4-BE49-F238E27FC236}">
-                <a16:creationId xmlns:a16="http://schemas.microsoft.com/office/drawing/2014/main" id="{5E4840F9-A2CA-B94E-89E0-41348C5F0EF5}"/>
-              </a:ext>
-            </a:extLst>
-          </p:cNvPr>
-          <p:cNvSpPr>
-            <a:spLocks noGrp="1"/>
-          </p:cNvSpPr>
-          <p:nvPr>
-            <p:ph type="title"/>
-          </p:nvPr>
-        </p:nvSpPr>
-        <p:spPr/>
-        <p:txBody>
-          <a:bodyPr/>
-          <a:lstStyle/>
-          <a:p>
-            <a:r>
-              <a:rPr lang="en-US" dirty="0"/>
-              <a:t>Lessons learned</a:t>
-            </a:r>
-          </a:p>
-        </p:txBody>
-      </p:sp>
-      <p:sp>
-        <p:nvSpPr>
-          <p:cNvPr id="3" name="Content Placeholder 2">
-            <a:extLst>
-              <a:ext uri="{FF2B5EF4-FFF2-40B4-BE49-F238E27FC236}">
-                <a16:creationId xmlns:a16="http://schemas.microsoft.com/office/drawing/2014/main" id="{25A20195-AD7A-BF41-B9A7-2AEA2EA1601B}"/>
-              </a:ext>
-            </a:extLst>
-          </p:cNvPr>
-          <p:cNvSpPr>
-            <a:spLocks noGrp="1"/>
-          </p:cNvSpPr>
-          <p:nvPr>
-            <p:ph idx="1"/>
-          </p:nvPr>
-        </p:nvSpPr>
-        <p:spPr/>
-        <p:txBody>
-          <a:bodyPr>
-            <a:normAutofit/>
-          </a:bodyPr>
-          <a:lstStyle/>
-          <a:p>
-            <a:r>
-              <a:rPr lang="en-US" dirty="0" err="1"/>
-              <a:t>Dask</a:t>
-            </a:r>
-            <a:r>
-              <a:rPr lang="en-US" dirty="0"/>
-              <a:t> is really fast and efficient!</a:t>
-            </a:r>
-          </a:p>
-          <a:p>
-            <a:r>
-              <a:rPr lang="en-US" dirty="0"/>
-              <a:t>Syntax is very similar to Pandas with some exceptions </a:t>
-            </a:r>
-          </a:p>
-          <a:p>
-            <a:pPr lvl="1"/>
-            <a:r>
-              <a:rPr lang="en-US" dirty="0"/>
-              <a:t>Struggled with custom functions in a .</a:t>
-            </a:r>
-            <a:r>
-              <a:rPr lang="en-US" dirty="0" err="1"/>
-              <a:t>groupby</a:t>
-            </a:r>
-            <a:r>
-              <a:rPr lang="en-US" dirty="0"/>
-              <a:t>().</a:t>
-            </a:r>
-            <a:r>
-              <a:rPr lang="en-US" dirty="0" err="1"/>
-              <a:t>agg</a:t>
-            </a:r>
-            <a:r>
-              <a:rPr lang="en-US" dirty="0"/>
-              <a:t>()</a:t>
-            </a:r>
-          </a:p>
-          <a:p>
-            <a:pPr lvl="1"/>
-            <a:r>
-              <a:rPr lang="en-US" dirty="0"/>
-              <a:t>Struggled with filtering </a:t>
-            </a:r>
-            <a:r>
-              <a:rPr lang="en-US" dirty="0" err="1"/>
-              <a:t>dataframe</a:t>
-            </a:r>
-            <a:r>
-              <a:rPr lang="en-US" dirty="0"/>
-              <a:t> by index</a:t>
-            </a:r>
-          </a:p>
-          <a:p>
-            <a:r>
-              <a:rPr lang="en-US" dirty="0"/>
-              <a:t>There may be things that </a:t>
-            </a:r>
-            <a:r>
-              <a:rPr lang="en-US" dirty="0" err="1"/>
-              <a:t>Dask</a:t>
-            </a:r>
-            <a:r>
-              <a:rPr lang="en-US" dirty="0"/>
-              <a:t> is worse at – or that I just did not discover successfully</a:t>
-            </a:r>
-          </a:p>
-          <a:p>
-            <a:pPr lvl="1"/>
-            <a:r>
-              <a:rPr lang="en-US" dirty="0"/>
-              <a:t>Random resampling </a:t>
-            </a:r>
-          </a:p>
-        </p:txBody>
-      </p:sp>
-    </p:spTree>
-    <p:extLst>
-      <p:ext uri="{BB962C8B-B14F-4D97-AF65-F5344CB8AC3E}">
-        <p14:creationId xmlns:p14="http://schemas.microsoft.com/office/powerpoint/2010/main" val="3754097124"/>
-      </p:ext>
-    </p:extLst>
-  </p:cSld>
-  <p:clrMapOvr>
-    <a:masterClrMapping/>
-  </p:clrMapOvr>
-</p:sld>
-</file>
-
-<file path=ppt/slides/slide2.xml><?xml version="1.0" encoding="utf-8"?>
-<p:sld xmlns:a="http://schemas.openxmlformats.org/drawingml/2006/main" xmlns:r="http://schemas.openxmlformats.org/officeDocument/2006/relationships" xmlns:p="http://schemas.openxmlformats.org/presentationml/2006/main">
-  <p:cSld>
-    <p:spTree>
-      <p:nvGrpSpPr>
-        <p:cNvPr id="1" name=""/>
-        <p:cNvGrpSpPr/>
-        <p:nvPr/>
-      </p:nvGrpSpPr>
-      <p:grpSpPr>
-        <a:xfrm>
-          <a:off x="0" y="0"/>
-          <a:ext cx="0" cy="0"/>
-          <a:chOff x="0" y="0"/>
-          <a:chExt cx="0" cy="0"/>
-        </a:xfrm>
-      </p:grpSpPr>
-      <p:sp>
-        <p:nvSpPr>
-          <p:cNvPr id="2" name="Title 1">
-            <a:extLst>
-              <a:ext uri="{FF2B5EF4-FFF2-40B4-BE49-F238E27FC236}">
-                <a16:creationId xmlns:a16="http://schemas.microsoft.com/office/drawing/2014/main" id="{CD06E69C-1BB9-E54A-B35D-52D638A5E1F0}"/>
-              </a:ext>
-            </a:extLst>
-          </p:cNvPr>
-          <p:cNvSpPr>
-            <a:spLocks noGrp="1"/>
-          </p:cNvSpPr>
-          <p:nvPr>
-            <p:ph type="title"/>
-          </p:nvPr>
-        </p:nvSpPr>
-        <p:spPr/>
-        <p:txBody>
-          <a:bodyPr/>
-          <a:lstStyle/>
-          <a:p>
-            <a:r>
-              <a:rPr lang="en-US" dirty="0"/>
-              <a:t>Why should I listen?</a:t>
-            </a:r>
-          </a:p>
-        </p:txBody>
-      </p:sp>
-      <p:sp>
-        <p:nvSpPr>
-          <p:cNvPr id="3" name="Content Placeholder 2">
-            <a:extLst>
-              <a:ext uri="{FF2B5EF4-FFF2-40B4-BE49-F238E27FC236}">
-                <a16:creationId xmlns:a16="http://schemas.microsoft.com/office/drawing/2014/main" id="{8E3420EE-91B7-5242-ADDA-22E576AF8E5E}"/>
-              </a:ext>
-            </a:extLst>
-          </p:cNvPr>
-          <p:cNvSpPr>
-            <a:spLocks noGrp="1"/>
-          </p:cNvSpPr>
-          <p:nvPr>
-            <p:ph idx="1"/>
-          </p:nvPr>
-        </p:nvSpPr>
-        <p:spPr/>
-        <p:txBody>
-          <a:bodyPr/>
-          <a:lstStyle/>
-          <a:p>
-            <a:pPr marL="0" indent="0">
-              <a:buNone/>
-            </a:pPr>
-            <a:r>
-              <a:rPr lang="en-US" dirty="0"/>
-              <a:t>You have feature engineering code in Pandas. </a:t>
-            </a:r>
-          </a:p>
-          <a:p>
-            <a:pPr marL="0" indent="0">
-              <a:buNone/>
-            </a:pPr>
-            <a:r>
-              <a:rPr lang="en-US" dirty="0"/>
-              <a:t>You can make it faster and more efficient with a minimal learning curve.</a:t>
-            </a:r>
-          </a:p>
-        </p:txBody>
-      </p:sp>
-    </p:spTree>
-    <p:extLst>
-      <p:ext uri="{BB962C8B-B14F-4D97-AF65-F5344CB8AC3E}">
-        <p14:creationId xmlns:p14="http://schemas.microsoft.com/office/powerpoint/2010/main" val="3397735896"/>
-      </p:ext>
-    </p:extLst>
-  </p:cSld>
-  <p:clrMapOvr>
-    <a:masterClrMapping/>
-  </p:clrMapOvr>
-</p:sld>
-</file>
-
-<file path=ppt/slides/slide3.xml><?xml version="1.0" encoding="utf-8"?>
-<p:sld xmlns:a="http://schemas.openxmlformats.org/drawingml/2006/main" xmlns:r="http://schemas.openxmlformats.org/officeDocument/2006/relationships" xmlns:p="http://schemas.openxmlformats.org/presentationml/2006/main">
-  <p:cSld>
-    <p:spTree>
-      <p:nvGrpSpPr>
-        <p:cNvPr id="1" name=""/>
-        <p:cNvGrpSpPr/>
-        <p:nvPr/>
-      </p:nvGrpSpPr>
-      <p:grpSpPr>
-        <a:xfrm>
-          <a:off x="0" y="0"/>
-          <a:ext cx="0" cy="0"/>
-          <a:chOff x="0" y="0"/>
-          <a:chExt cx="0" cy="0"/>
-        </a:xfrm>
-      </p:grpSpPr>
-      <p:sp>
-        <p:nvSpPr>
-          <p:cNvPr id="2" name="Title 1">
-            <a:extLst>
-              <a:ext uri="{FF2B5EF4-FFF2-40B4-BE49-F238E27FC236}">
-                <a16:creationId xmlns:a16="http://schemas.microsoft.com/office/drawing/2014/main" id="{DF9FE9F4-29F7-4743-BF2E-CDC60CA12B4B}"/>
-              </a:ext>
-            </a:extLst>
-          </p:cNvPr>
-          <p:cNvSpPr>
-            <a:spLocks noGrp="1"/>
-          </p:cNvSpPr>
-          <p:nvPr>
-            <p:ph type="title"/>
-          </p:nvPr>
-        </p:nvSpPr>
-        <p:spPr/>
-        <p:txBody>
-          <a:bodyPr/>
-          <a:lstStyle/>
-          <a:p>
-            <a:r>
-              <a:rPr lang="en-US" dirty="0"/>
-              <a:t>THE data</a:t>
-            </a:r>
-          </a:p>
-        </p:txBody>
-      </p:sp>
-      <p:pic>
-        <p:nvPicPr>
-          <p:cNvPr id="13" name="Picture 12">
-            <a:extLst>
-              <a:ext uri="{FF2B5EF4-FFF2-40B4-BE49-F238E27FC236}">
-                <a16:creationId xmlns:a16="http://schemas.microsoft.com/office/drawing/2014/main" id="{BA739B04-DC75-0F46-BF86-AB288307051E}"/>
-              </a:ext>
-            </a:extLst>
-          </p:cNvPr>
-          <p:cNvPicPr>
-            <a:picLocks noChangeAspect="1"/>
-          </p:cNvPicPr>
-          <p:nvPr/>
-        </p:nvPicPr>
-        <p:blipFill>
-          <a:blip r:embed="rId2">
-            <a:extLst>
-              <a:ext uri="{28A0092B-C50C-407E-A947-70E740481C1C}">
-                <a14:useLocalDpi xmlns:a14="http://schemas.microsoft.com/office/drawing/2010/main" val="0"/>
-              </a:ext>
-            </a:extLst>
-          </a:blip>
-          <a:stretch>
-            <a:fillRect/>
-          </a:stretch>
-        </p:blipFill>
-        <p:spPr>
-          <a:xfrm>
-            <a:off x="936172" y="2310471"/>
-            <a:ext cx="10580914" cy="1261245"/>
-          </a:xfrm>
-          <a:prstGeom prst="rect">
-            <a:avLst/>
-          </a:prstGeom>
-        </p:spPr>
-      </p:pic>
-      <p:sp>
-        <p:nvSpPr>
-          <p:cNvPr id="14" name="TextBox 13">
-            <a:extLst>
-              <a:ext uri="{FF2B5EF4-FFF2-40B4-BE49-F238E27FC236}">
-                <a16:creationId xmlns:a16="http://schemas.microsoft.com/office/drawing/2014/main" id="{A0CE6EB2-8BE7-B449-B477-7763161E6FA9}"/>
-              </a:ext>
-            </a:extLst>
-          </p:cNvPr>
-          <p:cNvSpPr txBox="1"/>
-          <p:nvPr/>
-        </p:nvSpPr>
-        <p:spPr>
-          <a:xfrm>
-            <a:off x="1153887" y="4005943"/>
-            <a:ext cx="10580914" cy="1200329"/>
-          </a:xfrm>
-          <a:prstGeom prst="rect">
-            <a:avLst/>
-          </a:prstGeom>
-          <a:noFill/>
-        </p:spPr>
-        <p:txBody>
-          <a:bodyPr wrap="square" rtlCol="0">
-            <a:spAutoFit/>
-          </a:bodyPr>
-          <a:lstStyle/>
-          <a:p>
-            <a:pPr marL="285750" indent="-285750">
-              <a:buFontTx/>
-              <a:buChar char="-"/>
-            </a:pPr>
-            <a:r>
-              <a:rPr lang="en-US" dirty="0"/>
-              <a:t>1,000,000 Rows</a:t>
-            </a:r>
-          </a:p>
-          <a:p>
-            <a:pPr marL="285750" indent="-285750">
-              <a:buFontTx/>
-              <a:buChar char="-"/>
-            </a:pPr>
-            <a:r>
-              <a:rPr lang="en-US" dirty="0"/>
-              <a:t>Subset of Yelp Reviews dataset found on Kaggle: </a:t>
-            </a:r>
-          </a:p>
-          <a:p>
-            <a:pPr marL="742950" lvl="1" indent="-285750">
-              <a:buFontTx/>
-              <a:buChar char="-"/>
-            </a:pPr>
-            <a:r>
-              <a:rPr lang="en-US" u="sng" dirty="0">
-                <a:hlinkClick r:id="rId3"/>
-              </a:rPr>
-              <a:t>https://www.kaggle.com/luisfredgs/yelp-reviews-csv#yelp_review.csv</a:t>
-            </a:r>
-            <a:r>
-              <a:rPr lang="en-US" dirty="0"/>
-              <a:t> </a:t>
-            </a:r>
-          </a:p>
-          <a:p>
-            <a:pPr marL="285750" indent="-285750">
-              <a:buFontTx/>
-              <a:buChar char="-"/>
-            </a:pPr>
-            <a:endParaRPr lang="en-US" dirty="0"/>
-          </a:p>
-        </p:txBody>
-      </p:sp>
-    </p:spTree>
-    <p:extLst>
-      <p:ext uri="{BB962C8B-B14F-4D97-AF65-F5344CB8AC3E}">
-        <p14:creationId xmlns:p14="http://schemas.microsoft.com/office/powerpoint/2010/main" val="3567882788"/>
-      </p:ext>
-    </p:extLst>
-  </p:cSld>
-  <p:clrMapOvr>
-    <a:masterClrMapping/>
-  </p:clrMapOvr>
-</p:sld>
-</file>
-
-<file path=ppt/slides/slide4.xml><?xml version="1.0" encoding="utf-8"?>
-<p:sld xmlns:a="http://schemas.openxmlformats.org/drawingml/2006/main" xmlns:r="http://schemas.openxmlformats.org/officeDocument/2006/relationships" xmlns:p="http://schemas.openxmlformats.org/presentationml/2006/main">
-  <p:cSld>
-    <p:spTree>
-      <p:nvGrpSpPr>
-        <p:cNvPr id="1" name=""/>
-        <p:cNvGrpSpPr/>
-        <p:nvPr/>
-      </p:nvGrpSpPr>
-      <p:grpSpPr>
-        <a:xfrm>
-          <a:off x="0" y="0"/>
-          <a:ext cx="0" cy="0"/>
-          <a:chOff x="0" y="0"/>
-          <a:chExt cx="0" cy="0"/>
-        </a:xfrm>
-      </p:grpSpPr>
-      <p:sp>
-        <p:nvSpPr>
-          <p:cNvPr id="2" name="Title 1">
-            <a:extLst>
-              <a:ext uri="{FF2B5EF4-FFF2-40B4-BE49-F238E27FC236}">
-                <a16:creationId xmlns:a16="http://schemas.microsoft.com/office/drawing/2014/main" id="{5E4840F9-A2CA-B94E-89E0-41348C5F0EF5}"/>
-              </a:ext>
-            </a:extLst>
-          </p:cNvPr>
-          <p:cNvSpPr>
-            <a:spLocks noGrp="1"/>
-          </p:cNvSpPr>
-          <p:nvPr>
-            <p:ph type="title"/>
-          </p:nvPr>
-        </p:nvSpPr>
-        <p:spPr/>
-        <p:txBody>
-          <a:bodyPr/>
-          <a:lstStyle/>
-          <a:p>
-            <a:r>
-              <a:rPr lang="en-US" dirty="0"/>
-              <a:t>Problem set design</a:t>
-            </a:r>
-          </a:p>
-        </p:txBody>
-      </p:sp>
-      <p:sp>
-        <p:nvSpPr>
-          <p:cNvPr id="3" name="Content Placeholder 2">
-            <a:extLst>
-              <a:ext uri="{FF2B5EF4-FFF2-40B4-BE49-F238E27FC236}">
-                <a16:creationId xmlns:a16="http://schemas.microsoft.com/office/drawing/2014/main" id="{25A20195-AD7A-BF41-B9A7-2AEA2EA1601B}"/>
-              </a:ext>
-            </a:extLst>
-          </p:cNvPr>
-          <p:cNvSpPr>
-            <a:spLocks noGrp="1"/>
-          </p:cNvSpPr>
-          <p:nvPr>
-            <p:ph idx="1"/>
-          </p:nvPr>
-        </p:nvSpPr>
-        <p:spPr/>
-        <p:txBody>
-          <a:bodyPr>
-            <a:normAutofit/>
-          </a:bodyPr>
-          <a:lstStyle/>
-          <a:p>
-            <a:r>
-              <a:rPr lang="en-US" b="1" dirty="0"/>
-              <a:t>Objective</a:t>
-            </a:r>
-            <a:r>
-              <a:rPr lang="en-US" dirty="0"/>
-              <a:t>: Demonstrate the value-add of </a:t>
-            </a:r>
-            <a:r>
-              <a:rPr lang="en-US" dirty="0" err="1"/>
-              <a:t>Dask</a:t>
-            </a:r>
-            <a:r>
-              <a:rPr lang="en-US" dirty="0"/>
-              <a:t> by translating Pandas code.</a:t>
-            </a:r>
-          </a:p>
-          <a:p>
-            <a:r>
-              <a:rPr lang="en-US" b="1" dirty="0"/>
-              <a:t>Part I</a:t>
-            </a:r>
-            <a:r>
-              <a:rPr lang="en-US" dirty="0"/>
-              <a:t>:</a:t>
-            </a:r>
-          </a:p>
-          <a:p>
-            <a:pPr lvl="1"/>
-            <a:r>
-              <a:rPr lang="en-US" dirty="0"/>
-              <a:t>Clone </a:t>
-            </a:r>
-            <a:r>
-              <a:rPr lang="en-US" dirty="0" err="1"/>
-              <a:t>Pset</a:t>
-            </a:r>
-            <a:r>
-              <a:rPr lang="en-US" dirty="0"/>
-              <a:t> 2:  word embeddings &amp; neighbors using demographic survey data</a:t>
-            </a:r>
-          </a:p>
-          <a:p>
-            <a:pPr lvl="2"/>
-            <a:r>
-              <a:rPr lang="en-US" dirty="0"/>
-              <a:t>Yelp Review dataset instead of Demographic Survey</a:t>
-            </a:r>
-          </a:p>
-          <a:p>
-            <a:pPr lvl="2"/>
-            <a:r>
-              <a:rPr lang="en-US" dirty="0"/>
-              <a:t>Repurpose code to use </a:t>
-            </a:r>
-            <a:r>
-              <a:rPr lang="en-US" dirty="0" err="1"/>
-              <a:t>Dask</a:t>
-            </a:r>
-            <a:r>
-              <a:rPr lang="en-US" dirty="0"/>
-              <a:t> </a:t>
-            </a:r>
-            <a:r>
-              <a:rPr lang="en-US" dirty="0" err="1"/>
-              <a:t>Dataframes</a:t>
-            </a:r>
-            <a:r>
-              <a:rPr lang="en-US" dirty="0"/>
-              <a:t> &amp; compare time spent</a:t>
-            </a:r>
-          </a:p>
-          <a:p>
-            <a:pPr lvl="2"/>
-            <a:r>
-              <a:rPr lang="en-US" dirty="0"/>
-              <a:t>Run </a:t>
-            </a:r>
-            <a:r>
-              <a:rPr lang="en-US" dirty="0" err="1"/>
-              <a:t>WordEmbedding</a:t>
-            </a:r>
-            <a:r>
-              <a:rPr lang="en-US" dirty="0"/>
-              <a:t> using </a:t>
-            </a:r>
-            <a:r>
-              <a:rPr lang="en-US" dirty="0" err="1"/>
-              <a:t>Dask</a:t>
-            </a:r>
-            <a:r>
-              <a:rPr lang="en-US" dirty="0"/>
-              <a:t> Delayed &amp; compare time spent</a:t>
-            </a:r>
-          </a:p>
-          <a:p>
-            <a:pPr lvl="2"/>
-            <a:r>
-              <a:rPr lang="en-US" dirty="0"/>
-              <a:t>Visualize the </a:t>
-            </a:r>
-            <a:r>
-              <a:rPr lang="en-US" dirty="0" err="1"/>
-              <a:t>Dask</a:t>
-            </a:r>
-            <a:r>
-              <a:rPr lang="en-US" dirty="0"/>
-              <a:t> computation graph</a:t>
-            </a:r>
-          </a:p>
-        </p:txBody>
-      </p:sp>
-    </p:spTree>
-    <p:extLst>
-      <p:ext uri="{BB962C8B-B14F-4D97-AF65-F5344CB8AC3E}">
-        <p14:creationId xmlns:p14="http://schemas.microsoft.com/office/powerpoint/2010/main" val="179330974"/>
-      </p:ext>
-    </p:extLst>
-  </p:cSld>
-  <p:clrMapOvr>
-    <a:masterClrMapping/>
-  </p:clrMapOvr>
-</p:sld>
-</file>
-
-<file path=ppt/slides/slide5.xml><?xml version="1.0" encoding="utf-8"?>
-<p:sld xmlns:a="http://schemas.openxmlformats.org/drawingml/2006/main" xmlns:r="http://schemas.openxmlformats.org/officeDocument/2006/relationships" xmlns:p="http://schemas.openxmlformats.org/presentationml/2006/main">
-  <p:cSld>
-    <p:spTree>
-      <p:nvGrpSpPr>
-        <p:cNvPr id="1" name=""/>
-        <p:cNvGrpSpPr/>
-        <p:nvPr/>
-      </p:nvGrpSpPr>
-      <p:grpSpPr>
-        <a:xfrm>
-          <a:off x="0" y="0"/>
-          <a:ext cx="0" cy="0"/>
-          <a:chOff x="0" y="0"/>
-          <a:chExt cx="0" cy="0"/>
-        </a:xfrm>
-      </p:grpSpPr>
-      <p:pic>
-        <p:nvPicPr>
-          <p:cNvPr id="9" name="Picture 8">
-            <a:extLst>
-              <a:ext uri="{FF2B5EF4-FFF2-40B4-BE49-F238E27FC236}">
-                <a16:creationId xmlns:a16="http://schemas.microsoft.com/office/drawing/2014/main" id="{3FA09E8B-1D51-104D-8179-143F7D2C9157}"/>
-              </a:ext>
-            </a:extLst>
-          </p:cNvPr>
-          <p:cNvPicPr>
-            <a:picLocks noChangeAspect="1"/>
-          </p:cNvPicPr>
-          <p:nvPr/>
-        </p:nvPicPr>
-        <p:blipFill>
-          <a:blip r:embed="rId2">
-            <a:extLst>
-              <a:ext uri="{28A0092B-C50C-407E-A947-70E740481C1C}">
-                <a14:useLocalDpi xmlns:a14="http://schemas.microsoft.com/office/drawing/2010/main" val="0"/>
-              </a:ext>
-            </a:extLst>
-          </a:blip>
-          <a:stretch>
-            <a:fillRect/>
-          </a:stretch>
-        </p:blipFill>
-        <p:spPr>
-          <a:xfrm>
-            <a:off x="437598" y="1498049"/>
-            <a:ext cx="5194300" cy="3644900"/>
-          </a:xfrm>
-          <a:prstGeom prst="rect">
-            <a:avLst/>
-          </a:prstGeom>
-        </p:spPr>
-      </p:pic>
-      <p:pic>
-        <p:nvPicPr>
-          <p:cNvPr id="11" name="Picture 10">
-            <a:extLst>
-              <a:ext uri="{FF2B5EF4-FFF2-40B4-BE49-F238E27FC236}">
-                <a16:creationId xmlns:a16="http://schemas.microsoft.com/office/drawing/2014/main" id="{D9BA2D9B-711F-674F-AF72-E5D6A3045D1C}"/>
-              </a:ext>
-            </a:extLst>
-          </p:cNvPr>
-          <p:cNvPicPr>
-            <a:picLocks noChangeAspect="1"/>
-          </p:cNvPicPr>
-          <p:nvPr/>
-        </p:nvPicPr>
-        <p:blipFill>
-          <a:blip r:embed="rId3">
-            <a:extLst>
-              <a:ext uri="{28A0092B-C50C-407E-A947-70E740481C1C}">
-                <a14:useLocalDpi xmlns:a14="http://schemas.microsoft.com/office/drawing/2010/main" val="0"/>
-              </a:ext>
-            </a:extLst>
-          </a:blip>
-          <a:stretch>
-            <a:fillRect/>
-          </a:stretch>
-        </p:blipFill>
-        <p:spPr>
-          <a:xfrm>
-            <a:off x="6099048" y="1450009"/>
-            <a:ext cx="5232400" cy="4064000"/>
-          </a:xfrm>
-          <a:prstGeom prst="rect">
-            <a:avLst/>
-          </a:prstGeom>
-        </p:spPr>
-      </p:pic>
-      <p:sp>
-        <p:nvSpPr>
-          <p:cNvPr id="12" name="TextBox 11">
-            <a:extLst>
-              <a:ext uri="{FF2B5EF4-FFF2-40B4-BE49-F238E27FC236}">
-                <a16:creationId xmlns:a16="http://schemas.microsoft.com/office/drawing/2014/main" id="{6F6D9EF3-57E0-0349-8E8E-76551273C6B0}"/>
-              </a:ext>
-            </a:extLst>
-          </p:cNvPr>
-          <p:cNvSpPr txBox="1"/>
-          <p:nvPr/>
-        </p:nvSpPr>
-        <p:spPr>
-          <a:xfrm>
-            <a:off x="437598" y="1048994"/>
-            <a:ext cx="1009956" cy="369332"/>
-          </a:xfrm>
-          <a:prstGeom prst="rect">
-            <a:avLst/>
-          </a:prstGeom>
-          <a:noFill/>
-        </p:spPr>
-        <p:txBody>
-          <a:bodyPr wrap="none" rtlCol="0">
-            <a:spAutoFit/>
-          </a:bodyPr>
-          <a:lstStyle/>
-          <a:p>
-            <a:r>
-              <a:rPr lang="en-US" b="1" dirty="0"/>
-              <a:t>Pandas</a:t>
-            </a:r>
-          </a:p>
-        </p:txBody>
-      </p:sp>
-      <p:sp>
-        <p:nvSpPr>
-          <p:cNvPr id="13" name="TextBox 12">
-            <a:extLst>
-              <a:ext uri="{FF2B5EF4-FFF2-40B4-BE49-F238E27FC236}">
-                <a16:creationId xmlns:a16="http://schemas.microsoft.com/office/drawing/2014/main" id="{5EE22F68-6FA1-3046-9C97-D0099CD4DD6C}"/>
-              </a:ext>
-            </a:extLst>
-          </p:cNvPr>
-          <p:cNvSpPr txBox="1"/>
-          <p:nvPr/>
-        </p:nvSpPr>
-        <p:spPr>
-          <a:xfrm>
-            <a:off x="6099048" y="1010966"/>
-            <a:ext cx="769763" cy="369332"/>
-          </a:xfrm>
-          <a:prstGeom prst="rect">
-            <a:avLst/>
-          </a:prstGeom>
-          <a:noFill/>
-        </p:spPr>
-        <p:txBody>
-          <a:bodyPr wrap="none" rtlCol="0">
-            <a:spAutoFit/>
-          </a:bodyPr>
-          <a:lstStyle/>
-          <a:p>
-            <a:r>
-              <a:rPr lang="en-US" b="1" dirty="0" err="1"/>
-              <a:t>Dask</a:t>
-            </a:r>
-            <a:endParaRPr lang="en-US" b="1" dirty="0"/>
-          </a:p>
-        </p:txBody>
-      </p:sp>
-    </p:spTree>
-    <p:extLst>
-      <p:ext uri="{BB962C8B-B14F-4D97-AF65-F5344CB8AC3E}">
-        <p14:creationId xmlns:p14="http://schemas.microsoft.com/office/powerpoint/2010/main" val="2755147023"/>
-      </p:ext>
-    </p:extLst>
-  </p:cSld>
-  <p:clrMapOvr>
-    <a:masterClrMapping/>
-  </p:clrMapOvr>
-</p:sld>
-</file>
-
-<file path=ppt/slides/slide6.xml><?xml version="1.0" encoding="utf-8"?>
-<p:sld xmlns:a="http://schemas.openxmlformats.org/drawingml/2006/main" xmlns:r="http://schemas.openxmlformats.org/officeDocument/2006/relationships" xmlns:p="http://schemas.openxmlformats.org/presentationml/2006/main">
-  <p:cSld>
-    <p:spTree>
-      <p:nvGrpSpPr>
-        <p:cNvPr id="1" name=""/>
-        <p:cNvGrpSpPr/>
-        <p:nvPr/>
-      </p:nvGrpSpPr>
-      <p:grpSpPr>
-        <a:xfrm>
-          <a:off x="0" y="0"/>
-          <a:ext cx="0" cy="0"/>
-          <a:chOff x="0" y="0"/>
-          <a:chExt cx="0" cy="0"/>
-        </a:xfrm>
-      </p:grpSpPr>
-      <p:sp>
-        <p:nvSpPr>
-          <p:cNvPr id="2" name="Title 1">
-            <a:extLst>
-              <a:ext uri="{FF2B5EF4-FFF2-40B4-BE49-F238E27FC236}">
                 <a16:creationId xmlns:a16="http://schemas.microsoft.com/office/drawing/2014/main" id="{CF2450B0-B0BE-7D40-AAD1-85278E85080B}"/>
               </a:ext>
             </a:extLst>
@@ -5654,103 +4707,12 @@
           </a:p>
         </p:txBody>
       </p:sp>
-      <p:grpSp>
-        <p:nvGrpSpPr>
-          <p:cNvPr id="3" name="Group 2">
-            <a:extLst>
-              <a:ext uri="{FF2B5EF4-FFF2-40B4-BE49-F238E27FC236}">
-                <a16:creationId xmlns:a16="http://schemas.microsoft.com/office/drawing/2014/main" id="{665E9489-B827-6B46-B720-F9483EB23E24}"/>
-              </a:ext>
-            </a:extLst>
-          </p:cNvPr>
-          <p:cNvGrpSpPr/>
-          <p:nvPr/>
-        </p:nvGrpSpPr>
-        <p:grpSpPr>
-          <a:xfrm>
-            <a:off x="1970433" y="2655405"/>
-            <a:ext cx="8039100" cy="1918253"/>
-            <a:chOff x="2076450" y="1409700"/>
-            <a:chExt cx="8039100" cy="1918253"/>
-          </a:xfrm>
-        </p:grpSpPr>
-        <p:pic>
-          <p:nvPicPr>
-            <p:cNvPr id="4" name="Picture 3">
-              <a:extLst>
-                <a:ext uri="{FF2B5EF4-FFF2-40B4-BE49-F238E27FC236}">
-                  <a16:creationId xmlns:a16="http://schemas.microsoft.com/office/drawing/2014/main" id="{D61A4037-98B3-A046-9645-E6F1D7B0CF05}"/>
-                </a:ext>
-              </a:extLst>
-            </p:cNvPr>
-            <p:cNvPicPr>
-              <a:picLocks noChangeAspect="1"/>
-            </p:cNvPicPr>
-            <p:nvPr/>
-          </p:nvPicPr>
-          <p:blipFill rotWithShape="1">
-            <a:blip r:embed="rId2">
-              <a:extLst>
-                <a:ext uri="{28A0092B-C50C-407E-A947-70E740481C1C}">
-                  <a14:useLocalDpi xmlns:a14="http://schemas.microsoft.com/office/drawing/2010/main" val="0"/>
-                </a:ext>
-              </a:extLst>
-            </a:blip>
-            <a:srcRect b="72559"/>
-            <a:stretch/>
-          </p:blipFill>
-          <p:spPr>
-            <a:xfrm>
-              <a:off x="2076450" y="1409700"/>
-              <a:ext cx="8039100" cy="1108213"/>
-            </a:xfrm>
-            <a:prstGeom prst="rect">
-              <a:avLst/>
-            </a:prstGeom>
-          </p:spPr>
-        </p:pic>
-        <p:pic>
-          <p:nvPicPr>
-            <p:cNvPr id="5" name="Picture 4">
-              <a:extLst>
-                <a:ext uri="{FF2B5EF4-FFF2-40B4-BE49-F238E27FC236}">
-                  <a16:creationId xmlns:a16="http://schemas.microsoft.com/office/drawing/2014/main" id="{21472C34-B4EC-F343-BC57-73B8D4DC543C}"/>
-                </a:ext>
-              </a:extLst>
-            </p:cNvPr>
-            <p:cNvPicPr>
-              <a:picLocks noChangeAspect="1"/>
-            </p:cNvPicPr>
-            <p:nvPr/>
-          </p:nvPicPr>
-          <p:blipFill rotWithShape="1">
-            <a:blip r:embed="rId2">
-              <a:extLst>
-                <a:ext uri="{28A0092B-C50C-407E-A947-70E740481C1C}">
-                  <a14:useLocalDpi xmlns:a14="http://schemas.microsoft.com/office/drawing/2010/main" val="0"/>
-                </a:ext>
-              </a:extLst>
-            </a:blip>
-            <a:srcRect t="79286"/>
-            <a:stretch/>
-          </p:blipFill>
-          <p:spPr>
-            <a:xfrm>
-              <a:off x="2076450" y="2491410"/>
-              <a:ext cx="8039100" cy="836543"/>
-            </a:xfrm>
-            <a:prstGeom prst="rect">
-              <a:avLst/>
-            </a:prstGeom>
-          </p:spPr>
-        </p:pic>
-      </p:grpSp>
       <p:sp>
         <p:nvSpPr>
           <p:cNvPr id="6" name="Text Placeholder 1">
             <a:extLst>
               <a:ext uri="{FF2B5EF4-FFF2-40B4-BE49-F238E27FC236}">
-                <a16:creationId xmlns:a16="http://schemas.microsoft.com/office/drawing/2014/main" id="{FF0D8849-C427-5448-8F48-7D3361184E7B}"/>
+                <a16:creationId xmlns:a16="http://schemas.microsoft.com/office/drawing/2014/main" id="{426C5DC4-ED46-A442-A654-3FAB477A84D4}"/>
               </a:ext>
             </a:extLst>
           </p:cNvPr>
@@ -6041,10 +5003,196 @@
           </a:p>
         </p:txBody>
       </p:sp>
+      <p:pic>
+        <p:nvPicPr>
+          <p:cNvPr id="8" name="Picture 7">
+            <a:extLst>
+              <a:ext uri="{FF2B5EF4-FFF2-40B4-BE49-F238E27FC236}">
+                <a16:creationId xmlns:a16="http://schemas.microsoft.com/office/drawing/2014/main" id="{B3DD80CF-16F5-9349-A17C-925B4B353FA9}"/>
+              </a:ext>
+            </a:extLst>
+          </p:cNvPr>
+          <p:cNvPicPr>
+            <a:picLocks noChangeAspect="1"/>
+          </p:cNvPicPr>
+          <p:nvPr/>
+        </p:nvPicPr>
+        <p:blipFill>
+          <a:blip r:embed="rId2">
+            <a:extLst>
+              <a:ext uri="{28A0092B-C50C-407E-A947-70E740481C1C}">
+                <a14:useLocalDpi xmlns:a14="http://schemas.microsoft.com/office/drawing/2010/main" val="0"/>
+              </a:ext>
+            </a:extLst>
+          </a:blip>
+          <a:stretch>
+            <a:fillRect/>
+          </a:stretch>
+        </p:blipFill>
+        <p:spPr>
+          <a:xfrm>
+            <a:off x="4331282" y="335063"/>
+            <a:ext cx="6889731" cy="6019353"/>
+          </a:xfrm>
+          <a:prstGeom prst="rect">
+            <a:avLst/>
+          </a:prstGeom>
+        </p:spPr>
+      </p:pic>
+      <p:sp>
+        <p:nvSpPr>
+          <p:cNvPr id="9" name="Frame 8">
+            <a:extLst>
+              <a:ext uri="{FF2B5EF4-FFF2-40B4-BE49-F238E27FC236}">
+                <a16:creationId xmlns:a16="http://schemas.microsoft.com/office/drawing/2014/main" id="{850AD4E0-D37C-764E-B8CD-67389F0F89BC}"/>
+              </a:ext>
+            </a:extLst>
+          </p:cNvPr>
+          <p:cNvSpPr/>
+          <p:nvPr/>
+        </p:nvSpPr>
+        <p:spPr>
+          <a:xfrm>
+            <a:off x="7646505" y="484631"/>
+            <a:ext cx="1325217" cy="323751"/>
+          </a:xfrm>
+          <a:prstGeom prst="frame">
+            <a:avLst/>
+          </a:prstGeom>
+        </p:spPr>
+        <p:style>
+          <a:lnRef idx="2">
+            <a:schemeClr val="accent1">
+              <a:shade val="50000"/>
+            </a:schemeClr>
+          </a:lnRef>
+          <a:fillRef idx="1">
+            <a:schemeClr val="accent1"/>
+          </a:fillRef>
+          <a:effectRef idx="0">
+            <a:schemeClr val="accent1"/>
+          </a:effectRef>
+          <a:fontRef idx="minor">
+            <a:schemeClr val="lt1"/>
+          </a:fontRef>
+        </p:style>
+        <p:txBody>
+          <a:bodyPr rtlCol="0" anchor="ctr"/>
+          <a:lstStyle/>
+          <a:p>
+            <a:pPr algn="ctr"/>
+            <a:endParaRPr lang="en-US">
+              <a:solidFill>
+                <a:schemeClr val="tx1"/>
+              </a:solidFill>
+            </a:endParaRPr>
+          </a:p>
+        </p:txBody>
+      </p:sp>
+      <p:sp>
+        <p:nvSpPr>
+          <p:cNvPr id="10" name="Frame 9">
+            <a:extLst>
+              <a:ext uri="{FF2B5EF4-FFF2-40B4-BE49-F238E27FC236}">
+                <a16:creationId xmlns:a16="http://schemas.microsoft.com/office/drawing/2014/main" id="{D88E0AB3-92DE-FC49-AFE4-CE7A039A77F6}"/>
+              </a:ext>
+            </a:extLst>
+          </p:cNvPr>
+          <p:cNvSpPr/>
+          <p:nvPr/>
+        </p:nvSpPr>
+        <p:spPr>
+          <a:xfrm>
+            <a:off x="7308574" y="2558596"/>
+            <a:ext cx="1325217" cy="323751"/>
+          </a:xfrm>
+          <a:prstGeom prst="frame">
+            <a:avLst/>
+          </a:prstGeom>
+        </p:spPr>
+        <p:style>
+          <a:lnRef idx="2">
+            <a:schemeClr val="accent1">
+              <a:shade val="50000"/>
+            </a:schemeClr>
+          </a:lnRef>
+          <a:fillRef idx="1">
+            <a:schemeClr val="accent1"/>
+          </a:fillRef>
+          <a:effectRef idx="0">
+            <a:schemeClr val="accent1"/>
+          </a:effectRef>
+          <a:fontRef idx="minor">
+            <a:schemeClr val="lt1"/>
+          </a:fontRef>
+        </p:style>
+        <p:txBody>
+          <a:bodyPr rtlCol="0" anchor="ctr"/>
+          <a:lstStyle/>
+          <a:p>
+            <a:pPr algn="ctr"/>
+            <a:endParaRPr lang="en-US">
+              <a:solidFill>
+                <a:schemeClr val="tx1"/>
+              </a:solidFill>
+            </a:endParaRPr>
+          </a:p>
+        </p:txBody>
+      </p:sp>
+      <p:sp>
+        <p:nvSpPr>
+          <p:cNvPr id="12" name="Frame 11">
+            <a:extLst>
+              <a:ext uri="{FF2B5EF4-FFF2-40B4-BE49-F238E27FC236}">
+                <a16:creationId xmlns:a16="http://schemas.microsoft.com/office/drawing/2014/main" id="{D77FDB7F-F200-9249-B933-60079BABCA38}"/>
+              </a:ext>
+            </a:extLst>
+          </p:cNvPr>
+          <p:cNvSpPr/>
+          <p:nvPr/>
+        </p:nvSpPr>
+        <p:spPr>
+          <a:xfrm>
+            <a:off x="8209721" y="4645813"/>
+            <a:ext cx="1305340" cy="390013"/>
+          </a:xfrm>
+          <a:prstGeom prst="frame">
+            <a:avLst/>
+          </a:prstGeom>
+        </p:spPr>
+        <p:style>
+          <a:lnRef idx="2">
+            <a:schemeClr val="accent1">
+              <a:shade val="50000"/>
+            </a:schemeClr>
+          </a:lnRef>
+          <a:fillRef idx="1">
+            <a:schemeClr val="accent1"/>
+          </a:fillRef>
+          <a:effectRef idx="0">
+            <a:schemeClr val="accent1"/>
+          </a:effectRef>
+          <a:fontRef idx="minor">
+            <a:schemeClr val="lt1"/>
+          </a:fontRef>
+        </p:style>
+        <p:txBody>
+          <a:bodyPr rtlCol="0" anchor="ctr"/>
+          <a:lstStyle/>
+          <a:p>
+            <a:pPr algn="ctr"/>
+            <a:endParaRPr lang="en-US">
+              <a:solidFill>
+                <a:schemeClr val="tx1"/>
+              </a:solidFill>
+            </a:endParaRPr>
+          </a:p>
+        </p:txBody>
+      </p:sp>
     </p:spTree>
     <p:extLst>
       <p:ext uri="{BB962C8B-B14F-4D97-AF65-F5344CB8AC3E}">
-        <p14:creationId xmlns:p14="http://schemas.microsoft.com/office/powerpoint/2010/main" val="2408060063"/>
+        <p14:creationId xmlns:p14="http://schemas.microsoft.com/office/powerpoint/2010/main" val="1533725318"/>
       </p:ext>
     </p:extLst>
   </p:cSld>
@@ -6054,7 +5202,7 @@
 </p:sld>
 </file>
 
-<file path=ppt/slides/slide7.xml><?xml version="1.0" encoding="utf-8"?>
+<file path=ppt/slides/slide11.xml><?xml version="1.0" encoding="utf-8"?>
 <p:sld xmlns:a="http://schemas.openxmlformats.org/drawingml/2006/main" xmlns:r="http://schemas.openxmlformats.org/officeDocument/2006/relationships" xmlns:p="http://schemas.openxmlformats.org/presentationml/2006/main">
   <p:cSld>
     <p:spTree>
@@ -6094,7 +5242,7 @@
           <a:p>
             <a:r>
               <a:rPr lang="en-US" dirty="0"/>
-              <a:t>Problem set design</a:t>
+              <a:t>Part 3</a:t>
             </a:r>
           </a:p>
         </p:txBody>
@@ -6123,12 +5271,15 @@
           <a:lstStyle/>
           <a:p>
             <a:r>
-              <a:rPr lang="en-US" b="1" dirty="0"/>
-              <a:t>Objective</a:t>
-            </a:r>
-            <a:r>
               <a:rPr lang="en-US" dirty="0"/>
-              <a:t>: Demonstrate the value-add of </a:t>
+              <a:t>Find Distance</a:t>
+            </a:r>
+          </a:p>
+          <a:p>
+            <a:pPr lvl="1"/>
+            <a:r>
+              <a:rPr lang="en-US" dirty="0"/>
+              <a:t>Using </a:t>
             </a:r>
             <a:r>
               <a:rPr lang="en-US" dirty="0" err="1"/>
@@ -6136,31 +5287,15 @@
             </a:r>
             <a:r>
               <a:rPr lang="en-US" dirty="0"/>
-              <a:t> by translating Pandas code.</a:t>
-            </a:r>
-          </a:p>
-          <a:p>
-            <a:r>
-              <a:rPr lang="en-US" b="1" dirty="0"/>
-              <a:t>Part II</a:t>
+              <a:t> </a:t>
+            </a:r>
+            <a:r>
+              <a:rPr lang="en-US" dirty="0" err="1"/>
+              <a:t>Dataframe</a:t>
             </a:r>
             <a:r>
               <a:rPr lang="en-US" dirty="0"/>
-              <a:t>:</a:t>
-            </a:r>
-          </a:p>
-          <a:p>
-            <a:pPr lvl="1"/>
-            <a:r>
-              <a:rPr lang="en-US" dirty="0"/>
-              <a:t>Aggregate Metrics</a:t>
-            </a:r>
-          </a:p>
-          <a:p>
-            <a:pPr lvl="2"/>
-            <a:r>
-              <a:rPr lang="en-US" dirty="0"/>
-              <a:t>Compare traditional Pandas method to using </a:t>
+              <a:t> and </a:t>
             </a:r>
             <a:r>
               <a:rPr lang="en-US" dirty="0" err="1"/>
@@ -6168,23 +5303,19 @@
             </a:r>
             <a:r>
               <a:rPr lang="en-US" dirty="0"/>
-              <a:t> </a:t>
-            </a:r>
-            <a:r>
-              <a:rPr lang="en-US" dirty="0" err="1"/>
-              <a:t>Dataframes</a:t>
-            </a:r>
-            <a:endParaRPr lang="en-US" dirty="0"/>
-          </a:p>
-          <a:p>
-            <a:pPr lvl="2"/>
-            <a:r>
-              <a:rPr lang="en-US" dirty="0" err="1"/>
-              <a:t>Reindex</a:t>
-            </a:r>
+              <a:t> Delayed, for each Yelp Review text, find the “most similar” review – function </a:t>
+            </a:r>
+            <a:r>
+              <a:rPr lang="en-US" i="1" dirty="0" err="1"/>
+              <a:t>find_distance</a:t>
+            </a:r>
+            <a:endParaRPr lang="en-US" i="1" dirty="0"/>
+          </a:p>
+          <a:p>
+            <a:pPr lvl="1"/>
             <a:r>
               <a:rPr lang="en-US" dirty="0"/>
-              <a:t> to optimize for the aggregations being performed</a:t>
+              <a:t> Calculate MSE for the reference text vs. “similar” text</a:t>
             </a:r>
           </a:p>
         </p:txBody>
@@ -6192,7 +5323,7 @@
     </p:spTree>
     <p:extLst>
       <p:ext uri="{BB962C8B-B14F-4D97-AF65-F5344CB8AC3E}">
-        <p14:creationId xmlns:p14="http://schemas.microsoft.com/office/powerpoint/2010/main" val="1071205135"/>
+        <p14:creationId xmlns:p14="http://schemas.microsoft.com/office/powerpoint/2010/main" val="2627604873"/>
       </p:ext>
     </p:extLst>
   </p:cSld>
@@ -6202,7 +5333,7 @@
 </p:sld>
 </file>
 
-<file path=ppt/slides/slide8.xml><?xml version="1.0" encoding="utf-8"?>
+<file path=ppt/slides/slide12.xml><?xml version="1.0" encoding="utf-8"?>
 <p:sld xmlns:a="http://schemas.openxmlformats.org/drawingml/2006/main" xmlns:r="http://schemas.openxmlformats.org/officeDocument/2006/relationships" xmlns:p="http://schemas.openxmlformats.org/presentationml/2006/main">
   <p:cSld>
     <p:spTree>
@@ -6365,7 +5496,7 @@
     </p:spTree>
     <p:extLst>
       <p:ext uri="{BB962C8B-B14F-4D97-AF65-F5344CB8AC3E}">
-        <p14:creationId xmlns:p14="http://schemas.microsoft.com/office/powerpoint/2010/main" val="1745488930"/>
+        <p14:creationId xmlns:p14="http://schemas.microsoft.com/office/powerpoint/2010/main" val="3683573994"/>
       </p:ext>
     </p:extLst>
   </p:cSld>
@@ -6375,7 +5506,7 @@
 </p:sld>
 </file>
 
-<file path=ppt/slides/slide9.xml><?xml version="1.0" encoding="utf-8"?>
+<file path=ppt/slides/slide13.xml><?xml version="1.0" encoding="utf-8"?>
 <p:sld xmlns:a="http://schemas.openxmlformats.org/drawingml/2006/main" xmlns:r="http://schemas.openxmlformats.org/officeDocument/2006/relationships" xmlns:p="http://schemas.openxmlformats.org/presentationml/2006/main">
   <p:cSld>
     <p:spTree>
@@ -6905,7 +6036,1666 @@
     </p:spTree>
     <p:extLst>
       <p:ext uri="{BB962C8B-B14F-4D97-AF65-F5344CB8AC3E}">
-        <p14:creationId xmlns:p14="http://schemas.microsoft.com/office/powerpoint/2010/main" val="1533725318"/>
+        <p14:creationId xmlns:p14="http://schemas.microsoft.com/office/powerpoint/2010/main" val="4058722828"/>
+      </p:ext>
+    </p:extLst>
+  </p:cSld>
+  <p:clrMapOvr>
+    <a:masterClrMapping/>
+  </p:clrMapOvr>
+</p:sld>
+</file>
+
+<file path=ppt/slides/slide14.xml><?xml version="1.0" encoding="utf-8"?>
+<p:sld xmlns:a="http://schemas.openxmlformats.org/drawingml/2006/main" xmlns:r="http://schemas.openxmlformats.org/officeDocument/2006/relationships" xmlns:p="http://schemas.openxmlformats.org/presentationml/2006/main">
+  <p:cSld>
+    <p:spTree>
+      <p:nvGrpSpPr>
+        <p:cNvPr id="1" name=""/>
+        <p:cNvGrpSpPr/>
+        <p:nvPr/>
+      </p:nvGrpSpPr>
+      <p:grpSpPr>
+        <a:xfrm>
+          <a:off x="0" y="0"/>
+          <a:ext cx="0" cy="0"/>
+          <a:chOff x="0" y="0"/>
+          <a:chExt cx="0" cy="0"/>
+        </a:xfrm>
+      </p:grpSpPr>
+      <p:sp>
+        <p:nvSpPr>
+          <p:cNvPr id="2" name="Title 1">
+            <a:extLst>
+              <a:ext uri="{FF2B5EF4-FFF2-40B4-BE49-F238E27FC236}">
+                <a16:creationId xmlns:a16="http://schemas.microsoft.com/office/drawing/2014/main" id="{5E4840F9-A2CA-B94E-89E0-41348C5F0EF5}"/>
+              </a:ext>
+            </a:extLst>
+          </p:cNvPr>
+          <p:cNvSpPr>
+            <a:spLocks noGrp="1"/>
+          </p:cNvSpPr>
+          <p:nvPr>
+            <p:ph type="title"/>
+          </p:nvPr>
+        </p:nvSpPr>
+        <p:spPr/>
+        <p:txBody>
+          <a:bodyPr/>
+          <a:lstStyle/>
+          <a:p>
+            <a:r>
+              <a:rPr lang="en-US" dirty="0"/>
+              <a:t>Lessons learned</a:t>
+            </a:r>
+          </a:p>
+        </p:txBody>
+      </p:sp>
+      <p:sp>
+        <p:nvSpPr>
+          <p:cNvPr id="3" name="Content Placeholder 2">
+            <a:extLst>
+              <a:ext uri="{FF2B5EF4-FFF2-40B4-BE49-F238E27FC236}">
+                <a16:creationId xmlns:a16="http://schemas.microsoft.com/office/drawing/2014/main" id="{25A20195-AD7A-BF41-B9A7-2AEA2EA1601B}"/>
+              </a:ext>
+            </a:extLst>
+          </p:cNvPr>
+          <p:cNvSpPr>
+            <a:spLocks noGrp="1"/>
+          </p:cNvSpPr>
+          <p:nvPr>
+            <p:ph idx="1"/>
+          </p:nvPr>
+        </p:nvSpPr>
+        <p:spPr/>
+        <p:txBody>
+          <a:bodyPr>
+            <a:normAutofit/>
+          </a:bodyPr>
+          <a:lstStyle/>
+          <a:p>
+            <a:r>
+              <a:rPr lang="en-US" dirty="0" err="1"/>
+              <a:t>Dask</a:t>
+            </a:r>
+            <a:r>
+              <a:rPr lang="en-US" dirty="0"/>
+              <a:t> is really fast and efficient!</a:t>
+            </a:r>
+          </a:p>
+          <a:p>
+            <a:r>
+              <a:rPr lang="en-US" dirty="0"/>
+              <a:t>Syntax is very similar to Pandas with some exceptions </a:t>
+            </a:r>
+          </a:p>
+          <a:p>
+            <a:pPr lvl="1"/>
+            <a:r>
+              <a:rPr lang="en-US" dirty="0"/>
+              <a:t>Struggled with custom functions in a .</a:t>
+            </a:r>
+            <a:r>
+              <a:rPr lang="en-US" dirty="0" err="1"/>
+              <a:t>groupby</a:t>
+            </a:r>
+            <a:r>
+              <a:rPr lang="en-US" dirty="0"/>
+              <a:t>().</a:t>
+            </a:r>
+            <a:r>
+              <a:rPr lang="en-US" dirty="0" err="1"/>
+              <a:t>agg</a:t>
+            </a:r>
+            <a:r>
+              <a:rPr lang="en-US" dirty="0"/>
+              <a:t>()</a:t>
+            </a:r>
+          </a:p>
+          <a:p>
+            <a:pPr lvl="1"/>
+            <a:r>
+              <a:rPr lang="en-US" dirty="0"/>
+              <a:t>Struggled with filtering </a:t>
+            </a:r>
+            <a:r>
+              <a:rPr lang="en-US" dirty="0" err="1"/>
+              <a:t>dataframe</a:t>
+            </a:r>
+            <a:r>
+              <a:rPr lang="en-US" dirty="0"/>
+              <a:t> by index</a:t>
+            </a:r>
+          </a:p>
+          <a:p>
+            <a:r>
+              <a:rPr lang="en-US" dirty="0"/>
+              <a:t>There may be things that </a:t>
+            </a:r>
+            <a:r>
+              <a:rPr lang="en-US" dirty="0" err="1"/>
+              <a:t>Dask</a:t>
+            </a:r>
+            <a:r>
+              <a:rPr lang="en-US" dirty="0"/>
+              <a:t> is worse at – or that I just did not discover successfully</a:t>
+            </a:r>
+          </a:p>
+          <a:p>
+            <a:pPr lvl="1"/>
+            <a:r>
+              <a:rPr lang="en-US" dirty="0"/>
+              <a:t>Random resampling </a:t>
+            </a:r>
+          </a:p>
+        </p:txBody>
+      </p:sp>
+    </p:spTree>
+    <p:extLst>
+      <p:ext uri="{BB962C8B-B14F-4D97-AF65-F5344CB8AC3E}">
+        <p14:creationId xmlns:p14="http://schemas.microsoft.com/office/powerpoint/2010/main" val="3754097124"/>
+      </p:ext>
+    </p:extLst>
+  </p:cSld>
+  <p:clrMapOvr>
+    <a:masterClrMapping/>
+  </p:clrMapOvr>
+</p:sld>
+</file>
+
+<file path=ppt/slides/slide2.xml><?xml version="1.0" encoding="utf-8"?>
+<p:sld xmlns:a="http://schemas.openxmlformats.org/drawingml/2006/main" xmlns:r="http://schemas.openxmlformats.org/officeDocument/2006/relationships" xmlns:p="http://schemas.openxmlformats.org/presentationml/2006/main">
+  <p:cSld>
+    <p:spTree>
+      <p:nvGrpSpPr>
+        <p:cNvPr id="1" name=""/>
+        <p:cNvGrpSpPr/>
+        <p:nvPr/>
+      </p:nvGrpSpPr>
+      <p:grpSpPr>
+        <a:xfrm>
+          <a:off x="0" y="0"/>
+          <a:ext cx="0" cy="0"/>
+          <a:chOff x="0" y="0"/>
+          <a:chExt cx="0" cy="0"/>
+        </a:xfrm>
+      </p:grpSpPr>
+      <p:sp>
+        <p:nvSpPr>
+          <p:cNvPr id="2" name="Title 1">
+            <a:extLst>
+              <a:ext uri="{FF2B5EF4-FFF2-40B4-BE49-F238E27FC236}">
+                <a16:creationId xmlns:a16="http://schemas.microsoft.com/office/drawing/2014/main" id="{CD06E69C-1BB9-E54A-B35D-52D638A5E1F0}"/>
+              </a:ext>
+            </a:extLst>
+          </p:cNvPr>
+          <p:cNvSpPr>
+            <a:spLocks noGrp="1"/>
+          </p:cNvSpPr>
+          <p:nvPr>
+            <p:ph type="title"/>
+          </p:nvPr>
+        </p:nvSpPr>
+        <p:spPr/>
+        <p:txBody>
+          <a:bodyPr/>
+          <a:lstStyle/>
+          <a:p>
+            <a:r>
+              <a:rPr lang="en-US" dirty="0"/>
+              <a:t>Why should I listen?</a:t>
+            </a:r>
+          </a:p>
+        </p:txBody>
+      </p:sp>
+      <p:sp>
+        <p:nvSpPr>
+          <p:cNvPr id="3" name="Content Placeholder 2">
+            <a:extLst>
+              <a:ext uri="{FF2B5EF4-FFF2-40B4-BE49-F238E27FC236}">
+                <a16:creationId xmlns:a16="http://schemas.microsoft.com/office/drawing/2014/main" id="{8E3420EE-91B7-5242-ADDA-22E576AF8E5E}"/>
+              </a:ext>
+            </a:extLst>
+          </p:cNvPr>
+          <p:cNvSpPr>
+            <a:spLocks noGrp="1"/>
+          </p:cNvSpPr>
+          <p:nvPr>
+            <p:ph idx="1"/>
+          </p:nvPr>
+        </p:nvSpPr>
+        <p:spPr/>
+        <p:txBody>
+          <a:bodyPr/>
+          <a:lstStyle/>
+          <a:p>
+            <a:pPr marL="0" indent="0">
+              <a:buNone/>
+            </a:pPr>
+            <a:r>
+              <a:rPr lang="en-US" dirty="0"/>
+              <a:t>You have feature engineering code in Pandas. </a:t>
+            </a:r>
+          </a:p>
+          <a:p>
+            <a:pPr marL="0" indent="0">
+              <a:buNone/>
+            </a:pPr>
+            <a:r>
+              <a:rPr lang="en-US" dirty="0"/>
+              <a:t>You can make it faster and more efficient with a minimal learning curve.</a:t>
+            </a:r>
+          </a:p>
+        </p:txBody>
+      </p:sp>
+    </p:spTree>
+    <p:extLst>
+      <p:ext uri="{BB962C8B-B14F-4D97-AF65-F5344CB8AC3E}">
+        <p14:creationId xmlns:p14="http://schemas.microsoft.com/office/powerpoint/2010/main" val="3397735896"/>
+      </p:ext>
+    </p:extLst>
+  </p:cSld>
+  <p:clrMapOvr>
+    <a:masterClrMapping/>
+  </p:clrMapOvr>
+</p:sld>
+</file>
+
+<file path=ppt/slides/slide3.xml><?xml version="1.0" encoding="utf-8"?>
+<p:sld xmlns:a="http://schemas.openxmlformats.org/drawingml/2006/main" xmlns:r="http://schemas.openxmlformats.org/officeDocument/2006/relationships" xmlns:p="http://schemas.openxmlformats.org/presentationml/2006/main">
+  <p:cSld>
+    <p:spTree>
+      <p:nvGrpSpPr>
+        <p:cNvPr id="1" name=""/>
+        <p:cNvGrpSpPr/>
+        <p:nvPr/>
+      </p:nvGrpSpPr>
+      <p:grpSpPr>
+        <a:xfrm>
+          <a:off x="0" y="0"/>
+          <a:ext cx="0" cy="0"/>
+          <a:chOff x="0" y="0"/>
+          <a:chExt cx="0" cy="0"/>
+        </a:xfrm>
+      </p:grpSpPr>
+      <p:sp>
+        <p:nvSpPr>
+          <p:cNvPr id="2" name="Title 1">
+            <a:extLst>
+              <a:ext uri="{FF2B5EF4-FFF2-40B4-BE49-F238E27FC236}">
+                <a16:creationId xmlns:a16="http://schemas.microsoft.com/office/drawing/2014/main" id="{DF9FE9F4-29F7-4743-BF2E-CDC60CA12B4B}"/>
+              </a:ext>
+            </a:extLst>
+          </p:cNvPr>
+          <p:cNvSpPr>
+            <a:spLocks noGrp="1"/>
+          </p:cNvSpPr>
+          <p:nvPr>
+            <p:ph type="title"/>
+          </p:nvPr>
+        </p:nvSpPr>
+        <p:spPr/>
+        <p:txBody>
+          <a:bodyPr/>
+          <a:lstStyle/>
+          <a:p>
+            <a:r>
+              <a:rPr lang="en-US" dirty="0"/>
+              <a:t>THE data</a:t>
+            </a:r>
+          </a:p>
+        </p:txBody>
+      </p:sp>
+      <p:pic>
+        <p:nvPicPr>
+          <p:cNvPr id="13" name="Picture 12">
+            <a:extLst>
+              <a:ext uri="{FF2B5EF4-FFF2-40B4-BE49-F238E27FC236}">
+                <a16:creationId xmlns:a16="http://schemas.microsoft.com/office/drawing/2014/main" id="{BA739B04-DC75-0F46-BF86-AB288307051E}"/>
+              </a:ext>
+            </a:extLst>
+          </p:cNvPr>
+          <p:cNvPicPr>
+            <a:picLocks noChangeAspect="1"/>
+          </p:cNvPicPr>
+          <p:nvPr/>
+        </p:nvPicPr>
+        <p:blipFill>
+          <a:blip r:embed="rId2">
+            <a:extLst>
+              <a:ext uri="{28A0092B-C50C-407E-A947-70E740481C1C}">
+                <a14:useLocalDpi xmlns:a14="http://schemas.microsoft.com/office/drawing/2010/main" val="0"/>
+              </a:ext>
+            </a:extLst>
+          </a:blip>
+          <a:stretch>
+            <a:fillRect/>
+          </a:stretch>
+        </p:blipFill>
+        <p:spPr>
+          <a:xfrm>
+            <a:off x="936172" y="2310471"/>
+            <a:ext cx="10580914" cy="1261245"/>
+          </a:xfrm>
+          <a:prstGeom prst="rect">
+            <a:avLst/>
+          </a:prstGeom>
+        </p:spPr>
+      </p:pic>
+      <p:sp>
+        <p:nvSpPr>
+          <p:cNvPr id="14" name="TextBox 13">
+            <a:extLst>
+              <a:ext uri="{FF2B5EF4-FFF2-40B4-BE49-F238E27FC236}">
+                <a16:creationId xmlns:a16="http://schemas.microsoft.com/office/drawing/2014/main" id="{A0CE6EB2-8BE7-B449-B477-7763161E6FA9}"/>
+              </a:ext>
+            </a:extLst>
+          </p:cNvPr>
+          <p:cNvSpPr txBox="1"/>
+          <p:nvPr/>
+        </p:nvSpPr>
+        <p:spPr>
+          <a:xfrm>
+            <a:off x="1153887" y="4005943"/>
+            <a:ext cx="10580914" cy="1200329"/>
+          </a:xfrm>
+          <a:prstGeom prst="rect">
+            <a:avLst/>
+          </a:prstGeom>
+          <a:noFill/>
+        </p:spPr>
+        <p:txBody>
+          <a:bodyPr wrap="square" rtlCol="0">
+            <a:spAutoFit/>
+          </a:bodyPr>
+          <a:lstStyle/>
+          <a:p>
+            <a:pPr marL="285750" indent="-285750">
+              <a:buFontTx/>
+              <a:buChar char="-"/>
+            </a:pPr>
+            <a:r>
+              <a:rPr lang="en-US" dirty="0"/>
+              <a:t>1,000,000 Rows</a:t>
+            </a:r>
+          </a:p>
+          <a:p>
+            <a:pPr marL="285750" indent="-285750">
+              <a:buFontTx/>
+              <a:buChar char="-"/>
+            </a:pPr>
+            <a:r>
+              <a:rPr lang="en-US" dirty="0"/>
+              <a:t>Subset of Yelp Reviews dataset found on Kaggle: </a:t>
+            </a:r>
+          </a:p>
+          <a:p>
+            <a:pPr marL="742950" lvl="1" indent="-285750">
+              <a:buFontTx/>
+              <a:buChar char="-"/>
+            </a:pPr>
+            <a:r>
+              <a:rPr lang="en-US" u="sng" dirty="0">
+                <a:hlinkClick r:id="rId3"/>
+              </a:rPr>
+              <a:t>https://www.kaggle.com/luisfredgs/yelp-reviews-csv#yelp_review.csv</a:t>
+            </a:r>
+            <a:r>
+              <a:rPr lang="en-US" dirty="0"/>
+              <a:t> </a:t>
+            </a:r>
+          </a:p>
+          <a:p>
+            <a:pPr marL="285750" indent="-285750">
+              <a:buFontTx/>
+              <a:buChar char="-"/>
+            </a:pPr>
+            <a:endParaRPr lang="en-US" dirty="0"/>
+          </a:p>
+        </p:txBody>
+      </p:sp>
+    </p:spTree>
+    <p:extLst>
+      <p:ext uri="{BB962C8B-B14F-4D97-AF65-F5344CB8AC3E}">
+        <p14:creationId xmlns:p14="http://schemas.microsoft.com/office/powerpoint/2010/main" val="3567882788"/>
+      </p:ext>
+    </p:extLst>
+  </p:cSld>
+  <p:clrMapOvr>
+    <a:masterClrMapping/>
+  </p:clrMapOvr>
+</p:sld>
+</file>
+
+<file path=ppt/slides/slide4.xml><?xml version="1.0" encoding="utf-8"?>
+<p:sld xmlns:a="http://schemas.openxmlformats.org/drawingml/2006/main" xmlns:r="http://schemas.openxmlformats.org/officeDocument/2006/relationships" xmlns:p="http://schemas.openxmlformats.org/presentationml/2006/main">
+  <p:cSld>
+    <p:spTree>
+      <p:nvGrpSpPr>
+        <p:cNvPr id="1" name=""/>
+        <p:cNvGrpSpPr/>
+        <p:nvPr/>
+      </p:nvGrpSpPr>
+      <p:grpSpPr>
+        <a:xfrm>
+          <a:off x="0" y="0"/>
+          <a:ext cx="0" cy="0"/>
+          <a:chOff x="0" y="0"/>
+          <a:chExt cx="0" cy="0"/>
+        </a:xfrm>
+      </p:grpSpPr>
+      <p:sp>
+        <p:nvSpPr>
+          <p:cNvPr id="2" name="Title 1">
+            <a:extLst>
+              <a:ext uri="{FF2B5EF4-FFF2-40B4-BE49-F238E27FC236}">
+                <a16:creationId xmlns:a16="http://schemas.microsoft.com/office/drawing/2014/main" id="{5E4840F9-A2CA-B94E-89E0-41348C5F0EF5}"/>
+              </a:ext>
+            </a:extLst>
+          </p:cNvPr>
+          <p:cNvSpPr>
+            <a:spLocks noGrp="1"/>
+          </p:cNvSpPr>
+          <p:nvPr>
+            <p:ph type="title"/>
+          </p:nvPr>
+        </p:nvSpPr>
+        <p:spPr/>
+        <p:txBody>
+          <a:bodyPr/>
+          <a:lstStyle/>
+          <a:p>
+            <a:r>
+              <a:rPr lang="en-US" dirty="0"/>
+              <a:t>Problem set design</a:t>
+            </a:r>
+          </a:p>
+        </p:txBody>
+      </p:sp>
+      <p:sp>
+        <p:nvSpPr>
+          <p:cNvPr id="3" name="Content Placeholder 2">
+            <a:extLst>
+              <a:ext uri="{FF2B5EF4-FFF2-40B4-BE49-F238E27FC236}">
+                <a16:creationId xmlns:a16="http://schemas.microsoft.com/office/drawing/2014/main" id="{25A20195-AD7A-BF41-B9A7-2AEA2EA1601B}"/>
+              </a:ext>
+            </a:extLst>
+          </p:cNvPr>
+          <p:cNvSpPr>
+            <a:spLocks noGrp="1"/>
+          </p:cNvSpPr>
+          <p:nvPr>
+            <p:ph idx="1"/>
+          </p:nvPr>
+        </p:nvSpPr>
+        <p:spPr/>
+        <p:txBody>
+          <a:bodyPr>
+            <a:normAutofit/>
+          </a:bodyPr>
+          <a:lstStyle/>
+          <a:p>
+            <a:r>
+              <a:rPr lang="en-US" b="1" dirty="0"/>
+              <a:t>Objective</a:t>
+            </a:r>
+            <a:r>
+              <a:rPr lang="en-US" dirty="0"/>
+              <a:t>: Demonstrate the value-add of </a:t>
+            </a:r>
+            <a:r>
+              <a:rPr lang="en-US" dirty="0" err="1"/>
+              <a:t>Dask</a:t>
+            </a:r>
+            <a:r>
+              <a:rPr lang="en-US" dirty="0"/>
+              <a:t> by translating Pandas code.</a:t>
+            </a:r>
+          </a:p>
+          <a:p>
+            <a:r>
+              <a:rPr lang="en-US" b="1" dirty="0"/>
+              <a:t>3 Parts</a:t>
+            </a:r>
+          </a:p>
+          <a:p>
+            <a:pPr lvl="1"/>
+            <a:r>
+              <a:rPr lang="en-US" b="1" dirty="0"/>
+              <a:t>Part 1</a:t>
+            </a:r>
+            <a:r>
+              <a:rPr lang="en-US" dirty="0"/>
+              <a:t>: Pset2 in </a:t>
+            </a:r>
+            <a:r>
+              <a:rPr lang="en-US" dirty="0" err="1"/>
+              <a:t>Dask</a:t>
+            </a:r>
+            <a:endParaRPr lang="en-US" dirty="0"/>
+          </a:p>
+          <a:p>
+            <a:pPr lvl="1"/>
+            <a:r>
+              <a:rPr lang="en-US" b="1" dirty="0"/>
+              <a:t>Part 2</a:t>
+            </a:r>
+            <a:r>
+              <a:rPr lang="en-US" dirty="0"/>
+              <a:t>: Aggregating Metrics using Delayed and </a:t>
+            </a:r>
+            <a:r>
+              <a:rPr lang="en-US" dirty="0" err="1"/>
+              <a:t>Dask</a:t>
+            </a:r>
+            <a:r>
+              <a:rPr lang="en-US" dirty="0"/>
+              <a:t> </a:t>
+            </a:r>
+            <a:r>
+              <a:rPr lang="en-US" dirty="0" err="1"/>
+              <a:t>Dataframes</a:t>
+            </a:r>
+            <a:endParaRPr lang="en-US" dirty="0"/>
+          </a:p>
+          <a:p>
+            <a:pPr lvl="1"/>
+            <a:r>
+              <a:rPr lang="en-US" b="1" dirty="0"/>
+              <a:t>Part 3</a:t>
+            </a:r>
+            <a:r>
+              <a:rPr lang="en-US" dirty="0"/>
+              <a:t>: Word/Distance Vectors</a:t>
+            </a:r>
+          </a:p>
+          <a:p>
+            <a:endParaRPr lang="en-US" dirty="0"/>
+          </a:p>
+        </p:txBody>
+      </p:sp>
+    </p:spTree>
+    <p:extLst>
+      <p:ext uri="{BB962C8B-B14F-4D97-AF65-F5344CB8AC3E}">
+        <p14:creationId xmlns:p14="http://schemas.microsoft.com/office/powerpoint/2010/main" val="3610776144"/>
+      </p:ext>
+    </p:extLst>
+  </p:cSld>
+  <p:clrMapOvr>
+    <a:masterClrMapping/>
+  </p:clrMapOvr>
+</p:sld>
+</file>
+
+<file path=ppt/slides/slide5.xml><?xml version="1.0" encoding="utf-8"?>
+<p:sld xmlns:a="http://schemas.openxmlformats.org/drawingml/2006/main" xmlns:r="http://schemas.openxmlformats.org/officeDocument/2006/relationships" xmlns:p="http://schemas.openxmlformats.org/presentationml/2006/main">
+  <p:cSld>
+    <p:spTree>
+      <p:nvGrpSpPr>
+        <p:cNvPr id="1" name=""/>
+        <p:cNvGrpSpPr/>
+        <p:nvPr/>
+      </p:nvGrpSpPr>
+      <p:grpSpPr>
+        <a:xfrm>
+          <a:off x="0" y="0"/>
+          <a:ext cx="0" cy="0"/>
+          <a:chOff x="0" y="0"/>
+          <a:chExt cx="0" cy="0"/>
+        </a:xfrm>
+      </p:grpSpPr>
+      <p:sp>
+        <p:nvSpPr>
+          <p:cNvPr id="2" name="Title 1">
+            <a:extLst>
+              <a:ext uri="{FF2B5EF4-FFF2-40B4-BE49-F238E27FC236}">
+                <a16:creationId xmlns:a16="http://schemas.microsoft.com/office/drawing/2014/main" id="{5E4840F9-A2CA-B94E-89E0-41348C5F0EF5}"/>
+              </a:ext>
+            </a:extLst>
+          </p:cNvPr>
+          <p:cNvSpPr>
+            <a:spLocks noGrp="1"/>
+          </p:cNvSpPr>
+          <p:nvPr>
+            <p:ph type="title"/>
+          </p:nvPr>
+        </p:nvSpPr>
+        <p:spPr/>
+        <p:txBody>
+          <a:bodyPr/>
+          <a:lstStyle/>
+          <a:p>
+            <a:r>
+              <a:rPr lang="en-US" dirty="0"/>
+              <a:t>Part 1</a:t>
+            </a:r>
+          </a:p>
+        </p:txBody>
+      </p:sp>
+      <p:sp>
+        <p:nvSpPr>
+          <p:cNvPr id="3" name="Content Placeholder 2">
+            <a:extLst>
+              <a:ext uri="{FF2B5EF4-FFF2-40B4-BE49-F238E27FC236}">
+                <a16:creationId xmlns:a16="http://schemas.microsoft.com/office/drawing/2014/main" id="{25A20195-AD7A-BF41-B9A7-2AEA2EA1601B}"/>
+              </a:ext>
+            </a:extLst>
+          </p:cNvPr>
+          <p:cNvSpPr>
+            <a:spLocks noGrp="1"/>
+          </p:cNvSpPr>
+          <p:nvPr>
+            <p:ph idx="1"/>
+          </p:nvPr>
+        </p:nvSpPr>
+        <p:spPr/>
+        <p:txBody>
+          <a:bodyPr>
+            <a:normAutofit/>
+          </a:bodyPr>
+          <a:lstStyle/>
+          <a:p>
+            <a:r>
+              <a:rPr lang="en-US" dirty="0"/>
+              <a:t>Clone </a:t>
+            </a:r>
+            <a:r>
+              <a:rPr lang="en-US" dirty="0" err="1"/>
+              <a:t>Pset</a:t>
+            </a:r>
+            <a:r>
+              <a:rPr lang="en-US" dirty="0"/>
+              <a:t> 2:  word embeddings &amp; neighbors using demographic survey data</a:t>
+            </a:r>
+          </a:p>
+          <a:p>
+            <a:pPr lvl="1"/>
+            <a:r>
+              <a:rPr lang="en-US" dirty="0"/>
+              <a:t>Yelp Review dataset instead of Demographic Survey</a:t>
+            </a:r>
+          </a:p>
+          <a:p>
+            <a:pPr lvl="1"/>
+            <a:r>
+              <a:rPr lang="en-US" dirty="0"/>
+              <a:t>Repurpose code to use </a:t>
+            </a:r>
+            <a:r>
+              <a:rPr lang="en-US" dirty="0" err="1"/>
+              <a:t>Dask</a:t>
+            </a:r>
+            <a:r>
+              <a:rPr lang="en-US" dirty="0"/>
+              <a:t> </a:t>
+            </a:r>
+            <a:r>
+              <a:rPr lang="en-US" dirty="0" err="1"/>
+              <a:t>Dataframes</a:t>
+            </a:r>
+            <a:r>
+              <a:rPr lang="en-US" dirty="0"/>
+              <a:t> &amp; compare time spent</a:t>
+            </a:r>
+          </a:p>
+          <a:p>
+            <a:pPr lvl="1"/>
+            <a:r>
+              <a:rPr lang="en-US" dirty="0"/>
+              <a:t>Run </a:t>
+            </a:r>
+            <a:r>
+              <a:rPr lang="en-US" dirty="0" err="1"/>
+              <a:t>WordEmbedding</a:t>
+            </a:r>
+            <a:r>
+              <a:rPr lang="en-US" dirty="0"/>
+              <a:t> using </a:t>
+            </a:r>
+            <a:r>
+              <a:rPr lang="en-US" dirty="0" err="1"/>
+              <a:t>Dask</a:t>
+            </a:r>
+            <a:r>
+              <a:rPr lang="en-US" dirty="0"/>
+              <a:t> Delayed &amp; compare time spent</a:t>
+            </a:r>
+          </a:p>
+          <a:p>
+            <a:pPr lvl="1"/>
+            <a:r>
+              <a:rPr lang="en-US" dirty="0"/>
+              <a:t>Visualize the </a:t>
+            </a:r>
+            <a:r>
+              <a:rPr lang="en-US" dirty="0" err="1"/>
+              <a:t>Dask</a:t>
+            </a:r>
+            <a:r>
+              <a:rPr lang="en-US" dirty="0"/>
+              <a:t> computation graph</a:t>
+            </a:r>
+          </a:p>
+        </p:txBody>
+      </p:sp>
+    </p:spTree>
+    <p:extLst>
+      <p:ext uri="{BB962C8B-B14F-4D97-AF65-F5344CB8AC3E}">
+        <p14:creationId xmlns:p14="http://schemas.microsoft.com/office/powerpoint/2010/main" val="179330974"/>
+      </p:ext>
+    </p:extLst>
+  </p:cSld>
+  <p:clrMapOvr>
+    <a:masterClrMapping/>
+  </p:clrMapOvr>
+</p:sld>
+</file>
+
+<file path=ppt/slides/slide6.xml><?xml version="1.0" encoding="utf-8"?>
+<p:sld xmlns:a="http://schemas.openxmlformats.org/drawingml/2006/main" xmlns:r="http://schemas.openxmlformats.org/officeDocument/2006/relationships" xmlns:p="http://schemas.openxmlformats.org/presentationml/2006/main">
+  <p:cSld>
+    <p:spTree>
+      <p:nvGrpSpPr>
+        <p:cNvPr id="1" name=""/>
+        <p:cNvGrpSpPr/>
+        <p:nvPr/>
+      </p:nvGrpSpPr>
+      <p:grpSpPr>
+        <a:xfrm>
+          <a:off x="0" y="0"/>
+          <a:ext cx="0" cy="0"/>
+          <a:chOff x="0" y="0"/>
+          <a:chExt cx="0" cy="0"/>
+        </a:xfrm>
+      </p:grpSpPr>
+      <p:pic>
+        <p:nvPicPr>
+          <p:cNvPr id="9" name="Picture 8">
+            <a:extLst>
+              <a:ext uri="{FF2B5EF4-FFF2-40B4-BE49-F238E27FC236}">
+                <a16:creationId xmlns:a16="http://schemas.microsoft.com/office/drawing/2014/main" id="{3FA09E8B-1D51-104D-8179-143F7D2C9157}"/>
+              </a:ext>
+            </a:extLst>
+          </p:cNvPr>
+          <p:cNvPicPr>
+            <a:picLocks noChangeAspect="1"/>
+          </p:cNvPicPr>
+          <p:nvPr/>
+        </p:nvPicPr>
+        <p:blipFill>
+          <a:blip r:embed="rId2">
+            <a:extLst>
+              <a:ext uri="{28A0092B-C50C-407E-A947-70E740481C1C}">
+                <a14:useLocalDpi xmlns:a14="http://schemas.microsoft.com/office/drawing/2010/main" val="0"/>
+              </a:ext>
+            </a:extLst>
+          </a:blip>
+          <a:stretch>
+            <a:fillRect/>
+          </a:stretch>
+        </p:blipFill>
+        <p:spPr>
+          <a:xfrm>
+            <a:off x="437598" y="1498049"/>
+            <a:ext cx="5194300" cy="3644900"/>
+          </a:xfrm>
+          <a:prstGeom prst="rect">
+            <a:avLst/>
+          </a:prstGeom>
+        </p:spPr>
+      </p:pic>
+      <p:pic>
+        <p:nvPicPr>
+          <p:cNvPr id="11" name="Picture 10">
+            <a:extLst>
+              <a:ext uri="{FF2B5EF4-FFF2-40B4-BE49-F238E27FC236}">
+                <a16:creationId xmlns:a16="http://schemas.microsoft.com/office/drawing/2014/main" id="{D9BA2D9B-711F-674F-AF72-E5D6A3045D1C}"/>
+              </a:ext>
+            </a:extLst>
+          </p:cNvPr>
+          <p:cNvPicPr>
+            <a:picLocks noChangeAspect="1"/>
+          </p:cNvPicPr>
+          <p:nvPr/>
+        </p:nvPicPr>
+        <p:blipFill>
+          <a:blip r:embed="rId3">
+            <a:extLst>
+              <a:ext uri="{28A0092B-C50C-407E-A947-70E740481C1C}">
+                <a14:useLocalDpi xmlns:a14="http://schemas.microsoft.com/office/drawing/2010/main" val="0"/>
+              </a:ext>
+            </a:extLst>
+          </a:blip>
+          <a:stretch>
+            <a:fillRect/>
+          </a:stretch>
+        </p:blipFill>
+        <p:spPr>
+          <a:xfrm>
+            <a:off x="6099048" y="1450009"/>
+            <a:ext cx="5232400" cy="4064000"/>
+          </a:xfrm>
+          <a:prstGeom prst="rect">
+            <a:avLst/>
+          </a:prstGeom>
+        </p:spPr>
+      </p:pic>
+      <p:sp>
+        <p:nvSpPr>
+          <p:cNvPr id="12" name="TextBox 11">
+            <a:extLst>
+              <a:ext uri="{FF2B5EF4-FFF2-40B4-BE49-F238E27FC236}">
+                <a16:creationId xmlns:a16="http://schemas.microsoft.com/office/drawing/2014/main" id="{6F6D9EF3-57E0-0349-8E8E-76551273C6B0}"/>
+              </a:ext>
+            </a:extLst>
+          </p:cNvPr>
+          <p:cNvSpPr txBox="1"/>
+          <p:nvPr/>
+        </p:nvSpPr>
+        <p:spPr>
+          <a:xfrm>
+            <a:off x="437598" y="1048994"/>
+            <a:ext cx="1009956" cy="369332"/>
+          </a:xfrm>
+          <a:prstGeom prst="rect">
+            <a:avLst/>
+          </a:prstGeom>
+          <a:noFill/>
+        </p:spPr>
+        <p:txBody>
+          <a:bodyPr wrap="none" rtlCol="0">
+            <a:spAutoFit/>
+          </a:bodyPr>
+          <a:lstStyle/>
+          <a:p>
+            <a:r>
+              <a:rPr lang="en-US" b="1" dirty="0"/>
+              <a:t>Pandas</a:t>
+            </a:r>
+          </a:p>
+        </p:txBody>
+      </p:sp>
+      <p:sp>
+        <p:nvSpPr>
+          <p:cNvPr id="13" name="TextBox 12">
+            <a:extLst>
+              <a:ext uri="{FF2B5EF4-FFF2-40B4-BE49-F238E27FC236}">
+                <a16:creationId xmlns:a16="http://schemas.microsoft.com/office/drawing/2014/main" id="{5EE22F68-6FA1-3046-9C97-D0099CD4DD6C}"/>
+              </a:ext>
+            </a:extLst>
+          </p:cNvPr>
+          <p:cNvSpPr txBox="1"/>
+          <p:nvPr/>
+        </p:nvSpPr>
+        <p:spPr>
+          <a:xfrm>
+            <a:off x="6099048" y="1010966"/>
+            <a:ext cx="769763" cy="369332"/>
+          </a:xfrm>
+          <a:prstGeom prst="rect">
+            <a:avLst/>
+          </a:prstGeom>
+          <a:noFill/>
+        </p:spPr>
+        <p:txBody>
+          <a:bodyPr wrap="none" rtlCol="0">
+            <a:spAutoFit/>
+          </a:bodyPr>
+          <a:lstStyle/>
+          <a:p>
+            <a:r>
+              <a:rPr lang="en-US" b="1" dirty="0" err="1"/>
+              <a:t>Dask</a:t>
+            </a:r>
+            <a:endParaRPr lang="en-US" b="1" dirty="0"/>
+          </a:p>
+        </p:txBody>
+      </p:sp>
+    </p:spTree>
+    <p:extLst>
+      <p:ext uri="{BB962C8B-B14F-4D97-AF65-F5344CB8AC3E}">
+        <p14:creationId xmlns:p14="http://schemas.microsoft.com/office/powerpoint/2010/main" val="2755147023"/>
+      </p:ext>
+    </p:extLst>
+  </p:cSld>
+  <p:clrMapOvr>
+    <a:masterClrMapping/>
+  </p:clrMapOvr>
+</p:sld>
+</file>
+
+<file path=ppt/slides/slide7.xml><?xml version="1.0" encoding="utf-8"?>
+<p:sld xmlns:a="http://schemas.openxmlformats.org/drawingml/2006/main" xmlns:r="http://schemas.openxmlformats.org/officeDocument/2006/relationships" xmlns:p="http://schemas.openxmlformats.org/presentationml/2006/main">
+  <p:cSld>
+    <p:spTree>
+      <p:nvGrpSpPr>
+        <p:cNvPr id="1" name=""/>
+        <p:cNvGrpSpPr/>
+        <p:nvPr/>
+      </p:nvGrpSpPr>
+      <p:grpSpPr>
+        <a:xfrm>
+          <a:off x="0" y="0"/>
+          <a:ext cx="0" cy="0"/>
+          <a:chOff x="0" y="0"/>
+          <a:chExt cx="0" cy="0"/>
+        </a:xfrm>
+      </p:grpSpPr>
+      <p:sp>
+        <p:nvSpPr>
+          <p:cNvPr id="2" name="Title 1">
+            <a:extLst>
+              <a:ext uri="{FF2B5EF4-FFF2-40B4-BE49-F238E27FC236}">
+                <a16:creationId xmlns:a16="http://schemas.microsoft.com/office/drawing/2014/main" id="{CF2450B0-B0BE-7D40-AAD1-85278E85080B}"/>
+              </a:ext>
+            </a:extLst>
+          </p:cNvPr>
+          <p:cNvSpPr>
+            <a:spLocks noGrp="1"/>
+          </p:cNvSpPr>
+          <p:nvPr>
+            <p:ph type="title"/>
+          </p:nvPr>
+        </p:nvSpPr>
+        <p:spPr/>
+        <p:txBody>
+          <a:bodyPr/>
+          <a:lstStyle/>
+          <a:p>
+            <a:r>
+              <a:rPr lang="en-US" dirty="0"/>
+              <a:t>Results</a:t>
+            </a:r>
+          </a:p>
+        </p:txBody>
+      </p:sp>
+      <p:grpSp>
+        <p:nvGrpSpPr>
+          <p:cNvPr id="3" name="Group 2">
+            <a:extLst>
+              <a:ext uri="{FF2B5EF4-FFF2-40B4-BE49-F238E27FC236}">
+                <a16:creationId xmlns:a16="http://schemas.microsoft.com/office/drawing/2014/main" id="{665E9489-B827-6B46-B720-F9483EB23E24}"/>
+              </a:ext>
+            </a:extLst>
+          </p:cNvPr>
+          <p:cNvGrpSpPr/>
+          <p:nvPr/>
+        </p:nvGrpSpPr>
+        <p:grpSpPr>
+          <a:xfrm>
+            <a:off x="1970433" y="2655405"/>
+            <a:ext cx="8039100" cy="1918253"/>
+            <a:chOff x="2076450" y="1409700"/>
+            <a:chExt cx="8039100" cy="1918253"/>
+          </a:xfrm>
+        </p:grpSpPr>
+        <p:pic>
+          <p:nvPicPr>
+            <p:cNvPr id="4" name="Picture 3">
+              <a:extLst>
+                <a:ext uri="{FF2B5EF4-FFF2-40B4-BE49-F238E27FC236}">
+                  <a16:creationId xmlns:a16="http://schemas.microsoft.com/office/drawing/2014/main" id="{D61A4037-98B3-A046-9645-E6F1D7B0CF05}"/>
+                </a:ext>
+              </a:extLst>
+            </p:cNvPr>
+            <p:cNvPicPr>
+              <a:picLocks noChangeAspect="1"/>
+            </p:cNvPicPr>
+            <p:nvPr/>
+          </p:nvPicPr>
+          <p:blipFill rotWithShape="1">
+            <a:blip r:embed="rId2">
+              <a:extLst>
+                <a:ext uri="{28A0092B-C50C-407E-A947-70E740481C1C}">
+                  <a14:useLocalDpi xmlns:a14="http://schemas.microsoft.com/office/drawing/2010/main" val="0"/>
+                </a:ext>
+              </a:extLst>
+            </a:blip>
+            <a:srcRect b="72559"/>
+            <a:stretch/>
+          </p:blipFill>
+          <p:spPr>
+            <a:xfrm>
+              <a:off x="2076450" y="1409700"/>
+              <a:ext cx="8039100" cy="1108213"/>
+            </a:xfrm>
+            <a:prstGeom prst="rect">
+              <a:avLst/>
+            </a:prstGeom>
+          </p:spPr>
+        </p:pic>
+        <p:pic>
+          <p:nvPicPr>
+            <p:cNvPr id="5" name="Picture 4">
+              <a:extLst>
+                <a:ext uri="{FF2B5EF4-FFF2-40B4-BE49-F238E27FC236}">
+                  <a16:creationId xmlns:a16="http://schemas.microsoft.com/office/drawing/2014/main" id="{21472C34-B4EC-F343-BC57-73B8D4DC543C}"/>
+                </a:ext>
+              </a:extLst>
+            </p:cNvPr>
+            <p:cNvPicPr>
+              <a:picLocks noChangeAspect="1"/>
+            </p:cNvPicPr>
+            <p:nvPr/>
+          </p:nvPicPr>
+          <p:blipFill rotWithShape="1">
+            <a:blip r:embed="rId2">
+              <a:extLst>
+                <a:ext uri="{28A0092B-C50C-407E-A947-70E740481C1C}">
+                  <a14:useLocalDpi xmlns:a14="http://schemas.microsoft.com/office/drawing/2010/main" val="0"/>
+                </a:ext>
+              </a:extLst>
+            </a:blip>
+            <a:srcRect t="79286"/>
+            <a:stretch/>
+          </p:blipFill>
+          <p:spPr>
+            <a:xfrm>
+              <a:off x="2076450" y="2491410"/>
+              <a:ext cx="8039100" cy="836543"/>
+            </a:xfrm>
+            <a:prstGeom prst="rect">
+              <a:avLst/>
+            </a:prstGeom>
+          </p:spPr>
+        </p:pic>
+      </p:grpSp>
+      <p:sp>
+        <p:nvSpPr>
+          <p:cNvPr id="6" name="Text Placeholder 1">
+            <a:extLst>
+              <a:ext uri="{FF2B5EF4-FFF2-40B4-BE49-F238E27FC236}">
+                <a16:creationId xmlns:a16="http://schemas.microsoft.com/office/drawing/2014/main" id="{FF0D8849-C427-5448-8F48-7D3361184E7B}"/>
+              </a:ext>
+            </a:extLst>
+          </p:cNvPr>
+          <p:cNvSpPr txBox="1">
+            <a:spLocks/>
+          </p:cNvSpPr>
+          <p:nvPr/>
+        </p:nvSpPr>
+        <p:spPr>
+          <a:xfrm>
+            <a:off x="1069848" y="1734611"/>
+            <a:ext cx="4754880" cy="640080"/>
+          </a:xfrm>
+          <a:prstGeom prst="rect">
+            <a:avLst/>
+          </a:prstGeom>
+        </p:spPr>
+        <p:txBody>
+          <a:bodyPr/>
+          <a:lstStyle>
+            <a:lvl1pPr marL="182880" indent="-182880" algn="l" defTabSz="914400" rtl="0" eaLnBrk="1" latinLnBrk="0" hangingPunct="1">
+              <a:lnSpc>
+                <a:spcPct val="90000"/>
+              </a:lnSpc>
+              <a:spcBef>
+                <a:spcPts val="1200"/>
+              </a:spcBef>
+              <a:buClr>
+                <a:schemeClr val="accent1">
+                  <a:lumMod val="75000"/>
+                </a:schemeClr>
+              </a:buClr>
+              <a:buSzPct val="85000"/>
+              <a:buFont typeface="Wingdings" pitchFamily="2" charset="2"/>
+              <a:buChar char="§"/>
+              <a:defRPr sz="2000" kern="1200">
+                <a:solidFill>
+                  <a:schemeClr val="tx1"/>
+                </a:solidFill>
+                <a:latin typeface="+mn-lt"/>
+                <a:ea typeface="+mn-ea"/>
+                <a:cs typeface="+mn-cs"/>
+              </a:defRPr>
+            </a:lvl1pPr>
+            <a:lvl2pPr marL="457200" indent="-182880" algn="l" defTabSz="914400" rtl="0" eaLnBrk="1" latinLnBrk="0" hangingPunct="1">
+              <a:lnSpc>
+                <a:spcPct val="90000"/>
+              </a:lnSpc>
+              <a:spcBef>
+                <a:spcPts val="400"/>
+              </a:spcBef>
+              <a:spcAft>
+                <a:spcPts val="200"/>
+              </a:spcAft>
+              <a:buClr>
+                <a:schemeClr val="accent1">
+                  <a:lumMod val="75000"/>
+                </a:schemeClr>
+              </a:buClr>
+              <a:buSzPct val="85000"/>
+              <a:buFont typeface="Wingdings" pitchFamily="2" charset="2"/>
+              <a:buChar char="§"/>
+              <a:defRPr sz="1800" kern="1200">
+                <a:solidFill>
+                  <a:schemeClr val="tx1"/>
+                </a:solidFill>
+                <a:latin typeface="+mn-lt"/>
+                <a:ea typeface="+mn-ea"/>
+                <a:cs typeface="+mn-cs"/>
+              </a:defRPr>
+            </a:lvl2pPr>
+            <a:lvl3pPr marL="731520" indent="-182880" algn="l" defTabSz="914400" rtl="0" eaLnBrk="1" latinLnBrk="0" hangingPunct="1">
+              <a:lnSpc>
+                <a:spcPct val="90000"/>
+              </a:lnSpc>
+              <a:spcBef>
+                <a:spcPts val="400"/>
+              </a:spcBef>
+              <a:spcAft>
+                <a:spcPts val="200"/>
+              </a:spcAft>
+              <a:buClr>
+                <a:schemeClr val="accent1">
+                  <a:lumMod val="75000"/>
+                </a:schemeClr>
+              </a:buClr>
+              <a:buSzPct val="85000"/>
+              <a:buFont typeface="Wingdings" pitchFamily="2" charset="2"/>
+              <a:buChar char="§"/>
+              <a:defRPr sz="1600" kern="1200">
+                <a:solidFill>
+                  <a:schemeClr val="tx1"/>
+                </a:solidFill>
+                <a:latin typeface="+mn-lt"/>
+                <a:ea typeface="+mn-ea"/>
+                <a:cs typeface="+mn-cs"/>
+              </a:defRPr>
+            </a:lvl3pPr>
+            <a:lvl4pPr marL="1005840" indent="-182880" algn="l" defTabSz="914400" rtl="0" eaLnBrk="1" latinLnBrk="0" hangingPunct="1">
+              <a:lnSpc>
+                <a:spcPct val="90000"/>
+              </a:lnSpc>
+              <a:spcBef>
+                <a:spcPts val="400"/>
+              </a:spcBef>
+              <a:spcAft>
+                <a:spcPts val="200"/>
+              </a:spcAft>
+              <a:buClr>
+                <a:schemeClr val="accent1">
+                  <a:lumMod val="75000"/>
+                </a:schemeClr>
+              </a:buClr>
+              <a:buSzPct val="85000"/>
+              <a:buFont typeface="Wingdings" pitchFamily="2" charset="2"/>
+              <a:buChar char="§"/>
+              <a:defRPr sz="1600" kern="1200">
+                <a:solidFill>
+                  <a:schemeClr val="tx1"/>
+                </a:solidFill>
+                <a:latin typeface="+mn-lt"/>
+                <a:ea typeface="+mn-ea"/>
+                <a:cs typeface="+mn-cs"/>
+              </a:defRPr>
+            </a:lvl4pPr>
+            <a:lvl5pPr marL="1280160" indent="-182880" algn="l" defTabSz="914400" rtl="0" eaLnBrk="1" latinLnBrk="0" hangingPunct="1">
+              <a:lnSpc>
+                <a:spcPct val="90000"/>
+              </a:lnSpc>
+              <a:spcBef>
+                <a:spcPts val="400"/>
+              </a:spcBef>
+              <a:spcAft>
+                <a:spcPts val="200"/>
+              </a:spcAft>
+              <a:buClr>
+                <a:schemeClr val="accent1">
+                  <a:lumMod val="75000"/>
+                </a:schemeClr>
+              </a:buClr>
+              <a:buSzPct val="85000"/>
+              <a:buFont typeface="Wingdings" pitchFamily="2" charset="2"/>
+              <a:buChar char="§"/>
+              <a:defRPr sz="1600" kern="1200">
+                <a:solidFill>
+                  <a:schemeClr val="tx1"/>
+                </a:solidFill>
+                <a:latin typeface="+mn-lt"/>
+                <a:ea typeface="+mn-ea"/>
+                <a:cs typeface="+mn-cs"/>
+              </a:defRPr>
+            </a:lvl5pPr>
+            <a:lvl6pPr marL="1600000" indent="-228600" algn="l" defTabSz="914400" rtl="0" eaLnBrk="1" latinLnBrk="0" hangingPunct="1">
+              <a:lnSpc>
+                <a:spcPct val="90000"/>
+              </a:lnSpc>
+              <a:spcBef>
+                <a:spcPts val="400"/>
+              </a:spcBef>
+              <a:spcAft>
+                <a:spcPts val="200"/>
+              </a:spcAft>
+              <a:buClr>
+                <a:schemeClr val="accent1">
+                  <a:lumMod val="75000"/>
+                </a:schemeClr>
+              </a:buClr>
+              <a:buSzPct val="85000"/>
+              <a:buFont typeface="Wingdings" pitchFamily="2" charset="2"/>
+              <a:buChar char="§"/>
+              <a:defRPr sz="1600" kern="1200">
+                <a:solidFill>
+                  <a:schemeClr val="tx1"/>
+                </a:solidFill>
+                <a:latin typeface="+mn-lt"/>
+                <a:ea typeface="+mn-ea"/>
+                <a:cs typeface="+mn-cs"/>
+              </a:defRPr>
+            </a:lvl6pPr>
+            <a:lvl7pPr marL="1900000" indent="-228600" algn="l" defTabSz="914400" rtl="0" eaLnBrk="1" latinLnBrk="0" hangingPunct="1">
+              <a:lnSpc>
+                <a:spcPct val="90000"/>
+              </a:lnSpc>
+              <a:spcBef>
+                <a:spcPts val="400"/>
+              </a:spcBef>
+              <a:spcAft>
+                <a:spcPts val="200"/>
+              </a:spcAft>
+              <a:buClr>
+                <a:schemeClr val="accent1">
+                  <a:lumMod val="75000"/>
+                </a:schemeClr>
+              </a:buClr>
+              <a:buSzPct val="85000"/>
+              <a:buFont typeface="Wingdings" pitchFamily="2" charset="2"/>
+              <a:buChar char="§"/>
+              <a:defRPr sz="1600" kern="1200">
+                <a:solidFill>
+                  <a:schemeClr val="tx1"/>
+                </a:solidFill>
+                <a:latin typeface="+mn-lt"/>
+                <a:ea typeface="+mn-ea"/>
+                <a:cs typeface="+mn-cs"/>
+              </a:defRPr>
+            </a:lvl7pPr>
+            <a:lvl8pPr marL="2200000" indent="-228600" algn="l" defTabSz="914400" rtl="0" eaLnBrk="1" latinLnBrk="0" hangingPunct="1">
+              <a:lnSpc>
+                <a:spcPct val="90000"/>
+              </a:lnSpc>
+              <a:spcBef>
+                <a:spcPts val="400"/>
+              </a:spcBef>
+              <a:spcAft>
+                <a:spcPts val="200"/>
+              </a:spcAft>
+              <a:buClr>
+                <a:schemeClr val="accent1">
+                  <a:lumMod val="75000"/>
+                </a:schemeClr>
+              </a:buClr>
+              <a:buSzPct val="85000"/>
+              <a:buFont typeface="Wingdings" pitchFamily="2" charset="2"/>
+              <a:buChar char="§"/>
+              <a:defRPr sz="1600" kern="1200">
+                <a:solidFill>
+                  <a:schemeClr val="tx1"/>
+                </a:solidFill>
+                <a:latin typeface="+mn-lt"/>
+                <a:ea typeface="+mn-ea"/>
+                <a:cs typeface="+mn-cs"/>
+              </a:defRPr>
+            </a:lvl8pPr>
+            <a:lvl9pPr marL="2500000" indent="-228600" algn="l" defTabSz="914400" rtl="0" eaLnBrk="1" latinLnBrk="0" hangingPunct="1">
+              <a:lnSpc>
+                <a:spcPct val="90000"/>
+              </a:lnSpc>
+              <a:spcBef>
+                <a:spcPts val="400"/>
+              </a:spcBef>
+              <a:spcAft>
+                <a:spcPts val="200"/>
+              </a:spcAft>
+              <a:buClr>
+                <a:schemeClr val="accent1">
+                  <a:lumMod val="75000"/>
+                </a:schemeClr>
+              </a:buClr>
+              <a:buSzPct val="85000"/>
+              <a:buFont typeface="Wingdings" pitchFamily="2" charset="2"/>
+              <a:buChar char="§"/>
+              <a:defRPr sz="1600" kern="1200">
+                <a:solidFill>
+                  <a:schemeClr val="tx1"/>
+                </a:solidFill>
+                <a:latin typeface="+mn-lt"/>
+                <a:ea typeface="+mn-ea"/>
+                <a:cs typeface="+mn-cs"/>
+              </a:defRPr>
+            </a:lvl9pPr>
+          </a:lstStyle>
+          <a:p>
+            <a:pPr marL="0" indent="0">
+              <a:buNone/>
+            </a:pPr>
+            <a:r>
+              <a:rPr lang="en-US" dirty="0" err="1">
+                <a:solidFill>
+                  <a:schemeClr val="tx1">
+                    <a:lumMod val="65000"/>
+                    <a:lumOff val="35000"/>
+                  </a:schemeClr>
+                </a:solidFill>
+              </a:rPr>
+              <a:t>main_answers.py</a:t>
+            </a:r>
+            <a:r>
+              <a:rPr lang="en-US" dirty="0">
+                <a:solidFill>
+                  <a:schemeClr val="tx1">
+                    <a:lumMod val="65000"/>
+                    <a:lumOff val="35000"/>
+                  </a:schemeClr>
+                </a:solidFill>
+              </a:rPr>
+              <a:t> output</a:t>
+            </a:r>
+          </a:p>
+        </p:txBody>
+      </p:sp>
+    </p:spTree>
+    <p:extLst>
+      <p:ext uri="{BB962C8B-B14F-4D97-AF65-F5344CB8AC3E}">
+        <p14:creationId xmlns:p14="http://schemas.microsoft.com/office/powerpoint/2010/main" val="2408060063"/>
+      </p:ext>
+    </p:extLst>
+  </p:cSld>
+  <p:clrMapOvr>
+    <a:masterClrMapping/>
+  </p:clrMapOvr>
+</p:sld>
+</file>
+
+<file path=ppt/slides/slide8.xml><?xml version="1.0" encoding="utf-8"?>
+<p:sld xmlns:a="http://schemas.openxmlformats.org/drawingml/2006/main" xmlns:r="http://schemas.openxmlformats.org/officeDocument/2006/relationships" xmlns:p="http://schemas.openxmlformats.org/presentationml/2006/main">
+  <p:cSld>
+    <p:spTree>
+      <p:nvGrpSpPr>
+        <p:cNvPr id="1" name=""/>
+        <p:cNvGrpSpPr/>
+        <p:nvPr/>
+      </p:nvGrpSpPr>
+      <p:grpSpPr>
+        <a:xfrm>
+          <a:off x="0" y="0"/>
+          <a:ext cx="0" cy="0"/>
+          <a:chOff x="0" y="0"/>
+          <a:chExt cx="0" cy="0"/>
+        </a:xfrm>
+      </p:grpSpPr>
+      <p:sp>
+        <p:nvSpPr>
+          <p:cNvPr id="2" name="Title 1">
+            <a:extLst>
+              <a:ext uri="{FF2B5EF4-FFF2-40B4-BE49-F238E27FC236}">
+                <a16:creationId xmlns:a16="http://schemas.microsoft.com/office/drawing/2014/main" id="{5E4840F9-A2CA-B94E-89E0-41348C5F0EF5}"/>
+              </a:ext>
+            </a:extLst>
+          </p:cNvPr>
+          <p:cNvSpPr>
+            <a:spLocks noGrp="1"/>
+          </p:cNvSpPr>
+          <p:nvPr>
+            <p:ph type="title"/>
+          </p:nvPr>
+        </p:nvSpPr>
+        <p:spPr/>
+        <p:txBody>
+          <a:bodyPr/>
+          <a:lstStyle/>
+          <a:p>
+            <a:r>
+              <a:rPr lang="en-US" dirty="0" err="1"/>
+              <a:t>PARt</a:t>
+            </a:r>
+            <a:r>
+              <a:rPr lang="en-US" dirty="0"/>
+              <a:t> 2</a:t>
+            </a:r>
+          </a:p>
+        </p:txBody>
+      </p:sp>
+      <p:sp>
+        <p:nvSpPr>
+          <p:cNvPr id="3" name="Content Placeholder 2">
+            <a:extLst>
+              <a:ext uri="{FF2B5EF4-FFF2-40B4-BE49-F238E27FC236}">
+                <a16:creationId xmlns:a16="http://schemas.microsoft.com/office/drawing/2014/main" id="{25A20195-AD7A-BF41-B9A7-2AEA2EA1601B}"/>
+              </a:ext>
+            </a:extLst>
+          </p:cNvPr>
+          <p:cNvSpPr>
+            <a:spLocks noGrp="1"/>
+          </p:cNvSpPr>
+          <p:nvPr>
+            <p:ph idx="1"/>
+          </p:nvPr>
+        </p:nvSpPr>
+        <p:spPr/>
+        <p:txBody>
+          <a:bodyPr>
+            <a:normAutofit/>
+          </a:bodyPr>
+          <a:lstStyle/>
+          <a:p>
+            <a:r>
+              <a:rPr lang="en-US" dirty="0"/>
+              <a:t>Aggregate Metrics</a:t>
+            </a:r>
+          </a:p>
+          <a:p>
+            <a:pPr lvl="1"/>
+            <a:r>
+              <a:rPr lang="en-US" dirty="0"/>
+              <a:t>Compare traditional Pandas method to using </a:t>
+            </a:r>
+            <a:r>
+              <a:rPr lang="en-US" dirty="0" err="1"/>
+              <a:t>Dask</a:t>
+            </a:r>
+            <a:r>
+              <a:rPr lang="en-US" dirty="0"/>
+              <a:t> </a:t>
+            </a:r>
+            <a:r>
+              <a:rPr lang="en-US" dirty="0" err="1"/>
+              <a:t>Dataframes</a:t>
+            </a:r>
+            <a:endParaRPr lang="en-US" dirty="0"/>
+          </a:p>
+          <a:p>
+            <a:pPr lvl="1"/>
+            <a:r>
+              <a:rPr lang="en-US" dirty="0" err="1"/>
+              <a:t>Reindex</a:t>
+            </a:r>
+            <a:r>
+              <a:rPr lang="en-US" dirty="0"/>
+              <a:t> to optimize for the aggregations being performed</a:t>
+            </a:r>
+          </a:p>
+        </p:txBody>
+      </p:sp>
+    </p:spTree>
+    <p:extLst>
+      <p:ext uri="{BB962C8B-B14F-4D97-AF65-F5344CB8AC3E}">
+        <p14:creationId xmlns:p14="http://schemas.microsoft.com/office/powerpoint/2010/main" val="1071205135"/>
+      </p:ext>
+    </p:extLst>
+  </p:cSld>
+  <p:clrMapOvr>
+    <a:masterClrMapping/>
+  </p:clrMapOvr>
+</p:sld>
+</file>
+
+<file path=ppt/slides/slide9.xml><?xml version="1.0" encoding="utf-8"?>
+<p:sld xmlns:a="http://schemas.openxmlformats.org/drawingml/2006/main" xmlns:r="http://schemas.openxmlformats.org/officeDocument/2006/relationships" xmlns:p="http://schemas.openxmlformats.org/presentationml/2006/main">
+  <p:cSld>
+    <p:spTree>
+      <p:nvGrpSpPr>
+        <p:cNvPr id="1" name=""/>
+        <p:cNvGrpSpPr/>
+        <p:nvPr/>
+      </p:nvGrpSpPr>
+      <p:grpSpPr>
+        <a:xfrm>
+          <a:off x="0" y="0"/>
+          <a:ext cx="0" cy="0"/>
+          <a:chOff x="0" y="0"/>
+          <a:chExt cx="0" cy="0"/>
+        </a:xfrm>
+      </p:grpSpPr>
+      <p:sp>
+        <p:nvSpPr>
+          <p:cNvPr id="12" name="TextBox 11">
+            <a:extLst>
+              <a:ext uri="{FF2B5EF4-FFF2-40B4-BE49-F238E27FC236}">
+                <a16:creationId xmlns:a16="http://schemas.microsoft.com/office/drawing/2014/main" id="{6F6D9EF3-57E0-0349-8E8E-76551273C6B0}"/>
+              </a:ext>
+            </a:extLst>
+          </p:cNvPr>
+          <p:cNvSpPr txBox="1"/>
+          <p:nvPr/>
+        </p:nvSpPr>
+        <p:spPr>
+          <a:xfrm>
+            <a:off x="437598" y="1048994"/>
+            <a:ext cx="1009956" cy="369332"/>
+          </a:xfrm>
+          <a:prstGeom prst="rect">
+            <a:avLst/>
+          </a:prstGeom>
+          <a:noFill/>
+        </p:spPr>
+        <p:txBody>
+          <a:bodyPr wrap="none" rtlCol="0">
+            <a:spAutoFit/>
+          </a:bodyPr>
+          <a:lstStyle/>
+          <a:p>
+            <a:r>
+              <a:rPr lang="en-US" b="1" dirty="0"/>
+              <a:t>Pandas</a:t>
+            </a:r>
+          </a:p>
+        </p:txBody>
+      </p:sp>
+      <p:sp>
+        <p:nvSpPr>
+          <p:cNvPr id="13" name="TextBox 12">
+            <a:extLst>
+              <a:ext uri="{FF2B5EF4-FFF2-40B4-BE49-F238E27FC236}">
+                <a16:creationId xmlns:a16="http://schemas.microsoft.com/office/drawing/2014/main" id="{5EE22F68-6FA1-3046-9C97-D0099CD4DD6C}"/>
+              </a:ext>
+            </a:extLst>
+          </p:cNvPr>
+          <p:cNvSpPr txBox="1"/>
+          <p:nvPr/>
+        </p:nvSpPr>
+        <p:spPr>
+          <a:xfrm>
+            <a:off x="6099048" y="1010966"/>
+            <a:ext cx="769763" cy="369332"/>
+          </a:xfrm>
+          <a:prstGeom prst="rect">
+            <a:avLst/>
+          </a:prstGeom>
+          <a:noFill/>
+        </p:spPr>
+        <p:txBody>
+          <a:bodyPr wrap="none" rtlCol="0">
+            <a:spAutoFit/>
+          </a:bodyPr>
+          <a:lstStyle/>
+          <a:p>
+            <a:r>
+              <a:rPr lang="en-US" b="1" dirty="0" err="1"/>
+              <a:t>Dask</a:t>
+            </a:r>
+            <a:endParaRPr lang="en-US" b="1" dirty="0"/>
+          </a:p>
+        </p:txBody>
+      </p:sp>
+      <p:pic>
+        <p:nvPicPr>
+          <p:cNvPr id="6" name="Picture 5">
+            <a:extLst>
+              <a:ext uri="{FF2B5EF4-FFF2-40B4-BE49-F238E27FC236}">
+                <a16:creationId xmlns:a16="http://schemas.microsoft.com/office/drawing/2014/main" id="{E4B20898-95FA-A54E-A19C-02B72305DAFE}"/>
+              </a:ext>
+            </a:extLst>
+          </p:cNvPr>
+          <p:cNvPicPr>
+            <a:picLocks noChangeAspect="1"/>
+          </p:cNvPicPr>
+          <p:nvPr/>
+        </p:nvPicPr>
+        <p:blipFill>
+          <a:blip r:embed="rId2">
+            <a:extLst>
+              <a:ext uri="{28A0092B-C50C-407E-A947-70E740481C1C}">
+                <a14:useLocalDpi xmlns:a14="http://schemas.microsoft.com/office/drawing/2010/main" val="0"/>
+              </a:ext>
+            </a:extLst>
+          </a:blip>
+          <a:stretch>
+            <a:fillRect/>
+          </a:stretch>
+        </p:blipFill>
+        <p:spPr>
+          <a:xfrm>
+            <a:off x="6099048" y="1564585"/>
+            <a:ext cx="5181600" cy="4152900"/>
+          </a:xfrm>
+          <a:prstGeom prst="rect">
+            <a:avLst/>
+          </a:prstGeom>
+        </p:spPr>
+      </p:pic>
+      <p:pic>
+        <p:nvPicPr>
+          <p:cNvPr id="8" name="Picture 7">
+            <a:extLst>
+              <a:ext uri="{FF2B5EF4-FFF2-40B4-BE49-F238E27FC236}">
+                <a16:creationId xmlns:a16="http://schemas.microsoft.com/office/drawing/2014/main" id="{BE29E9B9-203B-D446-814E-4E92D2FDB747}"/>
+              </a:ext>
+            </a:extLst>
+          </p:cNvPr>
+          <p:cNvPicPr>
+            <a:picLocks noChangeAspect="1"/>
+          </p:cNvPicPr>
+          <p:nvPr/>
+        </p:nvPicPr>
+        <p:blipFill>
+          <a:blip r:embed="rId3">
+            <a:extLst>
+              <a:ext uri="{28A0092B-C50C-407E-A947-70E740481C1C}">
+                <a14:useLocalDpi xmlns:a14="http://schemas.microsoft.com/office/drawing/2010/main" val="0"/>
+              </a:ext>
+            </a:extLst>
+          </a:blip>
+          <a:stretch>
+            <a:fillRect/>
+          </a:stretch>
+        </p:blipFill>
+        <p:spPr>
+          <a:xfrm>
+            <a:off x="437598" y="1564585"/>
+            <a:ext cx="4699000" cy="977900"/>
+          </a:xfrm>
+          <a:prstGeom prst="rect">
+            <a:avLst/>
+          </a:prstGeom>
+        </p:spPr>
+      </p:pic>
+    </p:spTree>
+    <p:extLst>
+      <p:ext uri="{BB962C8B-B14F-4D97-AF65-F5344CB8AC3E}">
+        <p14:creationId xmlns:p14="http://schemas.microsoft.com/office/powerpoint/2010/main" val="1745488930"/>
       </p:ext>
     </p:extLst>
   </p:cSld>

</xml_diff>